<commit_message>
Add slide schéma des communication and correct typo
</commit_message>
<xml_diff>
--- a/IOT_projet_final_CokeMbayoSalhi.pptx
+++ b/IOT_projet_final_CokeMbayoSalhi.pptx
@@ -12,6 +12,7 @@
     <p:sldId id="259" r:id="rId7"/>
     <p:sldId id="260" r:id="rId8"/>
     <p:sldId id="261" r:id="rId9"/>
+    <p:sldId id="262" r:id="rId10"/>
   </p:sldIdLst>
   <p:sldSz cx="12192000" cy="6858000"/>
   <p:notesSz cx="7559675" cy="10691812"/>
@@ -82,7 +83,7 @@
           </a:bodyPr>
           <a:p>
             <a:pPr algn="ctr"/>
-            <a:endParaRPr b="0" lang="en-US" sz="4400" spc="-1" strike="noStrike">
+            <a:endParaRPr b="0" lang="fr-CH" sz="4400" spc="-1" strike="noStrike">
               <a:latin typeface="Arial"/>
             </a:endParaRPr>
           </a:p>
@@ -112,7 +113,7 @@
             <a:normAutofit/>
           </a:bodyPr>
           <a:p>
-            <a:endParaRPr b="0" lang="en-US" sz="3200" spc="-1" strike="noStrike">
+            <a:endParaRPr b="0" lang="fr-CH" sz="3200" spc="-1" strike="noStrike">
               <a:latin typeface="Arial"/>
             </a:endParaRPr>
           </a:p>
@@ -142,7 +143,7 @@
             <a:normAutofit/>
           </a:bodyPr>
           <a:p>
-            <a:endParaRPr b="0" lang="en-US" sz="3200" spc="-1" strike="noStrike">
+            <a:endParaRPr b="0" lang="fr-CH" sz="3200" spc="-1" strike="noStrike">
               <a:latin typeface="Arial"/>
             </a:endParaRPr>
           </a:p>
@@ -195,7 +196,7 @@
           </a:bodyPr>
           <a:p>
             <a:pPr algn="ctr"/>
-            <a:endParaRPr b="0" lang="en-US" sz="4400" spc="-1" strike="noStrike">
+            <a:endParaRPr b="0" lang="fr-CH" sz="4400" spc="-1" strike="noStrike">
               <a:latin typeface="Arial"/>
             </a:endParaRPr>
           </a:p>
@@ -225,7 +226,7 @@
             <a:normAutofit/>
           </a:bodyPr>
           <a:p>
-            <a:endParaRPr b="0" lang="en-US" sz="3200" spc="-1" strike="noStrike">
+            <a:endParaRPr b="0" lang="fr-CH" sz="3200" spc="-1" strike="noStrike">
               <a:latin typeface="Arial"/>
             </a:endParaRPr>
           </a:p>
@@ -255,7 +256,7 @@
             <a:normAutofit/>
           </a:bodyPr>
           <a:p>
-            <a:endParaRPr b="0" lang="en-US" sz="3200" spc="-1" strike="noStrike">
+            <a:endParaRPr b="0" lang="fr-CH" sz="3200" spc="-1" strike="noStrike">
               <a:latin typeface="Arial"/>
             </a:endParaRPr>
           </a:p>
@@ -285,7 +286,7 @@
             <a:normAutofit/>
           </a:bodyPr>
           <a:p>
-            <a:endParaRPr b="0" lang="en-US" sz="3200" spc="-1" strike="noStrike">
+            <a:endParaRPr b="0" lang="fr-CH" sz="3200" spc="-1" strike="noStrike">
               <a:latin typeface="Arial"/>
             </a:endParaRPr>
           </a:p>
@@ -315,7 +316,7 @@
             <a:normAutofit/>
           </a:bodyPr>
           <a:p>
-            <a:endParaRPr b="0" lang="en-US" sz="3200" spc="-1" strike="noStrike">
+            <a:endParaRPr b="0" lang="fr-CH" sz="3200" spc="-1" strike="noStrike">
               <a:latin typeface="Arial"/>
             </a:endParaRPr>
           </a:p>
@@ -368,7 +369,7 @@
           </a:bodyPr>
           <a:p>
             <a:pPr algn="ctr"/>
-            <a:endParaRPr b="0" lang="en-US" sz="4400" spc="-1" strike="noStrike">
+            <a:endParaRPr b="0" lang="fr-CH" sz="4400" spc="-1" strike="noStrike">
               <a:latin typeface="Arial"/>
             </a:endParaRPr>
           </a:p>
@@ -398,7 +399,7 @@
             <a:normAutofit/>
           </a:bodyPr>
           <a:p>
-            <a:endParaRPr b="0" lang="en-US" sz="3200" spc="-1" strike="noStrike">
+            <a:endParaRPr b="0" lang="fr-CH" sz="3200" spc="-1" strike="noStrike">
               <a:latin typeface="Arial"/>
             </a:endParaRPr>
           </a:p>
@@ -428,7 +429,7 @@
             <a:normAutofit/>
           </a:bodyPr>
           <a:p>
-            <a:endParaRPr b="0" lang="en-US" sz="3200" spc="-1" strike="noStrike">
+            <a:endParaRPr b="0" lang="fr-CH" sz="3200" spc="-1" strike="noStrike">
               <a:latin typeface="Arial"/>
             </a:endParaRPr>
           </a:p>
@@ -458,7 +459,7 @@
             <a:normAutofit/>
           </a:bodyPr>
           <a:p>
-            <a:endParaRPr b="0" lang="en-US" sz="3200" spc="-1" strike="noStrike">
+            <a:endParaRPr b="0" lang="fr-CH" sz="3200" spc="-1" strike="noStrike">
               <a:latin typeface="Arial"/>
             </a:endParaRPr>
           </a:p>
@@ -488,7 +489,7 @@
             <a:normAutofit/>
           </a:bodyPr>
           <a:p>
-            <a:endParaRPr b="0" lang="en-US" sz="3200" spc="-1" strike="noStrike">
+            <a:endParaRPr b="0" lang="fr-CH" sz="3200" spc="-1" strike="noStrike">
               <a:latin typeface="Arial"/>
             </a:endParaRPr>
           </a:p>
@@ -518,7 +519,7 @@
             <a:normAutofit/>
           </a:bodyPr>
           <a:p>
-            <a:endParaRPr b="0" lang="en-US" sz="3200" spc="-1" strike="noStrike">
+            <a:endParaRPr b="0" lang="fr-CH" sz="3200" spc="-1" strike="noStrike">
               <a:latin typeface="Arial"/>
             </a:endParaRPr>
           </a:p>
@@ -548,7 +549,7 @@
             <a:normAutofit/>
           </a:bodyPr>
           <a:p>
-            <a:endParaRPr b="0" lang="en-US" sz="3200" spc="-1" strike="noStrike">
+            <a:endParaRPr b="0" lang="fr-CH" sz="3200" spc="-1" strike="noStrike">
               <a:latin typeface="Arial"/>
             </a:endParaRPr>
           </a:p>
@@ -623,7 +624,7 @@
           </a:bodyPr>
           <a:p>
             <a:pPr algn="ctr"/>
-            <a:endParaRPr b="0" lang="en-US" sz="4400" spc="-1" strike="noStrike">
+            <a:endParaRPr b="0" lang="fr-CH" sz="4400" spc="-1" strike="noStrike">
               <a:latin typeface="Arial"/>
             </a:endParaRPr>
           </a:p>
@@ -654,7 +655,7 @@
           </a:bodyPr>
           <a:p>
             <a:pPr algn="ctr"/>
-            <a:endParaRPr b="0" lang="en-US" sz="3200" spc="-1" strike="noStrike">
+            <a:endParaRPr b="0" lang="fr-CH" sz="3200" spc="-1" strike="noStrike">
               <a:latin typeface="Arial"/>
             </a:endParaRPr>
           </a:p>
@@ -707,7 +708,7 @@
           </a:bodyPr>
           <a:p>
             <a:pPr algn="ctr"/>
-            <a:endParaRPr b="0" lang="en-US" sz="4400" spc="-1" strike="noStrike">
+            <a:endParaRPr b="0" lang="fr-CH" sz="4400" spc="-1" strike="noStrike">
               <a:latin typeface="Arial"/>
             </a:endParaRPr>
           </a:p>
@@ -737,7 +738,7 @@
             <a:normAutofit/>
           </a:bodyPr>
           <a:p>
-            <a:endParaRPr b="0" lang="en-US" sz="3200" spc="-1" strike="noStrike">
+            <a:endParaRPr b="0" lang="fr-CH" sz="3200" spc="-1" strike="noStrike">
               <a:latin typeface="Arial"/>
             </a:endParaRPr>
           </a:p>
@@ -790,7 +791,7 @@
           </a:bodyPr>
           <a:p>
             <a:pPr algn="ctr"/>
-            <a:endParaRPr b="0" lang="en-US" sz="4400" spc="-1" strike="noStrike">
+            <a:endParaRPr b="0" lang="fr-CH" sz="4400" spc="-1" strike="noStrike">
               <a:latin typeface="Arial"/>
             </a:endParaRPr>
           </a:p>
@@ -820,7 +821,7 @@
             <a:normAutofit/>
           </a:bodyPr>
           <a:p>
-            <a:endParaRPr b="0" lang="en-US" sz="3200" spc="-1" strike="noStrike">
+            <a:endParaRPr b="0" lang="fr-CH" sz="3200" spc="-1" strike="noStrike">
               <a:latin typeface="Arial"/>
             </a:endParaRPr>
           </a:p>
@@ -850,7 +851,7 @@
             <a:normAutofit/>
           </a:bodyPr>
           <a:p>
-            <a:endParaRPr b="0" lang="en-US" sz="3200" spc="-1" strike="noStrike">
+            <a:endParaRPr b="0" lang="fr-CH" sz="3200" spc="-1" strike="noStrike">
               <a:latin typeface="Arial"/>
             </a:endParaRPr>
           </a:p>
@@ -903,7 +904,7 @@
           </a:bodyPr>
           <a:p>
             <a:pPr algn="ctr"/>
-            <a:endParaRPr b="0" lang="en-US" sz="4400" spc="-1" strike="noStrike">
+            <a:endParaRPr b="0" lang="fr-CH" sz="4400" spc="-1" strike="noStrike">
               <a:latin typeface="Arial"/>
             </a:endParaRPr>
           </a:p>
@@ -956,7 +957,7 @@
           </a:bodyPr>
           <a:p>
             <a:pPr algn="ctr"/>
-            <a:endParaRPr b="0" lang="en-US" sz="3200" spc="-1" strike="noStrike">
+            <a:endParaRPr b="0" lang="fr-CH" sz="3200" spc="-1" strike="noStrike">
               <a:latin typeface="Arial"/>
             </a:endParaRPr>
           </a:p>
@@ -1009,7 +1010,7 @@
           </a:bodyPr>
           <a:p>
             <a:pPr algn="ctr"/>
-            <a:endParaRPr b="0" lang="en-US" sz="4400" spc="-1" strike="noStrike">
+            <a:endParaRPr b="0" lang="fr-CH" sz="4400" spc="-1" strike="noStrike">
               <a:latin typeface="Arial"/>
             </a:endParaRPr>
           </a:p>
@@ -1039,7 +1040,7 @@
             <a:normAutofit/>
           </a:bodyPr>
           <a:p>
-            <a:endParaRPr b="0" lang="en-US" sz="3200" spc="-1" strike="noStrike">
+            <a:endParaRPr b="0" lang="fr-CH" sz="3200" spc="-1" strike="noStrike">
               <a:latin typeface="Arial"/>
             </a:endParaRPr>
           </a:p>
@@ -1069,7 +1070,7 @@
             <a:normAutofit/>
           </a:bodyPr>
           <a:p>
-            <a:endParaRPr b="0" lang="en-US" sz="3200" spc="-1" strike="noStrike">
+            <a:endParaRPr b="0" lang="fr-CH" sz="3200" spc="-1" strike="noStrike">
               <a:latin typeface="Arial"/>
             </a:endParaRPr>
           </a:p>
@@ -1099,7 +1100,7 @@
             <a:normAutofit/>
           </a:bodyPr>
           <a:p>
-            <a:endParaRPr b="0" lang="en-US" sz="3200" spc="-1" strike="noStrike">
+            <a:endParaRPr b="0" lang="fr-CH" sz="3200" spc="-1" strike="noStrike">
               <a:latin typeface="Arial"/>
             </a:endParaRPr>
           </a:p>
@@ -1152,7 +1153,7 @@
           </a:bodyPr>
           <a:p>
             <a:pPr algn="ctr"/>
-            <a:endParaRPr b="0" lang="en-US" sz="4400" spc="-1" strike="noStrike">
+            <a:endParaRPr b="0" lang="fr-CH" sz="4400" spc="-1" strike="noStrike">
               <a:latin typeface="Arial"/>
             </a:endParaRPr>
           </a:p>
@@ -1183,7 +1184,7 @@
           </a:bodyPr>
           <a:p>
             <a:pPr algn="ctr"/>
-            <a:endParaRPr b="0" lang="en-US" sz="3200" spc="-1" strike="noStrike">
+            <a:endParaRPr b="0" lang="fr-CH" sz="3200" spc="-1" strike="noStrike">
               <a:latin typeface="Arial"/>
             </a:endParaRPr>
           </a:p>
@@ -1236,7 +1237,7 @@
           </a:bodyPr>
           <a:p>
             <a:pPr algn="ctr"/>
-            <a:endParaRPr b="0" lang="en-US" sz="4400" spc="-1" strike="noStrike">
+            <a:endParaRPr b="0" lang="fr-CH" sz="4400" spc="-1" strike="noStrike">
               <a:latin typeface="Arial"/>
             </a:endParaRPr>
           </a:p>
@@ -1266,7 +1267,7 @@
             <a:normAutofit/>
           </a:bodyPr>
           <a:p>
-            <a:endParaRPr b="0" lang="en-US" sz="3200" spc="-1" strike="noStrike">
+            <a:endParaRPr b="0" lang="fr-CH" sz="3200" spc="-1" strike="noStrike">
               <a:latin typeface="Arial"/>
             </a:endParaRPr>
           </a:p>
@@ -1296,7 +1297,7 @@
             <a:normAutofit/>
           </a:bodyPr>
           <a:p>
-            <a:endParaRPr b="0" lang="en-US" sz="3200" spc="-1" strike="noStrike">
+            <a:endParaRPr b="0" lang="fr-CH" sz="3200" spc="-1" strike="noStrike">
               <a:latin typeface="Arial"/>
             </a:endParaRPr>
           </a:p>
@@ -1326,7 +1327,7 @@
             <a:normAutofit/>
           </a:bodyPr>
           <a:p>
-            <a:endParaRPr b="0" lang="en-US" sz="3200" spc="-1" strike="noStrike">
+            <a:endParaRPr b="0" lang="fr-CH" sz="3200" spc="-1" strike="noStrike">
               <a:latin typeface="Arial"/>
             </a:endParaRPr>
           </a:p>
@@ -1379,7 +1380,7 @@
           </a:bodyPr>
           <a:p>
             <a:pPr algn="ctr"/>
-            <a:endParaRPr b="0" lang="en-US" sz="4400" spc="-1" strike="noStrike">
+            <a:endParaRPr b="0" lang="fr-CH" sz="4400" spc="-1" strike="noStrike">
               <a:latin typeface="Arial"/>
             </a:endParaRPr>
           </a:p>
@@ -1409,7 +1410,7 @@
             <a:normAutofit/>
           </a:bodyPr>
           <a:p>
-            <a:endParaRPr b="0" lang="en-US" sz="3200" spc="-1" strike="noStrike">
+            <a:endParaRPr b="0" lang="fr-CH" sz="3200" spc="-1" strike="noStrike">
               <a:latin typeface="Arial"/>
             </a:endParaRPr>
           </a:p>
@@ -1439,7 +1440,7 @@
             <a:normAutofit/>
           </a:bodyPr>
           <a:p>
-            <a:endParaRPr b="0" lang="en-US" sz="3200" spc="-1" strike="noStrike">
+            <a:endParaRPr b="0" lang="fr-CH" sz="3200" spc="-1" strike="noStrike">
               <a:latin typeface="Arial"/>
             </a:endParaRPr>
           </a:p>
@@ -1469,7 +1470,7 @@
             <a:normAutofit/>
           </a:bodyPr>
           <a:p>
-            <a:endParaRPr b="0" lang="en-US" sz="3200" spc="-1" strike="noStrike">
+            <a:endParaRPr b="0" lang="fr-CH" sz="3200" spc="-1" strike="noStrike">
               <a:latin typeface="Arial"/>
             </a:endParaRPr>
           </a:p>
@@ -1522,7 +1523,7 @@
           </a:bodyPr>
           <a:p>
             <a:pPr algn="ctr"/>
-            <a:endParaRPr b="0" lang="en-US" sz="4400" spc="-1" strike="noStrike">
+            <a:endParaRPr b="0" lang="fr-CH" sz="4400" spc="-1" strike="noStrike">
               <a:latin typeface="Arial"/>
             </a:endParaRPr>
           </a:p>
@@ -1552,7 +1553,7 @@
             <a:normAutofit/>
           </a:bodyPr>
           <a:p>
-            <a:endParaRPr b="0" lang="en-US" sz="3200" spc="-1" strike="noStrike">
+            <a:endParaRPr b="0" lang="fr-CH" sz="3200" spc="-1" strike="noStrike">
               <a:latin typeface="Arial"/>
             </a:endParaRPr>
           </a:p>
@@ -1582,7 +1583,7 @@
             <a:normAutofit/>
           </a:bodyPr>
           <a:p>
-            <a:endParaRPr b="0" lang="en-US" sz="3200" spc="-1" strike="noStrike">
+            <a:endParaRPr b="0" lang="fr-CH" sz="3200" spc="-1" strike="noStrike">
               <a:latin typeface="Arial"/>
             </a:endParaRPr>
           </a:p>
@@ -1635,7 +1636,7 @@
           </a:bodyPr>
           <a:p>
             <a:pPr algn="ctr"/>
-            <a:endParaRPr b="0" lang="en-US" sz="4400" spc="-1" strike="noStrike">
+            <a:endParaRPr b="0" lang="fr-CH" sz="4400" spc="-1" strike="noStrike">
               <a:latin typeface="Arial"/>
             </a:endParaRPr>
           </a:p>
@@ -1665,7 +1666,7 @@
             <a:normAutofit/>
           </a:bodyPr>
           <a:p>
-            <a:endParaRPr b="0" lang="en-US" sz="3200" spc="-1" strike="noStrike">
+            <a:endParaRPr b="0" lang="fr-CH" sz="3200" spc="-1" strike="noStrike">
               <a:latin typeface="Arial"/>
             </a:endParaRPr>
           </a:p>
@@ -1695,7 +1696,7 @@
             <a:normAutofit/>
           </a:bodyPr>
           <a:p>
-            <a:endParaRPr b="0" lang="en-US" sz="3200" spc="-1" strike="noStrike">
+            <a:endParaRPr b="0" lang="fr-CH" sz="3200" spc="-1" strike="noStrike">
               <a:latin typeface="Arial"/>
             </a:endParaRPr>
           </a:p>
@@ -1725,7 +1726,7 @@
             <a:normAutofit/>
           </a:bodyPr>
           <a:p>
-            <a:endParaRPr b="0" lang="en-US" sz="3200" spc="-1" strike="noStrike">
+            <a:endParaRPr b="0" lang="fr-CH" sz="3200" spc="-1" strike="noStrike">
               <a:latin typeface="Arial"/>
             </a:endParaRPr>
           </a:p>
@@ -1755,7 +1756,7 @@
             <a:normAutofit/>
           </a:bodyPr>
           <a:p>
-            <a:endParaRPr b="0" lang="en-US" sz="3200" spc="-1" strike="noStrike">
+            <a:endParaRPr b="0" lang="fr-CH" sz="3200" spc="-1" strike="noStrike">
               <a:latin typeface="Arial"/>
             </a:endParaRPr>
           </a:p>
@@ -1808,7 +1809,7 @@
           </a:bodyPr>
           <a:p>
             <a:pPr algn="ctr"/>
-            <a:endParaRPr b="0" lang="en-US" sz="4400" spc="-1" strike="noStrike">
+            <a:endParaRPr b="0" lang="fr-CH" sz="4400" spc="-1" strike="noStrike">
               <a:latin typeface="Arial"/>
             </a:endParaRPr>
           </a:p>
@@ -1838,7 +1839,7 @@
             <a:normAutofit/>
           </a:bodyPr>
           <a:p>
-            <a:endParaRPr b="0" lang="en-US" sz="3200" spc="-1" strike="noStrike">
+            <a:endParaRPr b="0" lang="fr-CH" sz="3200" spc="-1" strike="noStrike">
               <a:latin typeface="Arial"/>
             </a:endParaRPr>
           </a:p>
@@ -1868,7 +1869,7 @@
             <a:normAutofit/>
           </a:bodyPr>
           <a:p>
-            <a:endParaRPr b="0" lang="en-US" sz="3200" spc="-1" strike="noStrike">
+            <a:endParaRPr b="0" lang="fr-CH" sz="3200" spc="-1" strike="noStrike">
               <a:latin typeface="Arial"/>
             </a:endParaRPr>
           </a:p>
@@ -1898,7 +1899,7 @@
             <a:normAutofit/>
           </a:bodyPr>
           <a:p>
-            <a:endParaRPr b="0" lang="en-US" sz="3200" spc="-1" strike="noStrike">
+            <a:endParaRPr b="0" lang="fr-CH" sz="3200" spc="-1" strike="noStrike">
               <a:latin typeface="Arial"/>
             </a:endParaRPr>
           </a:p>
@@ -1928,7 +1929,7 @@
             <a:normAutofit/>
           </a:bodyPr>
           <a:p>
-            <a:endParaRPr b="0" lang="en-US" sz="3200" spc="-1" strike="noStrike">
+            <a:endParaRPr b="0" lang="fr-CH" sz="3200" spc="-1" strike="noStrike">
               <a:latin typeface="Arial"/>
             </a:endParaRPr>
           </a:p>
@@ -1958,7 +1959,7 @@
             <a:normAutofit/>
           </a:bodyPr>
           <a:p>
-            <a:endParaRPr b="0" lang="en-US" sz="3200" spc="-1" strike="noStrike">
+            <a:endParaRPr b="0" lang="fr-CH" sz="3200" spc="-1" strike="noStrike">
               <a:latin typeface="Arial"/>
             </a:endParaRPr>
           </a:p>
@@ -1988,7 +1989,7 @@
             <a:normAutofit/>
           </a:bodyPr>
           <a:p>
-            <a:endParaRPr b="0" lang="en-US" sz="3200" spc="-1" strike="noStrike">
+            <a:endParaRPr b="0" lang="fr-CH" sz="3200" spc="-1" strike="noStrike">
               <a:latin typeface="Arial"/>
             </a:endParaRPr>
           </a:p>
@@ -2041,7 +2042,7 @@
           </a:bodyPr>
           <a:p>
             <a:pPr algn="ctr"/>
-            <a:endParaRPr b="0" lang="en-US" sz="4400" spc="-1" strike="noStrike">
+            <a:endParaRPr b="0" lang="fr-CH" sz="4400" spc="-1" strike="noStrike">
               <a:latin typeface="Arial"/>
             </a:endParaRPr>
           </a:p>
@@ -2071,7 +2072,7 @@
             <a:normAutofit/>
           </a:bodyPr>
           <a:p>
-            <a:endParaRPr b="0" lang="en-US" sz="3200" spc="-1" strike="noStrike">
+            <a:endParaRPr b="0" lang="fr-CH" sz="3200" spc="-1" strike="noStrike">
               <a:latin typeface="Arial"/>
             </a:endParaRPr>
           </a:p>
@@ -2124,7 +2125,7 @@
           </a:bodyPr>
           <a:p>
             <a:pPr algn="ctr"/>
-            <a:endParaRPr b="0" lang="en-US" sz="4400" spc="-1" strike="noStrike">
+            <a:endParaRPr b="0" lang="fr-CH" sz="4400" spc="-1" strike="noStrike">
               <a:latin typeface="Arial"/>
             </a:endParaRPr>
           </a:p>
@@ -2154,7 +2155,7 @@
             <a:normAutofit/>
           </a:bodyPr>
           <a:p>
-            <a:endParaRPr b="0" lang="en-US" sz="3200" spc="-1" strike="noStrike">
+            <a:endParaRPr b="0" lang="fr-CH" sz="3200" spc="-1" strike="noStrike">
               <a:latin typeface="Arial"/>
             </a:endParaRPr>
           </a:p>
@@ -2184,7 +2185,7 @@
             <a:normAutofit/>
           </a:bodyPr>
           <a:p>
-            <a:endParaRPr b="0" lang="en-US" sz="3200" spc="-1" strike="noStrike">
+            <a:endParaRPr b="0" lang="fr-CH" sz="3200" spc="-1" strike="noStrike">
               <a:latin typeface="Arial"/>
             </a:endParaRPr>
           </a:p>
@@ -2237,7 +2238,7 @@
           </a:bodyPr>
           <a:p>
             <a:pPr algn="ctr"/>
-            <a:endParaRPr b="0" lang="en-US" sz="4400" spc="-1" strike="noStrike">
+            <a:endParaRPr b="0" lang="fr-CH" sz="4400" spc="-1" strike="noStrike">
               <a:latin typeface="Arial"/>
             </a:endParaRPr>
           </a:p>
@@ -2290,7 +2291,7 @@
           </a:bodyPr>
           <a:p>
             <a:pPr algn="ctr"/>
-            <a:endParaRPr b="0" lang="en-US" sz="3200" spc="-1" strike="noStrike">
+            <a:endParaRPr b="0" lang="fr-CH" sz="3200" spc="-1" strike="noStrike">
               <a:latin typeface="Arial"/>
             </a:endParaRPr>
           </a:p>
@@ -2343,7 +2344,7 @@
           </a:bodyPr>
           <a:p>
             <a:pPr algn="ctr"/>
-            <a:endParaRPr b="0" lang="en-US" sz="4400" spc="-1" strike="noStrike">
+            <a:endParaRPr b="0" lang="fr-CH" sz="4400" spc="-1" strike="noStrike">
               <a:latin typeface="Arial"/>
             </a:endParaRPr>
           </a:p>
@@ -2373,7 +2374,7 @@
             <a:normAutofit/>
           </a:bodyPr>
           <a:p>
-            <a:endParaRPr b="0" lang="en-US" sz="3200" spc="-1" strike="noStrike">
+            <a:endParaRPr b="0" lang="fr-CH" sz="3200" spc="-1" strike="noStrike">
               <a:latin typeface="Arial"/>
             </a:endParaRPr>
           </a:p>
@@ -2403,7 +2404,7 @@
             <a:normAutofit/>
           </a:bodyPr>
           <a:p>
-            <a:endParaRPr b="0" lang="en-US" sz="3200" spc="-1" strike="noStrike">
+            <a:endParaRPr b="0" lang="fr-CH" sz="3200" spc="-1" strike="noStrike">
               <a:latin typeface="Arial"/>
             </a:endParaRPr>
           </a:p>
@@ -2433,7 +2434,7 @@
             <a:normAutofit/>
           </a:bodyPr>
           <a:p>
-            <a:endParaRPr b="0" lang="en-US" sz="3200" spc="-1" strike="noStrike">
+            <a:endParaRPr b="0" lang="fr-CH" sz="3200" spc="-1" strike="noStrike">
               <a:latin typeface="Arial"/>
             </a:endParaRPr>
           </a:p>
@@ -2486,7 +2487,7 @@
           </a:bodyPr>
           <a:p>
             <a:pPr algn="ctr"/>
-            <a:endParaRPr b="0" lang="en-US" sz="4400" spc="-1" strike="noStrike">
+            <a:endParaRPr b="0" lang="fr-CH" sz="4400" spc="-1" strike="noStrike">
               <a:latin typeface="Arial"/>
             </a:endParaRPr>
           </a:p>
@@ -2516,7 +2517,7 @@
             <a:normAutofit/>
           </a:bodyPr>
           <a:p>
-            <a:endParaRPr b="0" lang="en-US" sz="3200" spc="-1" strike="noStrike">
+            <a:endParaRPr b="0" lang="fr-CH" sz="3200" spc="-1" strike="noStrike">
               <a:latin typeface="Arial"/>
             </a:endParaRPr>
           </a:p>
@@ -2546,7 +2547,7 @@
             <a:normAutofit/>
           </a:bodyPr>
           <a:p>
-            <a:endParaRPr b="0" lang="en-US" sz="3200" spc="-1" strike="noStrike">
+            <a:endParaRPr b="0" lang="fr-CH" sz="3200" spc="-1" strike="noStrike">
               <a:latin typeface="Arial"/>
             </a:endParaRPr>
           </a:p>
@@ -2576,7 +2577,7 @@
             <a:normAutofit/>
           </a:bodyPr>
           <a:p>
-            <a:endParaRPr b="0" lang="en-US" sz="3200" spc="-1" strike="noStrike">
+            <a:endParaRPr b="0" lang="fr-CH" sz="3200" spc="-1" strike="noStrike">
               <a:latin typeface="Arial"/>
             </a:endParaRPr>
           </a:p>
@@ -2629,7 +2630,7 @@
           </a:bodyPr>
           <a:p>
             <a:pPr algn="ctr"/>
-            <a:endParaRPr b="0" lang="en-US" sz="4400" spc="-1" strike="noStrike">
+            <a:endParaRPr b="0" lang="fr-CH" sz="4400" spc="-1" strike="noStrike">
               <a:latin typeface="Arial"/>
             </a:endParaRPr>
           </a:p>
@@ -2659,7 +2660,7 @@
             <a:normAutofit/>
           </a:bodyPr>
           <a:p>
-            <a:endParaRPr b="0" lang="en-US" sz="3200" spc="-1" strike="noStrike">
+            <a:endParaRPr b="0" lang="fr-CH" sz="3200" spc="-1" strike="noStrike">
               <a:latin typeface="Arial"/>
             </a:endParaRPr>
           </a:p>
@@ -2689,7 +2690,7 @@
             <a:normAutofit/>
           </a:bodyPr>
           <a:p>
-            <a:endParaRPr b="0" lang="en-US" sz="3200" spc="-1" strike="noStrike">
+            <a:endParaRPr b="0" lang="fr-CH" sz="3200" spc="-1" strike="noStrike">
               <a:latin typeface="Arial"/>
             </a:endParaRPr>
           </a:p>
@@ -2719,7 +2720,7 @@
             <a:normAutofit/>
           </a:bodyPr>
           <a:p>
-            <a:endParaRPr b="0" lang="en-US" sz="3200" spc="-1" strike="noStrike">
+            <a:endParaRPr b="0" lang="fr-CH" sz="3200" spc="-1" strike="noStrike">
               <a:latin typeface="Arial"/>
             </a:endParaRPr>
           </a:p>
@@ -2780,12 +2781,12 @@
           <a:p>
             <a:pPr algn="ctr"/>
             <a:r>
-              <a:rPr b="0" lang="en-US" sz="4400" spc="-1" strike="noStrike">
+              <a:rPr b="0" lang="fr-CH" sz="4400" spc="-1" strike="noStrike">
                 <a:latin typeface="Arial"/>
               </a:rPr>
               <a:t>Click to edit the title text format</a:t>
             </a:r>
-            <a:endParaRPr b="0" lang="en-US" sz="4400" spc="-1" strike="noStrike">
+            <a:endParaRPr b="0" lang="fr-CH" sz="4400" spc="-1" strike="noStrike">
               <a:latin typeface="Arial"/>
             </a:endParaRPr>
           </a:p>
@@ -2827,12 +2828,12 @@
               <a:buChar char=""/>
             </a:pPr>
             <a:r>
-              <a:rPr b="0" lang="en-US" sz="3200" spc="-1" strike="noStrike">
+              <a:rPr b="0" lang="fr-CH" sz="3200" spc="-1" strike="noStrike">
                 <a:latin typeface="Arial"/>
               </a:rPr>
               <a:t>Click to edit the outline text format</a:t>
             </a:r>
-            <a:endParaRPr b="0" lang="en-US" sz="3200" spc="-1" strike="noStrike">
+            <a:endParaRPr b="0" lang="fr-CH" sz="3200" spc="-1" strike="noStrike">
               <a:latin typeface="Arial"/>
             </a:endParaRPr>
           </a:p>
@@ -2849,12 +2850,12 @@
               <a:buChar char=""/>
             </a:pPr>
             <a:r>
-              <a:rPr b="0" lang="en-US" sz="2800" spc="-1" strike="noStrike">
+              <a:rPr b="0" lang="fr-CH" sz="2800" spc="-1" strike="noStrike">
                 <a:latin typeface="Arial"/>
               </a:rPr>
               <a:t>Second Outline Level</a:t>
             </a:r>
-            <a:endParaRPr b="0" lang="en-US" sz="2800" spc="-1" strike="noStrike">
+            <a:endParaRPr b="0" lang="fr-CH" sz="2800" spc="-1" strike="noStrike">
               <a:latin typeface="Arial"/>
             </a:endParaRPr>
           </a:p>
@@ -2871,12 +2872,12 @@
               <a:buChar char=""/>
             </a:pPr>
             <a:r>
-              <a:rPr b="0" lang="en-US" sz="2400" spc="-1" strike="noStrike">
+              <a:rPr b="0" lang="fr-CH" sz="2400" spc="-1" strike="noStrike">
                 <a:latin typeface="Arial"/>
               </a:rPr>
               <a:t>Third Outline Level</a:t>
             </a:r>
-            <a:endParaRPr b="0" lang="en-US" sz="2400" spc="-1" strike="noStrike">
+            <a:endParaRPr b="0" lang="fr-CH" sz="2400" spc="-1" strike="noStrike">
               <a:latin typeface="Arial"/>
             </a:endParaRPr>
           </a:p>
@@ -2893,12 +2894,12 @@
               <a:buChar char=""/>
             </a:pPr>
             <a:r>
-              <a:rPr b="0" lang="en-US" sz="2000" spc="-1" strike="noStrike">
+              <a:rPr b="0" lang="fr-CH" sz="2000" spc="-1" strike="noStrike">
                 <a:latin typeface="Arial"/>
               </a:rPr>
               <a:t>Fourth Outline Level</a:t>
             </a:r>
-            <a:endParaRPr b="0" lang="en-US" sz="2000" spc="-1" strike="noStrike">
+            <a:endParaRPr b="0" lang="fr-CH" sz="2000" spc="-1" strike="noStrike">
               <a:latin typeface="Arial"/>
             </a:endParaRPr>
           </a:p>
@@ -2915,12 +2916,12 @@
               <a:buChar char=""/>
             </a:pPr>
             <a:r>
-              <a:rPr b="0" lang="en-US" sz="2000" spc="-1" strike="noStrike">
+              <a:rPr b="0" lang="fr-CH" sz="2000" spc="-1" strike="noStrike">
                 <a:latin typeface="Arial"/>
               </a:rPr>
               <a:t>Fifth Outline Level</a:t>
             </a:r>
-            <a:endParaRPr b="0" lang="en-US" sz="2000" spc="-1" strike="noStrike">
+            <a:endParaRPr b="0" lang="fr-CH" sz="2000" spc="-1" strike="noStrike">
               <a:latin typeface="Arial"/>
             </a:endParaRPr>
           </a:p>
@@ -2937,12 +2938,12 @@
               <a:buChar char=""/>
             </a:pPr>
             <a:r>
-              <a:rPr b="0" lang="en-US" sz="2000" spc="-1" strike="noStrike">
+              <a:rPr b="0" lang="fr-CH" sz="2000" spc="-1" strike="noStrike">
                 <a:latin typeface="Arial"/>
               </a:rPr>
               <a:t>Sixth Outline Level</a:t>
             </a:r>
-            <a:endParaRPr b="0" lang="en-US" sz="2000" spc="-1" strike="noStrike">
+            <a:endParaRPr b="0" lang="fr-CH" sz="2000" spc="-1" strike="noStrike">
               <a:latin typeface="Arial"/>
             </a:endParaRPr>
           </a:p>
@@ -2959,12 +2960,12 @@
               <a:buChar char=""/>
             </a:pPr>
             <a:r>
-              <a:rPr b="0" lang="en-US" sz="2000" spc="-1" strike="noStrike">
+              <a:rPr b="0" lang="fr-CH" sz="2000" spc="-1" strike="noStrike">
                 <a:latin typeface="Arial"/>
               </a:rPr>
               <a:t>Seventh Outline Level</a:t>
             </a:r>
-            <a:endParaRPr b="0" lang="en-US" sz="2000" spc="-1" strike="noStrike">
+            <a:endParaRPr b="0" lang="fr-CH" sz="2000" spc="-1" strike="noStrike">
               <a:latin typeface="Arial"/>
             </a:endParaRPr>
           </a:p>
@@ -3040,12 +3041,12 @@
           <a:p>
             <a:pPr algn="ctr"/>
             <a:r>
-              <a:rPr b="0" lang="en-US" sz="4400" spc="-1" strike="noStrike">
+              <a:rPr b="0" lang="fr-CH" sz="4400" spc="-1" strike="noStrike">
                 <a:latin typeface="Arial"/>
               </a:rPr>
               <a:t>Click to edit the title text format</a:t>
             </a:r>
-            <a:endParaRPr b="0" lang="en-US" sz="4400" spc="-1" strike="noStrike">
+            <a:endParaRPr b="0" lang="fr-CH" sz="4400" spc="-1" strike="noStrike">
               <a:latin typeface="Arial"/>
             </a:endParaRPr>
           </a:p>
@@ -3087,12 +3088,12 @@
               <a:buChar char=""/>
             </a:pPr>
             <a:r>
-              <a:rPr b="0" lang="en-US" sz="3200" spc="-1" strike="noStrike">
+              <a:rPr b="0" lang="fr-CH" sz="3200" spc="-1" strike="noStrike">
                 <a:latin typeface="Arial"/>
               </a:rPr>
               <a:t>Click to edit the outline text format</a:t>
             </a:r>
-            <a:endParaRPr b="0" lang="en-US" sz="3200" spc="-1" strike="noStrike">
+            <a:endParaRPr b="0" lang="fr-CH" sz="3200" spc="-1" strike="noStrike">
               <a:latin typeface="Arial"/>
             </a:endParaRPr>
           </a:p>
@@ -3109,12 +3110,12 @@
               <a:buChar char=""/>
             </a:pPr>
             <a:r>
-              <a:rPr b="0" lang="en-US" sz="2800" spc="-1" strike="noStrike">
+              <a:rPr b="0" lang="fr-CH" sz="2800" spc="-1" strike="noStrike">
                 <a:latin typeface="Arial"/>
               </a:rPr>
               <a:t>Second Outline Level</a:t>
             </a:r>
-            <a:endParaRPr b="0" lang="en-US" sz="2800" spc="-1" strike="noStrike">
+            <a:endParaRPr b="0" lang="fr-CH" sz="2800" spc="-1" strike="noStrike">
               <a:latin typeface="Arial"/>
             </a:endParaRPr>
           </a:p>
@@ -3131,12 +3132,12 @@
               <a:buChar char=""/>
             </a:pPr>
             <a:r>
-              <a:rPr b="0" lang="en-US" sz="2400" spc="-1" strike="noStrike">
+              <a:rPr b="0" lang="fr-CH" sz="2400" spc="-1" strike="noStrike">
                 <a:latin typeface="Arial"/>
               </a:rPr>
               <a:t>Third Outline Level</a:t>
             </a:r>
-            <a:endParaRPr b="0" lang="en-US" sz="2400" spc="-1" strike="noStrike">
+            <a:endParaRPr b="0" lang="fr-CH" sz="2400" spc="-1" strike="noStrike">
               <a:latin typeface="Arial"/>
             </a:endParaRPr>
           </a:p>
@@ -3153,12 +3154,12 @@
               <a:buChar char=""/>
             </a:pPr>
             <a:r>
-              <a:rPr b="0" lang="en-US" sz="2000" spc="-1" strike="noStrike">
+              <a:rPr b="0" lang="fr-CH" sz="2000" spc="-1" strike="noStrike">
                 <a:latin typeface="Arial"/>
               </a:rPr>
               <a:t>Fourth Outline Level</a:t>
             </a:r>
-            <a:endParaRPr b="0" lang="en-US" sz="2000" spc="-1" strike="noStrike">
+            <a:endParaRPr b="0" lang="fr-CH" sz="2000" spc="-1" strike="noStrike">
               <a:latin typeface="Arial"/>
             </a:endParaRPr>
           </a:p>
@@ -3175,12 +3176,12 @@
               <a:buChar char=""/>
             </a:pPr>
             <a:r>
-              <a:rPr b="0" lang="en-US" sz="2000" spc="-1" strike="noStrike">
+              <a:rPr b="0" lang="fr-CH" sz="2000" spc="-1" strike="noStrike">
                 <a:latin typeface="Arial"/>
               </a:rPr>
               <a:t>Fifth Outline Level</a:t>
             </a:r>
-            <a:endParaRPr b="0" lang="en-US" sz="2000" spc="-1" strike="noStrike">
+            <a:endParaRPr b="0" lang="fr-CH" sz="2000" spc="-1" strike="noStrike">
               <a:latin typeface="Arial"/>
             </a:endParaRPr>
           </a:p>
@@ -3197,12 +3198,12 @@
               <a:buChar char=""/>
             </a:pPr>
             <a:r>
-              <a:rPr b="0" lang="en-US" sz="2000" spc="-1" strike="noStrike">
+              <a:rPr b="0" lang="fr-CH" sz="2000" spc="-1" strike="noStrike">
                 <a:latin typeface="Arial"/>
               </a:rPr>
               <a:t>Sixth Outline Level</a:t>
             </a:r>
-            <a:endParaRPr b="0" lang="en-US" sz="2000" spc="-1" strike="noStrike">
+            <a:endParaRPr b="0" lang="fr-CH" sz="2000" spc="-1" strike="noStrike">
               <a:latin typeface="Arial"/>
             </a:endParaRPr>
           </a:p>
@@ -3219,12 +3220,12 @@
               <a:buChar char=""/>
             </a:pPr>
             <a:r>
-              <a:rPr b="0" lang="en-US" sz="2000" spc="-1" strike="noStrike">
+              <a:rPr b="0" lang="fr-CH" sz="2000" spc="-1" strike="noStrike">
                 <a:latin typeface="Arial"/>
               </a:rPr>
               <a:t>Seventh Outline Level</a:t>
             </a:r>
-            <a:endParaRPr b="0" lang="en-US" sz="2000" spc="-1" strike="noStrike">
+            <a:endParaRPr b="0" lang="fr-CH" sz="2000" spc="-1" strike="noStrike">
               <a:latin typeface="Arial"/>
             </a:endParaRPr>
           </a:p>
@@ -3283,7 +3284,7 @@
         <p:spPr>
           <a:xfrm>
             <a:off x="2235240" y="1820160"/>
-            <a:ext cx="7718760" cy="1906920"/>
+            <a:ext cx="7718400" cy="1906560"/>
           </a:xfrm>
           <a:prstGeom prst="rect">
             <a:avLst/>
@@ -3324,7 +3325,7 @@
               </a:rPr>
               <a:t>Serre connectée</a:t>
             </a:r>
-            <a:endParaRPr b="0" lang="en-US" sz="4800" spc="-1" strike="noStrike">
+            <a:endParaRPr b="0" lang="fr-CH" sz="4800" spc="-1" strike="noStrike">
               <a:latin typeface="Arial"/>
             </a:endParaRPr>
           </a:p>
@@ -3339,7 +3340,7 @@
         <p:spPr>
           <a:xfrm>
             <a:off x="1523880" y="4719600"/>
-            <a:ext cx="9141120" cy="1652760"/>
+            <a:ext cx="9140760" cy="1652400"/>
           </a:xfrm>
           <a:prstGeom prst="rect">
             <a:avLst/>
@@ -3381,7 +3382,7 @@
               </a:rPr>
               <a:t>HEIG-VD, IoT</a:t>
             </a:r>
-            <a:endParaRPr b="0" lang="en-US" sz="2400" spc="-1" strike="noStrike">
+            <a:endParaRPr b="0" lang="fr-CH" sz="2400" spc="-1" strike="noStrike">
               <a:latin typeface="Arial"/>
             </a:endParaRPr>
           </a:p>
@@ -3407,7 +3408,7 @@
               </a:rPr>
               <a:t>2023</a:t>
             </a:r>
-            <a:endParaRPr b="0" lang="en-US" sz="2400" spc="-1" strike="noStrike">
+            <a:endParaRPr b="0" lang="fr-CH" sz="2400" spc="-1" strike="noStrike">
               <a:latin typeface="Arial"/>
             </a:endParaRPr>
           </a:p>
@@ -3423,7 +3424,7 @@
                 <a:tab algn="l" pos="0"/>
               </a:tabLst>
             </a:pPr>
-            <a:endParaRPr b="0" lang="en-US" sz="2400" spc="-1" strike="noStrike">
+            <a:endParaRPr b="0" lang="fr-CH" sz="2400" spc="-1" strike="noStrike">
               <a:latin typeface="Arial"/>
             </a:endParaRPr>
           </a:p>
@@ -3438,7 +3439,7 @@
         <p:spPr>
           <a:xfrm>
             <a:off x="8610480" y="6356520"/>
-            <a:ext cx="2740320" cy="362160"/>
+            <a:ext cx="2739960" cy="361800"/>
           </a:xfrm>
           <a:prstGeom prst="rect">
             <a:avLst/>
@@ -3464,7 +3465,7 @@
                 <a:spcPct val="100000"/>
               </a:lnSpc>
             </a:pPr>
-            <a:fld id="{D9F69F7A-E8C2-4A37-BFB7-373B0ED39466}" type="slidenum">
+            <a:fld id="{15625AA4-0481-40B8-929F-B82023F61B0B}" type="slidenum">
               <a:rPr b="0" lang="fr-FR" sz="1200" spc="-1" strike="noStrike">
                 <a:solidFill>
                   <a:srgbClr val="8b8b8b"/>
@@ -3474,7 +3475,7 @@
               </a:rPr>
               <a:t>1</a:t>
             </a:fld>
-            <a:endParaRPr b="0" lang="en-US" sz="1200" spc="-1" strike="noStrike">
+            <a:endParaRPr b="0" lang="fr-CH" sz="1200" spc="-1" strike="noStrike">
               <a:latin typeface="Arial"/>
             </a:endParaRPr>
           </a:p>
@@ -3489,7 +3490,7 @@
         <p:spPr>
           <a:xfrm>
             <a:off x="4038480" y="6356520"/>
-            <a:ext cx="4111920" cy="362160"/>
+            <a:ext cx="4111560" cy="361800"/>
           </a:xfrm>
           <a:prstGeom prst="rect">
             <a:avLst/>
@@ -3525,7 +3526,7 @@
               </a:rPr>
               <a:t>Présentation du projet IoT, HEIG-VD</a:t>
             </a:r>
-            <a:endParaRPr b="0" lang="en-US" sz="1200" spc="-1" strike="noStrike">
+            <a:endParaRPr b="0" lang="fr-CH" sz="1200" spc="-1" strike="noStrike">
               <a:latin typeface="Arial"/>
             </a:endParaRPr>
           </a:p>
@@ -3570,7 +3571,7 @@
         <p:spPr>
           <a:xfrm>
             <a:off x="0" y="0"/>
-            <a:ext cx="12189600" cy="893160"/>
+            <a:ext cx="12189240" cy="892800"/>
           </a:xfrm>
           <a:prstGeom prst="rect">
             <a:avLst/>
@@ -3606,7 +3607,7 @@
         <p:spPr>
           <a:xfrm>
             <a:off x="317520" y="1123920"/>
-            <a:ext cx="11517480" cy="5104800"/>
+            <a:ext cx="11517120" cy="5104440"/>
           </a:xfrm>
           <a:prstGeom prst="rect">
             <a:avLst/>
@@ -3635,7 +3636,7 @@
                 <a:spcPts val="1001"/>
               </a:spcBef>
             </a:pPr>
-            <a:endParaRPr b="0" lang="en-US" sz="1800" spc="-1" strike="noStrike">
+            <a:endParaRPr b="0" lang="fr-CH" sz="1800" spc="-1" strike="noStrike">
               <a:latin typeface="Arial"/>
             </a:endParaRPr>
           </a:p>
@@ -3648,7 +3649,7 @@
                 <a:spcPts val="1001"/>
               </a:spcBef>
             </a:pPr>
-            <a:endParaRPr b="0" lang="en-US" sz="1800" spc="-1" strike="noStrike">
+            <a:endParaRPr b="0" lang="fr-CH" sz="1800" spc="-1" strike="noStrike">
               <a:latin typeface="Arial"/>
             </a:endParaRPr>
           </a:p>
@@ -3661,12 +3662,12 @@
                 <a:spcPts val="1001"/>
               </a:spcBef>
             </a:pPr>
-            <a:endParaRPr b="0" lang="en-US" sz="1800" spc="-1" strike="noStrike">
-              <a:latin typeface="Arial"/>
-            </a:endParaRPr>
-          </a:p>
-          <a:p>
-            <a:pPr marL="228600" indent="-226080">
+            <a:endParaRPr b="0" lang="fr-CH" sz="1800" spc="-1" strike="noStrike">
+              <a:latin typeface="Arial"/>
+            </a:endParaRPr>
+          </a:p>
+          <a:p>
+            <a:pPr marL="228600" indent="-225720">
               <a:lnSpc>
                 <a:spcPct val="90000"/>
               </a:lnSpc>
@@ -3689,12 +3690,12 @@
               </a:rPr>
               <a:t>Preuve de concept d’une serre connectée</a:t>
             </a:r>
-            <a:endParaRPr b="0" lang="en-US" sz="2800" spc="-1" strike="noStrike">
-              <a:latin typeface="Arial"/>
-            </a:endParaRPr>
-          </a:p>
-          <a:p>
-            <a:pPr marL="228600" indent="-226080">
+            <a:endParaRPr b="0" lang="fr-CH" sz="2800" spc="-1" strike="noStrike">
+              <a:latin typeface="Arial"/>
+            </a:endParaRPr>
+          </a:p>
+          <a:p>
+            <a:pPr marL="228600" indent="-225720">
               <a:lnSpc>
                 <a:spcPct val="90000"/>
               </a:lnSpc>
@@ -3717,12 +3718,12 @@
               </a:rPr>
               <a:t>Optimiser ses cultures et protéger sa serre </a:t>
             </a:r>
-            <a:endParaRPr b="0" lang="en-US" sz="2800" spc="-1" strike="noStrike">
-              <a:latin typeface="Arial"/>
-            </a:endParaRPr>
-          </a:p>
-          <a:p>
-            <a:pPr marL="228600" indent="-226080">
+            <a:endParaRPr b="0" lang="fr-CH" sz="2800" spc="-1" strike="noStrike">
+              <a:latin typeface="Arial"/>
+            </a:endParaRPr>
+          </a:p>
+          <a:p>
+            <a:pPr marL="228600" indent="-225720">
               <a:lnSpc>
                 <a:spcPct val="90000"/>
               </a:lnSpc>
@@ -3745,12 +3746,12 @@
               </a:rPr>
               <a:t>Système de mesures de la santé du sol afin de diminuer l’utilisation abusive d’engrais</a:t>
             </a:r>
-            <a:endParaRPr b="0" lang="en-US" sz="2800" spc="-1" strike="noStrike">
-              <a:latin typeface="Arial"/>
-            </a:endParaRPr>
-          </a:p>
-          <a:p>
-            <a:pPr marL="228600" indent="-226080">
+            <a:endParaRPr b="0" lang="fr-CH" sz="2800" spc="-1" strike="noStrike">
+              <a:latin typeface="Arial"/>
+            </a:endParaRPr>
+          </a:p>
+          <a:p>
+            <a:pPr marL="228600" indent="-225720">
               <a:lnSpc>
                 <a:spcPct val="90000"/>
               </a:lnSpc>
@@ -3773,7 +3774,7 @@
               </a:rPr>
               <a:t>Système de sécurité pour protéger l’accès à la serre</a:t>
             </a:r>
-            <a:endParaRPr b="0" lang="en-US" sz="2800" spc="-1" strike="noStrike">
+            <a:endParaRPr b="0" lang="fr-CH" sz="2800" spc="-1" strike="noStrike">
               <a:latin typeface="Arial"/>
             </a:endParaRPr>
           </a:p>
@@ -3821,7 +3822,7 @@
         <p:spPr>
           <a:xfrm>
             <a:off x="317520" y="93960"/>
-            <a:ext cx="11535840" cy="699120"/>
+            <a:ext cx="11535480" cy="699120"/>
           </a:xfrm>
           <a:prstGeom prst="rect">
             <a:avLst/>
@@ -3848,7 +3849,7 @@
               </a:lnSpc>
             </a:pPr>
             <a:r>
-              <a:rPr b="0" lang="en-GB" sz="4000" spc="182" strike="noStrike">
+              <a:rPr b="0" lang="en-GB" sz="4000" spc="180" strike="noStrike">
                 <a:solidFill>
                   <a:srgbClr val="ffffff"/>
                 </a:solidFill>
@@ -3857,7 +3858,7 @@
               </a:rPr>
               <a:t>Sujet initial</a:t>
             </a:r>
-            <a:endParaRPr b="0" lang="en-US" sz="4000" spc="-1" strike="noStrike">
+            <a:endParaRPr b="0" lang="fr-CH" sz="4000" spc="-1" strike="noStrike">
               <a:latin typeface="Arial"/>
             </a:endParaRPr>
           </a:p>
@@ -3872,7 +3873,7 @@
         <p:spPr>
           <a:xfrm>
             <a:off x="3145320" y="6400800"/>
-            <a:ext cx="5898600" cy="317520"/>
+            <a:ext cx="5898240" cy="317160"/>
           </a:xfrm>
           <a:prstGeom prst="rect">
             <a:avLst/>
@@ -3908,7 +3909,7 @@
               </a:rPr>
               <a:t>Présentation du projet IoT, HEIG-VD</a:t>
             </a:r>
-            <a:endParaRPr b="0" lang="en-US" sz="1400" spc="-1" strike="noStrike">
+            <a:endParaRPr b="0" lang="fr-CH" sz="1400" spc="-1" strike="noStrike">
               <a:latin typeface="Arial"/>
             </a:endParaRPr>
           </a:p>
@@ -3923,7 +3924,7 @@
         <p:spPr>
           <a:xfrm>
             <a:off x="11425680" y="6400800"/>
-            <a:ext cx="427680" cy="358200"/>
+            <a:ext cx="427320" cy="357840"/>
           </a:xfrm>
           <a:prstGeom prst="rect">
             <a:avLst/>
@@ -3951,7 +3952,7 @@
                 <a:spcPct val="100000"/>
               </a:lnSpc>
             </a:pPr>
-            <a:fld id="{232E2698-BF79-4AD7-8482-85A5F41BD732}" type="slidenum">
+            <a:fld id="{E010E5FC-48BD-48D1-81BA-FA4E4629BF20}" type="slidenum">
               <a:rPr b="0" lang="en-GB" sz="1400" spc="-1" strike="noStrike">
                 <a:solidFill>
                   <a:srgbClr val="ffffff"/>
@@ -3961,7 +3962,7 @@
               </a:rPr>
               <a:t>2</a:t>
             </a:fld>
-            <a:endParaRPr b="0" lang="en-US" sz="1400" spc="-1" strike="noStrike">
+            <a:endParaRPr b="0" lang="fr-CH" sz="1400" spc="-1" strike="noStrike">
               <a:latin typeface="Arial"/>
             </a:endParaRPr>
           </a:p>
@@ -4006,7 +4007,7 @@
         <p:spPr>
           <a:xfrm>
             <a:off x="0" y="0"/>
-            <a:ext cx="12189240" cy="892800"/>
+            <a:ext cx="12188880" cy="892440"/>
           </a:xfrm>
           <a:prstGeom prst="rect">
             <a:avLst/>
@@ -4075,7 +4076,7 @@
         <p:spPr>
           <a:xfrm>
             <a:off x="317520" y="93960"/>
-            <a:ext cx="11535480" cy="699120"/>
+            <a:ext cx="11535120" cy="699120"/>
           </a:xfrm>
           <a:prstGeom prst="rect">
             <a:avLst/>
@@ -4111,7 +4112,7 @@
               </a:rPr>
               <a:t>Problèmes</a:t>
             </a:r>
-            <a:endParaRPr b="0" lang="en-US" sz="4000" spc="-1" strike="noStrike">
+            <a:endParaRPr b="0" lang="fr-CH" sz="4000" spc="-1" strike="noStrike">
               <a:latin typeface="Arial"/>
             </a:endParaRPr>
           </a:p>
@@ -4126,7 +4127,7 @@
         <p:spPr>
           <a:xfrm>
             <a:off x="3145320" y="6400800"/>
-            <a:ext cx="5898240" cy="317160"/>
+            <a:ext cx="5897880" cy="316800"/>
           </a:xfrm>
           <a:prstGeom prst="rect">
             <a:avLst/>
@@ -4162,7 +4163,7 @@
               </a:rPr>
               <a:t>Présentation du projet IoT, HEIG-VD</a:t>
             </a:r>
-            <a:endParaRPr b="0" lang="en-US" sz="1400" spc="-1" strike="noStrike">
+            <a:endParaRPr b="0" lang="fr-CH" sz="1400" spc="-1" strike="noStrike">
               <a:latin typeface="Arial"/>
             </a:endParaRPr>
           </a:p>
@@ -4177,7 +4178,7 @@
         <p:spPr>
           <a:xfrm>
             <a:off x="11425680" y="6400800"/>
-            <a:ext cx="427320" cy="357840"/>
+            <a:ext cx="426960" cy="357480"/>
           </a:xfrm>
           <a:prstGeom prst="rect">
             <a:avLst/>
@@ -4205,7 +4206,7 @@
                 <a:spcPct val="100000"/>
               </a:lnSpc>
             </a:pPr>
-            <a:fld id="{5EC18A96-A851-4887-9A76-B1FE87AAEDCB}" type="slidenum">
+            <a:fld id="{20CD251C-B9D7-45FA-87FD-E4B0A0C0DDC2}" type="slidenum">
               <a:rPr b="0" lang="en-GB" sz="1400" spc="-1" strike="noStrike">
                 <a:solidFill>
                   <a:srgbClr val="ffffff"/>
@@ -4215,7 +4216,7 @@
               </a:rPr>
               <a:t>2</a:t>
             </a:fld>
-            <a:endParaRPr b="0" lang="en-US" sz="1400" spc="-1" strike="noStrike">
+            <a:endParaRPr b="0" lang="fr-CH" sz="1400" spc="-1" strike="noStrike">
               <a:latin typeface="Arial"/>
             </a:endParaRPr>
           </a:p>
@@ -4230,7 +4231,7 @@
         <p:spPr>
           <a:xfrm>
             <a:off x="317520" y="1123920"/>
-            <a:ext cx="11517120" cy="5104440"/>
+            <a:ext cx="11516760" cy="5104080"/>
           </a:xfrm>
           <a:prstGeom prst="rect">
             <a:avLst/>
@@ -4259,7 +4260,7 @@
                 <a:spcPts val="1417"/>
               </a:spcBef>
             </a:pPr>
-            <a:endParaRPr b="0" lang="en-US" sz="1800" spc="-1" strike="noStrike">
+            <a:endParaRPr b="0" lang="fr-CH" sz="1800" spc="-1" strike="noStrike">
               <a:latin typeface="Arial"/>
             </a:endParaRPr>
           </a:p>
@@ -4272,7 +4273,7 @@
                 <a:spcPts val="1417"/>
               </a:spcBef>
             </a:pPr>
-            <a:endParaRPr b="0" lang="en-US" sz="1800" spc="-1" strike="noStrike">
+            <a:endParaRPr b="0" lang="fr-CH" sz="1800" spc="-1" strike="noStrike">
               <a:latin typeface="Arial"/>
             </a:endParaRPr>
           </a:p>
@@ -4285,12 +4286,12 @@
                 <a:spcPts val="1417"/>
               </a:spcBef>
             </a:pPr>
-            <a:endParaRPr b="0" lang="en-US" sz="1800" spc="-1" strike="noStrike">
-              <a:latin typeface="Arial"/>
-            </a:endParaRPr>
-          </a:p>
-          <a:p>
-            <a:pPr marL="432000" indent="-321480">
+            <a:endParaRPr b="0" lang="fr-CH" sz="1800" spc="-1" strike="noStrike">
+              <a:latin typeface="Arial"/>
+            </a:endParaRPr>
+          </a:p>
+          <a:p>
+            <a:pPr marL="432000" indent="-321120">
               <a:lnSpc>
                 <a:spcPct val="100000"/>
               </a:lnSpc>
@@ -4314,12 +4315,12 @@
               </a:rPr>
               <a:t>Difficulté à évaluer le temps</a:t>
             </a:r>
-            <a:endParaRPr b="0" lang="en-US" sz="2800" spc="-1" strike="noStrike">
-              <a:latin typeface="Arial"/>
-            </a:endParaRPr>
-          </a:p>
-          <a:p>
-            <a:pPr marL="432000" indent="-321480">
+            <a:endParaRPr b="0" lang="fr-CH" sz="2800" spc="-1" strike="noStrike">
+              <a:latin typeface="Arial"/>
+            </a:endParaRPr>
+          </a:p>
+          <a:p>
+            <a:pPr marL="432000" indent="-321120">
               <a:lnSpc>
                 <a:spcPct val="100000"/>
               </a:lnSpc>
@@ -4341,24 +4342,14 @@
                 <a:latin typeface="Calibri"/>
                 <a:ea typeface="DejaVu Sans"/>
               </a:rPr>
-              <a:t> </a:t>
+              <a:t>Composants indisponibles ou pas primordiaux</a:t>
             </a:r>
-            <a:r>
-              <a:rPr b="0" lang="fr-FR" sz="2800" spc="-1" strike="noStrike">
-                <a:solidFill>
-                  <a:srgbClr val="000000"/>
-                </a:solidFill>
-                <a:latin typeface="Calibri"/>
-                <a:ea typeface="DejaVu Sans"/>
-              </a:rPr>
-              <a:t>Composants indisponible ou pas primordiaux</a:t>
-            </a:r>
-            <a:endParaRPr b="0" lang="en-US" sz="2800" spc="-1" strike="noStrike">
-              <a:latin typeface="Arial"/>
-            </a:endParaRPr>
-          </a:p>
-          <a:p>
-            <a:pPr marL="432000" indent="-321480">
+            <a:endParaRPr b="0" lang="fr-CH" sz="2800" spc="-1" strike="noStrike">
+              <a:latin typeface="Arial"/>
+            </a:endParaRPr>
+          </a:p>
+          <a:p>
+            <a:pPr marL="432000" indent="-321120">
               <a:lnSpc>
                 <a:spcPct val="100000"/>
               </a:lnSpc>
@@ -4380,9 +4371,9 @@
                 <a:latin typeface="Calibri"/>
                 <a:ea typeface="DejaVu Sans"/>
               </a:rPr>
-              <a:t>Solution envisagée par adaptée IOT</a:t>
+              <a:t>Solution envisagée pas adaptée IOT</a:t>
             </a:r>
-            <a:endParaRPr b="0" lang="en-US" sz="2800" spc="-1" strike="noStrike">
+            <a:endParaRPr b="0" lang="fr-CH" sz="2800" spc="-1" strike="noStrike">
               <a:latin typeface="Arial"/>
             </a:endParaRPr>
           </a:p>
@@ -4395,7 +4386,7 @@
                 <a:spcPts val="1417"/>
               </a:spcBef>
             </a:pPr>
-            <a:endParaRPr b="0" lang="en-US" sz="2800" spc="-1" strike="noStrike">
+            <a:endParaRPr b="0" lang="fr-CH" sz="2800" spc="-1" strike="noStrike">
               <a:latin typeface="Arial"/>
             </a:endParaRPr>
           </a:p>
@@ -4408,7 +4399,7 @@
                 <a:spcPts val="1417"/>
               </a:spcBef>
             </a:pPr>
-            <a:endParaRPr b="0" lang="en-US" sz="2800" spc="-1" strike="noStrike">
+            <a:endParaRPr b="0" lang="fr-CH" sz="2800" spc="-1" strike="noStrike">
               <a:latin typeface="Arial"/>
             </a:endParaRPr>
           </a:p>
@@ -4453,7 +4444,7 @@
         <p:spPr>
           <a:xfrm>
             <a:off x="0" y="0"/>
-            <a:ext cx="12189240" cy="892800"/>
+            <a:ext cx="12188880" cy="892440"/>
           </a:xfrm>
           <a:prstGeom prst="rect">
             <a:avLst/>
@@ -4522,7 +4513,7 @@
         <p:spPr>
           <a:xfrm>
             <a:off x="317520" y="93960"/>
-            <a:ext cx="11535480" cy="699120"/>
+            <a:ext cx="11535120" cy="699120"/>
           </a:xfrm>
           <a:prstGeom prst="rect">
             <a:avLst/>
@@ -4558,7 +4549,7 @@
               </a:rPr>
               <a:t>Composants matériel</a:t>
             </a:r>
-            <a:endParaRPr b="0" lang="en-US" sz="4000" spc="-1" strike="noStrike">
+            <a:endParaRPr b="0" lang="fr-CH" sz="4000" spc="-1" strike="noStrike">
               <a:latin typeface="Arial"/>
             </a:endParaRPr>
           </a:p>
@@ -4573,7 +4564,7 @@
         <p:spPr>
           <a:xfrm>
             <a:off x="3145320" y="6400800"/>
-            <a:ext cx="5898240" cy="317160"/>
+            <a:ext cx="5897880" cy="316800"/>
           </a:xfrm>
           <a:prstGeom prst="rect">
             <a:avLst/>
@@ -4609,7 +4600,7 @@
               </a:rPr>
               <a:t>Présentation du projet IoT, HEIG-VD</a:t>
             </a:r>
-            <a:endParaRPr b="0" lang="en-US" sz="1400" spc="-1" strike="noStrike">
+            <a:endParaRPr b="0" lang="fr-CH" sz="1400" spc="-1" strike="noStrike">
               <a:latin typeface="Arial"/>
             </a:endParaRPr>
           </a:p>
@@ -4624,7 +4615,7 @@
         <p:spPr>
           <a:xfrm>
             <a:off x="11425680" y="6400800"/>
-            <a:ext cx="427320" cy="357840"/>
+            <a:ext cx="426960" cy="357480"/>
           </a:xfrm>
           <a:prstGeom prst="rect">
             <a:avLst/>
@@ -4652,7 +4643,7 @@
                 <a:spcPct val="100000"/>
               </a:lnSpc>
             </a:pPr>
-            <a:fld id="{9231D134-F6B3-4E16-B88E-5DB7AC7AD993}" type="slidenum">
+            <a:fld id="{A257CDF9-DDE6-42E5-B4DE-0CAEFD8BB5F1}" type="slidenum">
               <a:rPr b="0" lang="en-GB" sz="1400" spc="-1" strike="noStrike">
                 <a:solidFill>
                   <a:srgbClr val="ffffff"/>
@@ -4660,9 +4651,9 @@
                 <a:latin typeface="Arial"/>
                 <a:ea typeface="DejaVu Sans"/>
               </a:rPr>
-              <a:t>3</a:t>
+              <a:t>&lt;number&gt;</a:t>
             </a:fld>
-            <a:endParaRPr b="0" lang="en-US" sz="1400" spc="-1" strike="noStrike">
+            <a:endParaRPr b="0" lang="fr-CH" sz="1400" spc="-1" strike="noStrike">
               <a:latin typeface="Arial"/>
             </a:endParaRPr>
           </a:p>
@@ -4677,7 +4668,7 @@
         <p:spPr>
           <a:xfrm>
             <a:off x="228600" y="228600"/>
-            <a:ext cx="11517120" cy="5257800"/>
+            <a:ext cx="11516760" cy="5257440"/>
           </a:xfrm>
           <a:prstGeom prst="rect">
             <a:avLst/>
@@ -4706,7 +4697,7 @@
                 <a:spcPts val="1417"/>
               </a:spcBef>
             </a:pPr>
-            <a:endParaRPr b="0" lang="en-US" sz="2600" spc="-1" strike="noStrike">
+            <a:endParaRPr b="0" lang="fr-CH" sz="1800" spc="-1" strike="noStrike">
               <a:latin typeface="Arial"/>
             </a:endParaRPr>
           </a:p>
@@ -4719,7 +4710,7 @@
                 <a:spcPts val="1417"/>
               </a:spcBef>
             </a:pPr>
-            <a:endParaRPr b="0" lang="en-US" sz="2600" spc="-1" strike="noStrike">
+            <a:endParaRPr b="0" lang="fr-CH" sz="1800" spc="-1" strike="noStrike">
               <a:latin typeface="Arial"/>
             </a:endParaRPr>
           </a:p>
@@ -4732,12 +4723,12 @@
                 <a:spcPts val="1417"/>
               </a:spcBef>
             </a:pPr>
-            <a:endParaRPr b="0" lang="en-US" sz="2600" spc="-1" strike="noStrike">
-              <a:latin typeface="Arial"/>
-            </a:endParaRPr>
-          </a:p>
-          <a:p>
-            <a:pPr marL="432000" indent="-321480">
+            <a:endParaRPr b="0" lang="fr-CH" sz="1800" spc="-1" strike="noStrike">
+              <a:latin typeface="Arial"/>
+            </a:endParaRPr>
+          </a:p>
+          <a:p>
+            <a:pPr marL="432000" indent="-321120">
               <a:lnSpc>
                 <a:spcPct val="100000"/>
               </a:lnSpc>
@@ -4761,12 +4752,12 @@
               </a:rPr>
               <a:t>Arduino MKR Wifi 1010 : Code et connectique réseau</a:t>
             </a:r>
-            <a:endParaRPr b="0" lang="en-US" sz="2600" spc="-1" strike="noStrike">
-              <a:latin typeface="Arial"/>
-            </a:endParaRPr>
-          </a:p>
-          <a:p>
-            <a:pPr marL="432000" indent="-321480">
+            <a:endParaRPr b="0" lang="fr-CH" sz="2600" spc="-1" strike="noStrike">
+              <a:latin typeface="Arial"/>
+            </a:endParaRPr>
+          </a:p>
+          <a:p>
+            <a:pPr marL="432000" indent="-321120">
               <a:lnSpc>
                 <a:spcPct val="100000"/>
               </a:lnSpc>
@@ -4790,12 +4781,12 @@
               </a:rPr>
               <a:t>Arduino MKR IOT Carrier : Senseurs et actuateurs</a:t>
             </a:r>
-            <a:endParaRPr b="0" lang="en-US" sz="2600" spc="-1" strike="noStrike">
-              <a:latin typeface="Arial"/>
-            </a:endParaRPr>
-          </a:p>
-          <a:p>
-            <a:pPr lvl="2" marL="648000" indent="-216000">
+            <a:endParaRPr b="0" lang="fr-CH" sz="2600" spc="-1" strike="noStrike">
+              <a:latin typeface="Arial"/>
+            </a:endParaRPr>
+          </a:p>
+          <a:p>
+            <a:pPr lvl="2" marL="648000" indent="-215640">
               <a:lnSpc>
                 <a:spcPct val="100000"/>
               </a:lnSpc>
@@ -4819,12 +4810,12 @@
               </a:rPr>
               <a:t>Humidité</a:t>
             </a:r>
-            <a:endParaRPr b="0" lang="en-US" sz="2600" spc="-1" strike="noStrike">
-              <a:latin typeface="Arial"/>
-            </a:endParaRPr>
-          </a:p>
-          <a:p>
-            <a:pPr lvl="2" marL="648000" indent="-216000">
+            <a:endParaRPr b="0" lang="fr-CH" sz="2600" spc="-1" strike="noStrike">
+              <a:latin typeface="Arial"/>
+            </a:endParaRPr>
+          </a:p>
+          <a:p>
+            <a:pPr lvl="2" marL="648000" indent="-215640">
               <a:lnSpc>
                 <a:spcPct val="100000"/>
               </a:lnSpc>
@@ -4848,12 +4839,12 @@
               </a:rPr>
               <a:t>Lumière</a:t>
             </a:r>
-            <a:endParaRPr b="0" lang="en-US" sz="2600" spc="-1" strike="noStrike">
-              <a:latin typeface="Arial"/>
-            </a:endParaRPr>
-          </a:p>
-          <a:p>
-            <a:pPr lvl="2" marL="648000" indent="-216000">
+            <a:endParaRPr b="0" lang="fr-CH" sz="2600" spc="-1" strike="noStrike">
+              <a:latin typeface="Arial"/>
+            </a:endParaRPr>
+          </a:p>
+          <a:p>
+            <a:pPr lvl="2" marL="648000" indent="-215640">
               <a:lnSpc>
                 <a:spcPct val="100000"/>
               </a:lnSpc>
@@ -4877,12 +4868,12 @@
               </a:rPr>
               <a:t>Température</a:t>
             </a:r>
-            <a:endParaRPr b="0" lang="en-US" sz="2600" spc="-1" strike="noStrike">
-              <a:latin typeface="Arial"/>
-            </a:endParaRPr>
-          </a:p>
-          <a:p>
-            <a:pPr lvl="2" marL="648000" indent="-216000">
+            <a:endParaRPr b="0" lang="fr-CH" sz="2600" spc="-1" strike="noStrike">
+              <a:latin typeface="Arial"/>
+            </a:endParaRPr>
+          </a:p>
+          <a:p>
+            <a:pPr lvl="2" marL="648000" indent="-215640">
               <a:lnSpc>
                 <a:spcPct val="100000"/>
               </a:lnSpc>
@@ -4906,12 +4897,12 @@
               </a:rPr>
               <a:t>Humidité du sol</a:t>
             </a:r>
-            <a:endParaRPr b="0" lang="en-US" sz="2600" spc="-1" strike="noStrike">
-              <a:latin typeface="Arial"/>
-            </a:endParaRPr>
-          </a:p>
-          <a:p>
-            <a:pPr lvl="2" marL="648000" indent="-216000">
+            <a:endParaRPr b="0" lang="fr-CH" sz="2600" spc="-1" strike="noStrike">
+              <a:latin typeface="Arial"/>
+            </a:endParaRPr>
+          </a:p>
+          <a:p>
+            <a:pPr lvl="2" marL="648000" indent="-215640">
               <a:lnSpc>
                 <a:spcPct val="100000"/>
               </a:lnSpc>
@@ -4935,12 +4926,12 @@
               </a:rPr>
               <a:t>Ventilateur</a:t>
             </a:r>
-            <a:endParaRPr b="0" lang="en-US" sz="2600" spc="-1" strike="noStrike">
-              <a:latin typeface="Arial"/>
-            </a:endParaRPr>
-          </a:p>
-          <a:p>
-            <a:pPr lvl="2" marL="648000" indent="-216000">
+            <a:endParaRPr b="0" lang="fr-CH" sz="2600" spc="-1" strike="noStrike">
+              <a:latin typeface="Arial"/>
+            </a:endParaRPr>
+          </a:p>
+          <a:p>
+            <a:pPr lvl="2" marL="648000" indent="-215640">
               <a:lnSpc>
                 <a:spcPct val="100000"/>
               </a:lnSpc>
@@ -4964,12 +4955,12 @@
               </a:rPr>
               <a:t>Écran</a:t>
             </a:r>
-            <a:endParaRPr b="0" lang="en-US" sz="2600" spc="-1" strike="noStrike">
-              <a:latin typeface="Arial"/>
-            </a:endParaRPr>
-          </a:p>
-          <a:p>
-            <a:pPr lvl="1" marL="432000" indent="-216000">
+            <a:endParaRPr b="0" lang="fr-CH" sz="2600" spc="-1" strike="noStrike">
+              <a:latin typeface="Arial"/>
+            </a:endParaRPr>
+          </a:p>
+          <a:p>
+            <a:pPr lvl="1" marL="432000" indent="-215640">
               <a:lnSpc>
                 <a:spcPct val="100000"/>
               </a:lnSpc>
@@ -4993,7 +4984,7 @@
               </a:rPr>
               <a:t>Raspberry Pi 4b : MQTT, InfluxDB, Telegraf, Interface Web</a:t>
             </a:r>
-            <a:endParaRPr b="0" lang="en-US" sz="2600" spc="-1" strike="noStrike">
+            <a:endParaRPr b="0" lang="fr-CH" sz="2600" spc="-1" strike="noStrike">
               <a:latin typeface="Arial"/>
             </a:endParaRPr>
           </a:p>
@@ -5006,7 +4997,7 @@
                 <a:spcPts val="1417"/>
               </a:spcBef>
             </a:pPr>
-            <a:endParaRPr b="0" lang="en-US" sz="2600" spc="-1" strike="noStrike">
+            <a:endParaRPr b="0" lang="fr-CH" sz="2600" spc="-1" strike="noStrike">
               <a:latin typeface="Arial"/>
             </a:endParaRPr>
           </a:p>
@@ -5019,7 +5010,7 @@
                 <a:spcPts val="1417"/>
               </a:spcBef>
             </a:pPr>
-            <a:endParaRPr b="0" lang="en-US" sz="2600" spc="-1" strike="noStrike">
+            <a:endParaRPr b="0" lang="fr-CH" sz="2600" spc="-1" strike="noStrike">
               <a:latin typeface="Arial"/>
             </a:endParaRPr>
           </a:p>
@@ -5064,7 +5055,7 @@
         <p:spPr>
           <a:xfrm>
             <a:off x="0" y="0"/>
-            <a:ext cx="12189240" cy="892800"/>
+            <a:ext cx="12188880" cy="892440"/>
           </a:xfrm>
           <a:prstGeom prst="rect">
             <a:avLst/>
@@ -5133,7 +5124,7 @@
         <p:spPr>
           <a:xfrm>
             <a:off x="317520" y="93960"/>
-            <a:ext cx="11535480" cy="699120"/>
+            <a:ext cx="11535120" cy="699120"/>
           </a:xfrm>
           <a:prstGeom prst="rect">
             <a:avLst/>
@@ -5167,9 +5158,9 @@
                 <a:latin typeface="Arial"/>
                 <a:ea typeface="DejaVu Sans"/>
               </a:rPr>
-              <a:t>Architecture</a:t>
+              <a:t>Schéma des communications</a:t>
             </a:r>
-            <a:endParaRPr b="0" lang="en-US" sz="4000" spc="-1" strike="noStrike">
+            <a:endParaRPr b="0" lang="fr-CH" sz="4000" spc="-1" strike="noStrike">
               <a:latin typeface="Arial"/>
             </a:endParaRPr>
           </a:p>
@@ -5184,7 +5175,7 @@
         <p:spPr>
           <a:xfrm>
             <a:off x="3145320" y="6400800"/>
-            <a:ext cx="5898240" cy="317160"/>
+            <a:ext cx="5897880" cy="316800"/>
           </a:xfrm>
           <a:prstGeom prst="rect">
             <a:avLst/>
@@ -5220,7 +5211,7 @@
               </a:rPr>
               <a:t>Présentation du projet IoT, HEIG-VD</a:t>
             </a:r>
-            <a:endParaRPr b="0" lang="en-US" sz="1400" spc="-1" strike="noStrike">
+            <a:endParaRPr b="0" lang="fr-CH" sz="1400" spc="-1" strike="noStrike">
               <a:latin typeface="Arial"/>
             </a:endParaRPr>
           </a:p>
@@ -5235,7 +5226,7 @@
         <p:spPr>
           <a:xfrm>
             <a:off x="11425680" y="6400800"/>
-            <a:ext cx="427320" cy="357840"/>
+            <a:ext cx="426960" cy="357480"/>
           </a:xfrm>
           <a:prstGeom prst="rect">
             <a:avLst/>
@@ -5263,7 +5254,7 @@
                 <a:spcPct val="100000"/>
               </a:lnSpc>
             </a:pPr>
-            <a:fld id="{3BF13543-437A-4686-A937-44A897054E2F}" type="slidenum">
+            <a:fld id="{C13368B3-5486-4CB4-8C78-B307F7A83BC0}" type="slidenum">
               <a:rPr b="0" lang="en-GB" sz="1400" spc="-1" strike="noStrike">
                 <a:solidFill>
                   <a:srgbClr val="ffffff"/>
@@ -5271,9 +5262,9 @@
                 <a:latin typeface="Arial"/>
                 <a:ea typeface="DejaVu Sans"/>
               </a:rPr>
-              <a:t>4</a:t>
+              <a:t>&lt;number&gt;</a:t>
             </a:fld>
-            <a:endParaRPr b="0" lang="en-US" sz="1400" spc="-1" strike="noStrike">
+            <a:endParaRPr b="0" lang="fr-CH" sz="1400" spc="-1" strike="noStrike">
               <a:latin typeface="Arial"/>
             </a:endParaRPr>
           </a:p>
@@ -5287,8 +5278,8 @@
         </p:nvSpPr>
         <p:spPr>
           <a:xfrm>
-            <a:off x="317520" y="1123920"/>
-            <a:ext cx="11517120" cy="5104440"/>
+            <a:off x="228600" y="228600"/>
+            <a:ext cx="11516760" cy="5257440"/>
           </a:xfrm>
           <a:prstGeom prst="rect">
             <a:avLst/>
@@ -5304,31 +5295,309 @@
           <a:effectRef idx="0"/>
           <a:fontRef idx="minor"/>
         </p:style>
-      </p:sp>
-      <p:pic>
-        <p:nvPicPr>
-          <p:cNvPr id="104" name="" descr=""/>
-          <p:cNvPicPr/>
-          <p:nvPr/>
-        </p:nvPicPr>
-        <p:blipFill>
-          <a:blip r:embed="rId1"/>
-          <a:srcRect l="166" t="0" r="0" b="0"/>
-          <a:stretch/>
-        </p:blipFill>
-        <p:spPr>
-          <a:xfrm>
-            <a:off x="1740240" y="1123920"/>
-            <a:ext cx="8654400" cy="4888440"/>
-          </a:xfrm>
-          <a:prstGeom prst="rect">
-            <a:avLst/>
-          </a:prstGeom>
-          <a:ln w="0">
-            <a:noFill/>
-          </a:ln>
-        </p:spPr>
-      </p:pic>
+        <p:txBody>
+          <a:bodyPr lIns="90000" rIns="90000" tIns="45000" bIns="45000">
+            <a:normAutofit fontScale="88000"/>
+          </a:bodyPr>
+          <a:p>
+            <a:pPr>
+              <a:lnSpc>
+                <a:spcPct val="100000"/>
+              </a:lnSpc>
+              <a:spcBef>
+                <a:spcPts val="1417"/>
+              </a:spcBef>
+            </a:pPr>
+            <a:endParaRPr b="0" lang="fr-CH" sz="1800" spc="-1" strike="noStrike">
+              <a:latin typeface="Arial"/>
+            </a:endParaRPr>
+          </a:p>
+          <a:p>
+            <a:pPr>
+              <a:lnSpc>
+                <a:spcPct val="100000"/>
+              </a:lnSpc>
+              <a:spcBef>
+                <a:spcPts val="1417"/>
+              </a:spcBef>
+            </a:pPr>
+            <a:endParaRPr b="0" lang="fr-CH" sz="1800" spc="-1" strike="noStrike">
+              <a:latin typeface="Arial"/>
+            </a:endParaRPr>
+          </a:p>
+          <a:p>
+            <a:pPr>
+              <a:lnSpc>
+                <a:spcPct val="100000"/>
+              </a:lnSpc>
+              <a:spcBef>
+                <a:spcPts val="1417"/>
+              </a:spcBef>
+            </a:pPr>
+            <a:endParaRPr b="0" lang="fr-CH" sz="1800" spc="-1" strike="noStrike">
+              <a:latin typeface="Arial"/>
+            </a:endParaRPr>
+          </a:p>
+          <a:p>
+            <a:pPr marL="432000" indent="-321120">
+              <a:lnSpc>
+                <a:spcPct val="100000"/>
+              </a:lnSpc>
+              <a:spcBef>
+                <a:spcPts val="1417"/>
+              </a:spcBef>
+              <a:buClr>
+                <a:srgbClr val="000000"/>
+              </a:buClr>
+              <a:buSzPct val="45000"/>
+              <a:buFont typeface="Wingdings" charset="2"/>
+              <a:buChar char=""/>
+            </a:pPr>
+            <a:r>
+              <a:rPr b="0" lang="fr-FR" sz="2600" spc="-1" strike="noStrike">
+                <a:solidFill>
+                  <a:srgbClr val="000000"/>
+                </a:solidFill>
+                <a:latin typeface="Calibri"/>
+                <a:ea typeface="DejaVu Sans"/>
+              </a:rPr>
+              <a:t>Publication de la config du device (device) :</a:t>
+            </a:r>
+            <a:endParaRPr b="0" lang="fr-CH" sz="2600" spc="-1" strike="noStrike">
+              <a:latin typeface="Arial"/>
+            </a:endParaRPr>
+          </a:p>
+          <a:p>
+            <a:pPr lvl="2" marL="648000" indent="-216000">
+              <a:lnSpc>
+                <a:spcPct val="100000"/>
+              </a:lnSpc>
+              <a:spcBef>
+                <a:spcPts val="1417"/>
+              </a:spcBef>
+              <a:buClr>
+                <a:srgbClr val="000000"/>
+              </a:buClr>
+              <a:buSzPct val="45000"/>
+              <a:buFont typeface="Wingdings" charset="2"/>
+              <a:buChar char=""/>
+            </a:pPr>
+            <a:r>
+              <a:rPr b="0" lang="fr-FR" sz="2600" spc="-1" strike="noStrike">
+                <a:solidFill>
+                  <a:srgbClr val="000000"/>
+                </a:solidFill>
+                <a:latin typeface="Calibri"/>
+                <a:ea typeface="DejaVu Sans"/>
+              </a:rPr>
+              <a:t>commander/devices/&lt;device id&gt;/</a:t>
+            </a:r>
+            <a:endParaRPr b="0" lang="fr-CH" sz="2600" spc="-1" strike="noStrike">
+              <a:latin typeface="Arial"/>
+            </a:endParaRPr>
+          </a:p>
+          <a:p>
+            <a:pPr marL="432000" indent="-321120">
+              <a:lnSpc>
+                <a:spcPct val="100000"/>
+              </a:lnSpc>
+              <a:spcBef>
+                <a:spcPts val="1417"/>
+              </a:spcBef>
+              <a:buClr>
+                <a:srgbClr val="000000"/>
+              </a:buClr>
+              <a:buSzPct val="45000"/>
+              <a:buFont typeface="Wingdings" charset="2"/>
+              <a:buChar char=""/>
+            </a:pPr>
+            <a:r>
+              <a:rPr b="0" lang="fr-FR" sz="2600" spc="-1" strike="noStrike">
+                <a:solidFill>
+                  <a:srgbClr val="000000"/>
+                </a:solidFill>
+                <a:latin typeface="Calibri"/>
+                <a:ea typeface="DejaVu Sans"/>
+              </a:rPr>
+              <a:t>Publication des modification de configuration (server) :</a:t>
+            </a:r>
+            <a:endParaRPr b="0" lang="fr-CH" sz="2600" spc="-1" strike="noStrike">
+              <a:latin typeface="Arial"/>
+            </a:endParaRPr>
+          </a:p>
+          <a:p>
+            <a:pPr lvl="2" marL="648000" indent="-216000">
+              <a:lnSpc>
+                <a:spcPct val="100000"/>
+              </a:lnSpc>
+              <a:spcBef>
+                <a:spcPts val="1417"/>
+              </a:spcBef>
+              <a:buClr>
+                <a:srgbClr val="000000"/>
+              </a:buClr>
+              <a:buSzPct val="45000"/>
+              <a:buFont typeface="Wingdings" charset="2"/>
+              <a:buChar char=""/>
+            </a:pPr>
+            <a:r>
+              <a:rPr b="0" lang="fr-FR" sz="2600" spc="-1" strike="noStrike">
+                <a:solidFill>
+                  <a:srgbClr val="000000"/>
+                </a:solidFill>
+                <a:latin typeface="Calibri"/>
+                <a:ea typeface="DejaVu Sans"/>
+              </a:rPr>
+              <a:t>commander/devices/&lt;device id&gt;/update</a:t>
+            </a:r>
+            <a:endParaRPr b="0" lang="fr-CH" sz="2600" spc="-1" strike="noStrike">
+              <a:latin typeface="Arial"/>
+            </a:endParaRPr>
+          </a:p>
+          <a:p>
+            <a:pPr marL="432000" indent="-321120">
+              <a:lnSpc>
+                <a:spcPct val="100000"/>
+              </a:lnSpc>
+              <a:spcBef>
+                <a:spcPts val="1417"/>
+              </a:spcBef>
+              <a:buClr>
+                <a:srgbClr val="000000"/>
+              </a:buClr>
+              <a:buSzPct val="45000"/>
+              <a:buFont typeface="Wingdings" charset="2"/>
+              <a:buChar char=""/>
+            </a:pPr>
+            <a:r>
+              <a:rPr b="0" lang="fr-FR" sz="2600" spc="-1" strike="noStrike">
+                <a:solidFill>
+                  <a:srgbClr val="000000"/>
+                </a:solidFill>
+                <a:latin typeface="Calibri"/>
+                <a:ea typeface="DejaVu Sans"/>
+              </a:rPr>
+              <a:t>Réception des config (server) :</a:t>
+            </a:r>
+            <a:endParaRPr b="0" lang="fr-CH" sz="2600" spc="-1" strike="noStrike">
+              <a:latin typeface="Arial"/>
+            </a:endParaRPr>
+          </a:p>
+          <a:p>
+            <a:pPr lvl="2" marL="648000" indent="-216000">
+              <a:lnSpc>
+                <a:spcPct val="100000"/>
+              </a:lnSpc>
+              <a:spcBef>
+                <a:spcPts val="1417"/>
+              </a:spcBef>
+              <a:buClr>
+                <a:srgbClr val="000000"/>
+              </a:buClr>
+              <a:buSzPct val="45000"/>
+              <a:buFont typeface="Wingdings" charset="2"/>
+              <a:buChar char=""/>
+            </a:pPr>
+            <a:r>
+              <a:rPr b="0" lang="fr-FR" sz="2600" spc="-1" strike="noStrike">
+                <a:solidFill>
+                  <a:srgbClr val="000000"/>
+                </a:solidFill>
+                <a:latin typeface="Calibri"/>
+                <a:ea typeface="DejaVu Sans"/>
+              </a:rPr>
+              <a:t>commander/devices/+</a:t>
+            </a:r>
+            <a:endParaRPr b="0" lang="fr-CH" sz="2600" spc="-1" strike="noStrike">
+              <a:latin typeface="Arial"/>
+            </a:endParaRPr>
+          </a:p>
+          <a:p>
+            <a:pPr marL="432000" indent="-321120">
+              <a:lnSpc>
+                <a:spcPct val="100000"/>
+              </a:lnSpc>
+              <a:spcBef>
+                <a:spcPts val="1417"/>
+              </a:spcBef>
+              <a:buClr>
+                <a:srgbClr val="000000"/>
+              </a:buClr>
+              <a:buSzPct val="45000"/>
+              <a:buFont typeface="Wingdings" charset="2"/>
+              <a:buChar char=""/>
+            </a:pPr>
+            <a:r>
+              <a:rPr b="0" lang="fr-FR" sz="2600" spc="-1" strike="noStrike">
+                <a:solidFill>
+                  <a:srgbClr val="000000"/>
+                </a:solidFill>
+                <a:latin typeface="Calibri"/>
+                <a:ea typeface="DejaVu Sans"/>
+              </a:rPr>
+              <a:t>Réception et envoi des données (server et device) :</a:t>
+            </a:r>
+            <a:endParaRPr b="0" lang="fr-CH" sz="2600" spc="-1" strike="noStrike">
+              <a:latin typeface="Arial"/>
+            </a:endParaRPr>
+          </a:p>
+          <a:p>
+            <a:pPr lvl="2" marL="648000" indent="-216000">
+              <a:lnSpc>
+                <a:spcPct val="100000"/>
+              </a:lnSpc>
+              <a:spcBef>
+                <a:spcPts val="1417"/>
+              </a:spcBef>
+              <a:buClr>
+                <a:srgbClr val="000000"/>
+              </a:buClr>
+              <a:buSzPct val="45000"/>
+              <a:buFont typeface="Wingdings" charset="2"/>
+              <a:buChar char=""/>
+            </a:pPr>
+            <a:r>
+              <a:rPr b="0" lang="fr-FR" sz="2600" spc="-1" strike="noStrike">
+                <a:solidFill>
+                  <a:srgbClr val="000000"/>
+                </a:solidFill>
+                <a:latin typeface="Calibri"/>
+                <a:ea typeface="DejaVu Sans"/>
+              </a:rPr>
+              <a:t>arduino/</a:t>
+            </a:r>
+            <a:endParaRPr b="0" lang="fr-CH" sz="2600" spc="-1" strike="noStrike">
+              <a:latin typeface="Arial"/>
+            </a:endParaRPr>
+          </a:p>
+          <a:p>
+            <a:pPr>
+              <a:lnSpc>
+                <a:spcPct val="100000"/>
+              </a:lnSpc>
+              <a:spcBef>
+                <a:spcPts val="1417"/>
+              </a:spcBef>
+            </a:pPr>
+            <a:endParaRPr b="0" lang="fr-CH" sz="2600" spc="-1" strike="noStrike">
+              <a:latin typeface="Arial"/>
+            </a:endParaRPr>
+          </a:p>
+          <a:p>
+            <a:pPr>
+              <a:lnSpc>
+                <a:spcPct val="100000"/>
+              </a:lnSpc>
+              <a:spcBef>
+                <a:spcPts val="1417"/>
+              </a:spcBef>
+            </a:pPr>
+            <a:endParaRPr b="0" lang="fr-CH" sz="2600" spc="-1" strike="noStrike">
+              <a:latin typeface="Arial"/>
+            </a:endParaRPr>
+          </a:p>
+        </p:txBody>
+      </p:sp>
     </p:spTree>
   </p:cSld>
   <mc:AlternateContent>
@@ -5361,14 +5630,14 @@
       </p:grpSpPr>
       <p:sp>
         <p:nvSpPr>
-          <p:cNvPr id="105" name="CustomShape 1"/>
+          <p:cNvPr id="104" name="CustomShape 1"/>
           <p:cNvSpPr/>
           <p:nvPr/>
         </p:nvSpPr>
         <p:spPr>
           <a:xfrm>
             <a:off x="0" y="0"/>
-            <a:ext cx="12189240" cy="892800"/>
+            <a:ext cx="12188880" cy="892440"/>
           </a:xfrm>
           <a:prstGeom prst="rect">
             <a:avLst/>
@@ -5397,7 +5666,7 @@
       </p:sp>
       <p:sp>
         <p:nvSpPr>
-          <p:cNvPr id="106" name="Line 2"/>
+          <p:cNvPr id="105" name="Line 2"/>
           <p:cNvSpPr/>
           <p:nvPr/>
         </p:nvSpPr>
@@ -5430,14 +5699,318 @@
       </p:sp>
       <p:sp>
         <p:nvSpPr>
-          <p:cNvPr id="107" name="CustomShape 3"/>
+          <p:cNvPr id="106" name="CustomShape 3"/>
           <p:cNvSpPr/>
           <p:nvPr/>
         </p:nvSpPr>
         <p:spPr>
           <a:xfrm>
             <a:off x="317520" y="93960"/>
-            <a:ext cx="11535480" cy="699120"/>
+            <a:ext cx="11535120" cy="699120"/>
+          </a:xfrm>
+          <a:prstGeom prst="rect">
+            <a:avLst/>
+          </a:prstGeom>
+          <a:noFill/>
+          <a:ln w="0">
+            <a:noFill/>
+          </a:ln>
+        </p:spPr>
+        <p:style>
+          <a:lnRef idx="0"/>
+          <a:fillRef idx="0"/>
+          <a:effectRef idx="0"/>
+          <a:fontRef idx="minor"/>
+        </p:style>
+        <p:txBody>
+          <a:bodyPr lIns="90000" rIns="90000" tIns="45000" bIns="45000">
+            <a:spAutoFit/>
+          </a:bodyPr>
+          <a:p>
+            <a:pPr>
+              <a:lnSpc>
+                <a:spcPct val="100000"/>
+              </a:lnSpc>
+            </a:pPr>
+            <a:r>
+              <a:rPr b="0" lang="en-GB" sz="4000" spc="180" strike="noStrike">
+                <a:solidFill>
+                  <a:srgbClr val="ffffff"/>
+                </a:solidFill>
+                <a:latin typeface="Arial"/>
+                <a:ea typeface="DejaVu Sans"/>
+              </a:rPr>
+              <a:t>Architecture</a:t>
+            </a:r>
+            <a:endParaRPr b="0" lang="fr-CH" sz="4000" spc="-1" strike="noStrike">
+              <a:latin typeface="Arial"/>
+            </a:endParaRPr>
+          </a:p>
+        </p:txBody>
+      </p:sp>
+      <p:sp>
+        <p:nvSpPr>
+          <p:cNvPr id="107" name="CustomShape 4"/>
+          <p:cNvSpPr/>
+          <p:nvPr/>
+        </p:nvSpPr>
+        <p:spPr>
+          <a:xfrm>
+            <a:off x="3145320" y="6400800"/>
+            <a:ext cx="5897880" cy="316800"/>
+          </a:xfrm>
+          <a:prstGeom prst="rect">
+            <a:avLst/>
+          </a:prstGeom>
+          <a:noFill/>
+          <a:ln w="0">
+            <a:noFill/>
+          </a:ln>
+        </p:spPr>
+        <p:style>
+          <a:lnRef idx="0"/>
+          <a:fillRef idx="0"/>
+          <a:effectRef idx="0"/>
+          <a:fontRef idx="minor"/>
+        </p:style>
+        <p:txBody>
+          <a:bodyPr lIns="90000" rIns="90000" tIns="45000" bIns="45000" anchor="ctr">
+            <a:noAutofit/>
+          </a:bodyPr>
+          <a:p>
+            <a:pPr algn="ctr">
+              <a:lnSpc>
+                <a:spcPct val="100000"/>
+              </a:lnSpc>
+            </a:pPr>
+            <a:r>
+              <a:rPr b="0" lang="fr-CH" sz="1400" spc="-1" strike="noStrike">
+                <a:solidFill>
+                  <a:srgbClr val="8b8b8b"/>
+                </a:solidFill>
+                <a:latin typeface="Arial"/>
+                <a:ea typeface="DejaVu Sans"/>
+              </a:rPr>
+              <a:t>Présentation du projet IoT, HEIG-VD</a:t>
+            </a:r>
+            <a:endParaRPr b="0" lang="fr-CH" sz="1400" spc="-1" strike="noStrike">
+              <a:latin typeface="Arial"/>
+            </a:endParaRPr>
+          </a:p>
+        </p:txBody>
+      </p:sp>
+      <p:sp>
+        <p:nvSpPr>
+          <p:cNvPr id="108" name="CustomShape 5"/>
+          <p:cNvSpPr/>
+          <p:nvPr/>
+        </p:nvSpPr>
+        <p:spPr>
+          <a:xfrm>
+            <a:off x="11425680" y="6400800"/>
+            <a:ext cx="426960" cy="357480"/>
+          </a:xfrm>
+          <a:prstGeom prst="rect">
+            <a:avLst/>
+          </a:prstGeom>
+          <a:solidFill>
+            <a:srgbClr val="229fd8"/>
+          </a:solidFill>
+          <a:ln w="0">
+            <a:noFill/>
+          </a:ln>
+        </p:spPr>
+        <p:style>
+          <a:lnRef idx="0"/>
+          <a:fillRef idx="0"/>
+          <a:effectRef idx="0"/>
+          <a:fontRef idx="minor"/>
+        </p:style>
+        <p:txBody>
+          <a:bodyPr lIns="90000" rIns="90000" tIns="45000" bIns="45000" anchor="ctr">
+            <a:noAutofit/>
+          </a:bodyPr>
+          <a:p>
+            <a:pPr algn="ctr">
+              <a:lnSpc>
+                <a:spcPct val="100000"/>
+              </a:lnSpc>
+            </a:pPr>
+            <a:fld id="{26AD8A76-5D6D-4F0E-AECA-C40A4A6C836E}" type="slidenum">
+              <a:rPr b="0" lang="en-GB" sz="1400" spc="-1" strike="noStrike">
+                <a:solidFill>
+                  <a:srgbClr val="ffffff"/>
+                </a:solidFill>
+                <a:latin typeface="Arial"/>
+                <a:ea typeface="DejaVu Sans"/>
+              </a:rPr>
+              <a:t>&lt;number&gt;</a:t>
+            </a:fld>
+            <a:endParaRPr b="0" lang="fr-CH" sz="1400" spc="-1" strike="noStrike">
+              <a:latin typeface="Arial"/>
+            </a:endParaRPr>
+          </a:p>
+        </p:txBody>
+      </p:sp>
+      <p:sp>
+        <p:nvSpPr>
+          <p:cNvPr id="109" name="CustomShape 6"/>
+          <p:cNvSpPr/>
+          <p:nvPr/>
+        </p:nvSpPr>
+        <p:spPr>
+          <a:xfrm>
+            <a:off x="317520" y="1123920"/>
+            <a:ext cx="11516760" cy="5104080"/>
+          </a:xfrm>
+          <a:prstGeom prst="rect">
+            <a:avLst/>
+          </a:prstGeom>
+          <a:noFill/>
+          <a:ln w="0">
+            <a:noFill/>
+          </a:ln>
+        </p:spPr>
+        <p:style>
+          <a:lnRef idx="0"/>
+          <a:fillRef idx="0"/>
+          <a:effectRef idx="0"/>
+          <a:fontRef idx="minor"/>
+        </p:style>
+      </p:sp>
+      <p:pic>
+        <p:nvPicPr>
+          <p:cNvPr id="110" name="" descr=""/>
+          <p:cNvPicPr/>
+          <p:nvPr/>
+        </p:nvPicPr>
+        <p:blipFill>
+          <a:blip r:embed="rId1"/>
+          <a:srcRect l="166" t="0" r="0" b="0"/>
+          <a:stretch/>
+        </p:blipFill>
+        <p:spPr>
+          <a:xfrm>
+            <a:off x="1740240" y="1123920"/>
+            <a:ext cx="8654040" cy="4888080"/>
+          </a:xfrm>
+          <a:prstGeom prst="rect">
+            <a:avLst/>
+          </a:prstGeom>
+          <a:ln w="0">
+            <a:noFill/>
+          </a:ln>
+        </p:spPr>
+      </p:pic>
+    </p:spTree>
+  </p:cSld>
+  <mc:AlternateContent>
+    <mc:Choice Requires="p14">
+      <p:transition spd="slow" p14:dur="2000"/>
+    </mc:Choice>
+    <mc:Fallback>
+      <p:transition spd="slow"/>
+    </mc:Fallback>
+  </mc:AlternateContent>
+</p:sld>
+</file>
+
+<file path=ppt/slides/slide7.xml><?xml version="1.0" encoding="utf-8"?>
+<p:sld xmlns:a="http://schemas.openxmlformats.org/drawingml/2006/main" xmlns:p="http://schemas.openxmlformats.org/presentationml/2006/main" xmlns:r="http://schemas.openxmlformats.org/officeDocument/2006/relationships" xmlns:p14="http://schemas.microsoft.com/office/powerpoint/2010/main" xmlns:p15="http://schemas.microsoft.com/office/powerpoint/2012/main" xmlns:mc="http://schemas.openxmlformats.org/markup-compatibility/2006">
+  <p:cSld>
+    <p:spTree>
+      <p:nvGrpSpPr>
+        <p:cNvPr id="1" name=""/>
+        <p:cNvGrpSpPr/>
+        <p:nvPr/>
+      </p:nvGrpSpPr>
+      <p:grpSpPr>
+        <a:xfrm>
+          <a:off x="0" y="0"/>
+          <a:ext cx="0" cy="0"/>
+          <a:chOff x="0" y="0"/>
+          <a:chExt cx="0" cy="0"/>
+        </a:xfrm>
+      </p:grpSpPr>
+      <p:sp>
+        <p:nvSpPr>
+          <p:cNvPr id="111" name="CustomShape 1"/>
+          <p:cNvSpPr/>
+          <p:nvPr/>
+        </p:nvSpPr>
+        <p:spPr>
+          <a:xfrm>
+            <a:off x="0" y="0"/>
+            <a:ext cx="12188880" cy="892440"/>
+          </a:xfrm>
+          <a:prstGeom prst="rect">
+            <a:avLst/>
+          </a:prstGeom>
+          <a:solidFill>
+            <a:srgbClr val="009fd8"/>
+          </a:solidFill>
+          <a:ln>
+            <a:noFill/>
+          </a:ln>
+        </p:spPr>
+        <p:style>
+          <a:lnRef idx="2">
+            <a:schemeClr val="accent1">
+              <a:shade val="50000"/>
+            </a:schemeClr>
+          </a:lnRef>
+          <a:fillRef idx="1">
+            <a:schemeClr val="accent1"/>
+          </a:fillRef>
+          <a:effectRef idx="0">
+            <a:schemeClr val="accent1"/>
+          </a:effectRef>
+          <a:fontRef idx="minor"/>
+        </p:style>
+      </p:sp>
+      <p:sp>
+        <p:nvSpPr>
+          <p:cNvPr id="112" name="Line 2"/>
+          <p:cNvSpPr/>
+          <p:nvPr/>
+        </p:nvSpPr>
+        <p:spPr>
+          <a:xfrm>
+            <a:off x="335880" y="6315840"/>
+            <a:ext cx="11520000" cy="0"/>
+          </a:xfrm>
+          <a:prstGeom prst="line">
+            <a:avLst/>
+          </a:prstGeom>
+          <a:ln w="28575">
+            <a:solidFill>
+              <a:srgbClr val="0097ce"/>
+            </a:solidFill>
+          </a:ln>
+        </p:spPr>
+        <p:style>
+          <a:lnRef idx="1">
+            <a:schemeClr val="accent1"/>
+          </a:lnRef>
+          <a:fillRef idx="0">
+            <a:schemeClr val="accent1"/>
+          </a:fillRef>
+          <a:effectRef idx="0">
+            <a:schemeClr val="accent1"/>
+          </a:effectRef>
+          <a:fontRef idx="minor"/>
+        </p:style>
+      </p:sp>
+      <p:sp>
+        <p:nvSpPr>
+          <p:cNvPr id="113" name="CustomShape 3"/>
+          <p:cNvSpPr/>
+          <p:nvPr/>
+        </p:nvSpPr>
+        <p:spPr>
+          <a:xfrm>
+            <a:off x="317520" y="93960"/>
+            <a:ext cx="11535120" cy="699120"/>
           </a:xfrm>
           <a:prstGeom prst="rect">
             <a:avLst/>
@@ -5473,22 +6046,22 @@
               </a:rPr>
               <a:t>Si le temps le permet</a:t>
             </a:r>
-            <a:endParaRPr b="0" lang="en-US" sz="4000" spc="-1" strike="noStrike">
-              <a:latin typeface="Arial"/>
-            </a:endParaRPr>
-          </a:p>
-        </p:txBody>
-      </p:sp>
-      <p:sp>
-        <p:nvSpPr>
-          <p:cNvPr id="108" name="CustomShape 4"/>
+            <a:endParaRPr b="0" lang="fr-CH" sz="4000" spc="-1" strike="noStrike">
+              <a:latin typeface="Arial"/>
+            </a:endParaRPr>
+          </a:p>
+        </p:txBody>
+      </p:sp>
+      <p:sp>
+        <p:nvSpPr>
+          <p:cNvPr id="114" name="CustomShape 4"/>
           <p:cNvSpPr/>
           <p:nvPr/>
         </p:nvSpPr>
         <p:spPr>
           <a:xfrm>
             <a:off x="3145320" y="6400800"/>
-            <a:ext cx="5898240" cy="317160"/>
+            <a:ext cx="5897880" cy="316800"/>
           </a:xfrm>
           <a:prstGeom prst="rect">
             <a:avLst/>
@@ -5524,22 +6097,22 @@
               </a:rPr>
               <a:t>Présentation du projet IoT, HEIG-VD</a:t>
             </a:r>
-            <a:endParaRPr b="0" lang="en-US" sz="1400" spc="-1" strike="noStrike">
-              <a:latin typeface="Arial"/>
-            </a:endParaRPr>
-          </a:p>
-        </p:txBody>
-      </p:sp>
-      <p:sp>
-        <p:nvSpPr>
-          <p:cNvPr id="109" name="CustomShape 5"/>
+            <a:endParaRPr b="0" lang="fr-CH" sz="1400" spc="-1" strike="noStrike">
+              <a:latin typeface="Arial"/>
+            </a:endParaRPr>
+          </a:p>
+        </p:txBody>
+      </p:sp>
+      <p:sp>
+        <p:nvSpPr>
+          <p:cNvPr id="115" name="CustomShape 5"/>
           <p:cNvSpPr/>
           <p:nvPr/>
         </p:nvSpPr>
         <p:spPr>
           <a:xfrm>
             <a:off x="11425680" y="6400800"/>
-            <a:ext cx="427320" cy="357840"/>
+            <a:ext cx="426960" cy="357480"/>
           </a:xfrm>
           <a:prstGeom prst="rect">
             <a:avLst/>
@@ -5567,7 +6140,7 @@
                 <a:spcPct val="100000"/>
               </a:lnSpc>
             </a:pPr>
-            <a:fld id="{9CAC0424-DBB1-43A7-B49E-97F793557A6C}" type="slidenum">
+            <a:fld id="{D60742A4-762F-4748-BCA5-52EF14216008}" type="slidenum">
               <a:rPr b="0" lang="en-GB" sz="1400" spc="-1" strike="noStrike">
                 <a:solidFill>
                   <a:srgbClr val="ffffff"/>
@@ -5575,24 +6148,24 @@
                 <a:latin typeface="Arial"/>
                 <a:ea typeface="DejaVu Sans"/>
               </a:rPr>
-              <a:t>4</a:t>
+              <a:t>&lt;number&gt;</a:t>
             </a:fld>
-            <a:endParaRPr b="0" lang="en-US" sz="1400" spc="-1" strike="noStrike">
-              <a:latin typeface="Arial"/>
-            </a:endParaRPr>
-          </a:p>
-        </p:txBody>
-      </p:sp>
-      <p:sp>
-        <p:nvSpPr>
-          <p:cNvPr id="110" name="CustomShape 6"/>
+            <a:endParaRPr b="0" lang="fr-CH" sz="1400" spc="-1" strike="noStrike">
+              <a:latin typeface="Arial"/>
+            </a:endParaRPr>
+          </a:p>
+        </p:txBody>
+      </p:sp>
+      <p:sp>
+        <p:nvSpPr>
+          <p:cNvPr id="116" name="CustomShape 6"/>
           <p:cNvSpPr/>
           <p:nvPr/>
         </p:nvSpPr>
         <p:spPr>
           <a:xfrm>
             <a:off x="317520" y="1123920"/>
-            <a:ext cx="11517120" cy="5104440"/>
+            <a:ext cx="11516760" cy="5104080"/>
           </a:xfrm>
           <a:prstGeom prst="rect">
             <a:avLst/>

</xml_diff>

<commit_message>
Add exemples of communication
</commit_message>
<xml_diff>
--- a/IOT_projet_final_CokeMbayoSalhi.pptx
+++ b/IOT_projet_final_CokeMbayoSalhi.pptx
@@ -3465,7 +3465,7 @@
                 <a:spcPct val="100000"/>
               </a:lnSpc>
             </a:pPr>
-            <a:fld id="{15625AA4-0481-40B8-929F-B82023F61B0B}" type="slidenum">
+            <a:fld id="{29E46EFE-5DE0-4661-AE7B-EB952E82CBB5}" type="slidenum">
               <a:rPr b="0" lang="fr-FR" sz="1200" spc="-1" strike="noStrike">
                 <a:solidFill>
                   <a:srgbClr val="8b8b8b"/>
@@ -3952,7 +3952,7 @@
                 <a:spcPct val="100000"/>
               </a:lnSpc>
             </a:pPr>
-            <a:fld id="{E010E5FC-48BD-48D1-81BA-FA4E4629BF20}" type="slidenum">
+            <a:fld id="{F1EC91D8-CFA4-4A5B-8734-693682A4CA7D}" type="slidenum">
               <a:rPr b="0" lang="en-GB" sz="1400" spc="-1" strike="noStrike">
                 <a:solidFill>
                   <a:srgbClr val="ffffff"/>
@@ -4206,7 +4206,7 @@
                 <a:spcPct val="100000"/>
               </a:lnSpc>
             </a:pPr>
-            <a:fld id="{20CD251C-B9D7-45FA-87FD-E4B0A0C0DDC2}" type="slidenum">
+            <a:fld id="{A2CA0AEE-96C5-4665-B6E5-2C6EF43676EE}" type="slidenum">
               <a:rPr b="0" lang="en-GB" sz="1400" spc="-1" strike="noStrike">
                 <a:solidFill>
                   <a:srgbClr val="ffffff"/>
@@ -4643,7 +4643,7 @@
                 <a:spcPct val="100000"/>
               </a:lnSpc>
             </a:pPr>
-            <a:fld id="{A257CDF9-DDE6-42E5-B4DE-0CAEFD8BB5F1}" type="slidenum">
+            <a:fld id="{7716B2CB-3140-4331-8C84-E816A3C132B4}" type="slidenum">
               <a:rPr b="0" lang="en-GB" sz="1400" spc="-1" strike="noStrike">
                 <a:solidFill>
                   <a:srgbClr val="ffffff"/>
@@ -4651,7 +4651,7 @@
                 <a:latin typeface="Arial"/>
                 <a:ea typeface="DejaVu Sans"/>
               </a:rPr>
-              <a:t>&lt;number&gt;</a:t>
+              <a:t>3</a:t>
             </a:fld>
             <a:endParaRPr b="0" lang="fr-CH" sz="1400" spc="-1" strike="noStrike">
               <a:latin typeface="Arial"/>
@@ -5254,7 +5254,7 @@
                 <a:spcPct val="100000"/>
               </a:lnSpc>
             </a:pPr>
-            <a:fld id="{C13368B3-5486-4CB4-8C78-B307F7A83BC0}" type="slidenum">
+            <a:fld id="{D01037BE-F1A0-41C9-AD07-BB0C7580675D}" type="slidenum">
               <a:rPr b="0" lang="en-GB" sz="1400" spc="-1" strike="noStrike">
                 <a:solidFill>
                   <a:srgbClr val="ffffff"/>
@@ -5262,7 +5262,7 @@
                 <a:latin typeface="Arial"/>
                 <a:ea typeface="DejaVu Sans"/>
               </a:rPr>
-              <a:t>&lt;number&gt;</a:t>
+              <a:t>4</a:t>
             </a:fld>
             <a:endParaRPr b="0" lang="fr-CH" sz="1400" spc="-1" strike="noStrike">
               <a:latin typeface="Arial"/>
@@ -5279,7 +5279,7 @@
         <p:spPr>
           <a:xfrm>
             <a:off x="228600" y="228600"/>
-            <a:ext cx="11516760" cy="5257440"/>
+            <a:ext cx="11651400" cy="5257440"/>
           </a:xfrm>
           <a:prstGeom prst="rect">
             <a:avLst/>
@@ -5297,7 +5297,7 @@
         </p:style>
         <p:txBody>
           <a:bodyPr lIns="90000" rIns="90000" tIns="45000" bIns="45000">
-            <a:normAutofit fontScale="88000"/>
+            <a:normAutofit fontScale="66000"/>
           </a:bodyPr>
           <a:p>
             <a:pPr>
@@ -5397,6 +5397,35 @@
             </a:endParaRPr>
           </a:p>
           <a:p>
+            <a:pPr lvl="2" marL="648000" indent="-216000">
+              <a:lnSpc>
+                <a:spcPct val="100000"/>
+              </a:lnSpc>
+              <a:spcBef>
+                <a:spcPts val="1417"/>
+              </a:spcBef>
+              <a:buClr>
+                <a:srgbClr val="000000"/>
+              </a:buClr>
+              <a:buSzPct val="45000"/>
+              <a:buFont typeface="Wingdings" charset="2"/>
+              <a:buChar char=""/>
+            </a:pPr>
+            <a:r>
+              <a:rPr b="0" i="1" lang="fr-FR" sz="2200" spc="-1" strike="noStrike">
+                <a:solidFill>
+                  <a:srgbClr val="000000"/>
+                </a:solidFill>
+                <a:latin typeface="Calibri"/>
+                <a:ea typeface="DejaVu Sans"/>
+              </a:rPr>
+              <a:t>{"deviceUID":"32203593719188","deviceLocation":"serre_1","measurement interval":3000,"sensors":["humidity","temperature","light"],"actions":""}</a:t>
+            </a:r>
+            <a:endParaRPr b="0" lang="fr-CH" sz="2200" spc="-1" strike="noStrike">
+              <a:latin typeface="Arial"/>
+            </a:endParaRPr>
+          </a:p>
+          <a:p>
             <a:pPr marL="432000" indent="-321120">
               <a:lnSpc>
                 <a:spcPct val="100000"/>
@@ -5419,7 +5448,7 @@
                 <a:latin typeface="Calibri"/>
                 <a:ea typeface="DejaVu Sans"/>
               </a:rPr>
-              <a:t>Publication des modification de configuration (server) :</a:t>
+              <a:t>Publication des modifications de configuration (server) :</a:t>
             </a:r>
             <a:endParaRPr b="0" lang="fr-CH" sz="2600" spc="-1" strike="noStrike">
               <a:latin typeface="Arial"/>
@@ -5477,7 +5506,7 @@
                 <a:latin typeface="Calibri"/>
                 <a:ea typeface="DejaVu Sans"/>
               </a:rPr>
-              <a:t>Réception des config (server) :</a:t>
+              <a:t>Réception des configs (server) :</a:t>
             </a:r>
             <a:endParaRPr b="0" lang="fr-CH" sz="2600" spc="-1" strike="noStrike">
               <a:latin typeface="Arial"/>
@@ -5571,6 +5600,35 @@
             </a:endParaRPr>
           </a:p>
           <a:p>
+            <a:pPr lvl="2" marL="648000" indent="-216000">
+              <a:lnSpc>
+                <a:spcPct val="100000"/>
+              </a:lnSpc>
+              <a:spcBef>
+                <a:spcPts val="1417"/>
+              </a:spcBef>
+              <a:buClr>
+                <a:srgbClr val="000000"/>
+              </a:buClr>
+              <a:buSzPct val="45000"/>
+              <a:buFont typeface="Wingdings" charset="2"/>
+              <a:buChar char=""/>
+            </a:pPr>
+            <a:r>
+              <a:rPr b="0" i="1" lang="fr-FR" sz="2200" spc="-1" strike="noStrike">
+                <a:solidFill>
+                  <a:srgbClr val="000000"/>
+                </a:solidFill>
+                <a:latin typeface="Calibri"/>
+                <a:ea typeface="DejaVu Sans"/>
+              </a:rPr>
+              <a:t>humidity,device="32203593719188",location="serre_1" value="48.57"</a:t>
+            </a:r>
+            <a:endParaRPr b="0" lang="fr-CH" sz="2200" spc="-1" strike="noStrike">
+              <a:latin typeface="Arial"/>
+            </a:endParaRPr>
+          </a:p>
+          <a:p>
             <a:pPr>
               <a:lnSpc>
                 <a:spcPct val="100000"/>
@@ -5579,7 +5637,7 @@
                 <a:spcPts val="1417"/>
               </a:spcBef>
             </a:pPr>
-            <a:endParaRPr b="0" lang="fr-CH" sz="2600" spc="-1" strike="noStrike">
+            <a:endParaRPr b="0" lang="fr-CH" sz="2200" spc="-1" strike="noStrike">
               <a:latin typeface="Arial"/>
             </a:endParaRPr>
           </a:p>
@@ -5592,7 +5650,7 @@
                 <a:spcPts val="1417"/>
               </a:spcBef>
             </a:pPr>
-            <a:endParaRPr b="0" lang="fr-CH" sz="2600" spc="-1" strike="noStrike">
+            <a:endParaRPr b="0" lang="fr-CH" sz="2200" spc="-1" strike="noStrike">
               <a:latin typeface="Arial"/>
             </a:endParaRPr>
           </a:p>
@@ -5836,7 +5894,7 @@
                 <a:spcPct val="100000"/>
               </a:lnSpc>
             </a:pPr>
-            <a:fld id="{26AD8A76-5D6D-4F0E-AECA-C40A4A6C836E}" type="slidenum">
+            <a:fld id="{3285E9F7-66BF-4361-8D9C-C4D12B4EAF4D}" type="slidenum">
               <a:rPr b="0" lang="en-GB" sz="1400" spc="-1" strike="noStrike">
                 <a:solidFill>
                   <a:srgbClr val="ffffff"/>
@@ -5844,7 +5902,7 @@
                 <a:latin typeface="Arial"/>
                 <a:ea typeface="DejaVu Sans"/>
               </a:rPr>
-              <a:t>&lt;number&gt;</a:t>
+              <a:t>5</a:t>
             </a:fld>
             <a:endParaRPr b="0" lang="fr-CH" sz="1400" spc="-1" strike="noStrike">
               <a:latin typeface="Arial"/>
@@ -6140,7 +6198,7 @@
                 <a:spcPct val="100000"/>
               </a:lnSpc>
             </a:pPr>
-            <a:fld id="{D60742A4-762F-4748-BCA5-52EF14216008}" type="slidenum">
+            <a:fld id="{D4E070C4-ECE9-483F-BA8C-ADD44889D20E}" type="slidenum">
               <a:rPr b="0" lang="en-GB" sz="1400" spc="-1" strike="noStrike">
                 <a:solidFill>
                   <a:srgbClr val="ffffff"/>

</xml_diff>

<commit_message>
Add pres and figures
</commit_message>
<xml_diff>
--- a/IOT_projet_final_CokeMbayoSalhi.pptx
+++ b/IOT_projet_final_CokeMbayoSalhi.pptx
@@ -83,7 +83,7 @@
           </a:bodyPr>
           <a:p>
             <a:pPr algn="ctr"/>
-            <a:endParaRPr b="0" lang="fr-CH" sz="4400" spc="-1" strike="noStrike">
+            <a:endParaRPr b="0" lang="en-US" sz="4400" spc="-1" strike="noStrike">
               <a:latin typeface="Arial"/>
             </a:endParaRPr>
           </a:p>
@@ -113,7 +113,7 @@
             <a:normAutofit/>
           </a:bodyPr>
           <a:p>
-            <a:endParaRPr b="0" lang="fr-CH" sz="3200" spc="-1" strike="noStrike">
+            <a:endParaRPr b="0" lang="en-US" sz="3200" spc="-1" strike="noStrike">
               <a:latin typeface="Arial"/>
             </a:endParaRPr>
           </a:p>
@@ -143,7 +143,7 @@
             <a:normAutofit/>
           </a:bodyPr>
           <a:p>
-            <a:endParaRPr b="0" lang="fr-CH" sz="3200" spc="-1" strike="noStrike">
+            <a:endParaRPr b="0" lang="en-US" sz="3200" spc="-1" strike="noStrike">
               <a:latin typeface="Arial"/>
             </a:endParaRPr>
           </a:p>
@@ -196,7 +196,7 @@
           </a:bodyPr>
           <a:p>
             <a:pPr algn="ctr"/>
-            <a:endParaRPr b="0" lang="fr-CH" sz="4400" spc="-1" strike="noStrike">
+            <a:endParaRPr b="0" lang="en-US" sz="4400" spc="-1" strike="noStrike">
               <a:latin typeface="Arial"/>
             </a:endParaRPr>
           </a:p>
@@ -226,7 +226,7 @@
             <a:normAutofit/>
           </a:bodyPr>
           <a:p>
-            <a:endParaRPr b="0" lang="fr-CH" sz="3200" spc="-1" strike="noStrike">
+            <a:endParaRPr b="0" lang="en-US" sz="3200" spc="-1" strike="noStrike">
               <a:latin typeface="Arial"/>
             </a:endParaRPr>
           </a:p>
@@ -256,7 +256,7 @@
             <a:normAutofit/>
           </a:bodyPr>
           <a:p>
-            <a:endParaRPr b="0" lang="fr-CH" sz="3200" spc="-1" strike="noStrike">
+            <a:endParaRPr b="0" lang="en-US" sz="3200" spc="-1" strike="noStrike">
               <a:latin typeface="Arial"/>
             </a:endParaRPr>
           </a:p>
@@ -286,7 +286,7 @@
             <a:normAutofit/>
           </a:bodyPr>
           <a:p>
-            <a:endParaRPr b="0" lang="fr-CH" sz="3200" spc="-1" strike="noStrike">
+            <a:endParaRPr b="0" lang="en-US" sz="3200" spc="-1" strike="noStrike">
               <a:latin typeface="Arial"/>
             </a:endParaRPr>
           </a:p>
@@ -316,7 +316,7 @@
             <a:normAutofit/>
           </a:bodyPr>
           <a:p>
-            <a:endParaRPr b="0" lang="fr-CH" sz="3200" spc="-1" strike="noStrike">
+            <a:endParaRPr b="0" lang="en-US" sz="3200" spc="-1" strike="noStrike">
               <a:latin typeface="Arial"/>
             </a:endParaRPr>
           </a:p>
@@ -369,7 +369,7 @@
           </a:bodyPr>
           <a:p>
             <a:pPr algn="ctr"/>
-            <a:endParaRPr b="0" lang="fr-CH" sz="4400" spc="-1" strike="noStrike">
+            <a:endParaRPr b="0" lang="en-US" sz="4400" spc="-1" strike="noStrike">
               <a:latin typeface="Arial"/>
             </a:endParaRPr>
           </a:p>
@@ -399,7 +399,7 @@
             <a:normAutofit/>
           </a:bodyPr>
           <a:p>
-            <a:endParaRPr b="0" lang="fr-CH" sz="3200" spc="-1" strike="noStrike">
+            <a:endParaRPr b="0" lang="en-US" sz="3200" spc="-1" strike="noStrike">
               <a:latin typeface="Arial"/>
             </a:endParaRPr>
           </a:p>
@@ -429,7 +429,7 @@
             <a:normAutofit/>
           </a:bodyPr>
           <a:p>
-            <a:endParaRPr b="0" lang="fr-CH" sz="3200" spc="-1" strike="noStrike">
+            <a:endParaRPr b="0" lang="en-US" sz="3200" spc="-1" strike="noStrike">
               <a:latin typeface="Arial"/>
             </a:endParaRPr>
           </a:p>
@@ -459,7 +459,7 @@
             <a:normAutofit/>
           </a:bodyPr>
           <a:p>
-            <a:endParaRPr b="0" lang="fr-CH" sz="3200" spc="-1" strike="noStrike">
+            <a:endParaRPr b="0" lang="en-US" sz="3200" spc="-1" strike="noStrike">
               <a:latin typeface="Arial"/>
             </a:endParaRPr>
           </a:p>
@@ -489,7 +489,7 @@
             <a:normAutofit/>
           </a:bodyPr>
           <a:p>
-            <a:endParaRPr b="0" lang="fr-CH" sz="3200" spc="-1" strike="noStrike">
+            <a:endParaRPr b="0" lang="en-US" sz="3200" spc="-1" strike="noStrike">
               <a:latin typeface="Arial"/>
             </a:endParaRPr>
           </a:p>
@@ -519,7 +519,7 @@
             <a:normAutofit/>
           </a:bodyPr>
           <a:p>
-            <a:endParaRPr b="0" lang="fr-CH" sz="3200" spc="-1" strike="noStrike">
+            <a:endParaRPr b="0" lang="en-US" sz="3200" spc="-1" strike="noStrike">
               <a:latin typeface="Arial"/>
             </a:endParaRPr>
           </a:p>
@@ -549,7 +549,7 @@
             <a:normAutofit/>
           </a:bodyPr>
           <a:p>
-            <a:endParaRPr b="0" lang="fr-CH" sz="3200" spc="-1" strike="noStrike">
+            <a:endParaRPr b="0" lang="en-US" sz="3200" spc="-1" strike="noStrike">
               <a:latin typeface="Arial"/>
             </a:endParaRPr>
           </a:p>
@@ -624,7 +624,7 @@
           </a:bodyPr>
           <a:p>
             <a:pPr algn="ctr"/>
-            <a:endParaRPr b="0" lang="fr-CH" sz="4400" spc="-1" strike="noStrike">
+            <a:endParaRPr b="0" lang="en-US" sz="4400" spc="-1" strike="noStrike">
               <a:latin typeface="Arial"/>
             </a:endParaRPr>
           </a:p>
@@ -655,7 +655,7 @@
           </a:bodyPr>
           <a:p>
             <a:pPr algn="ctr"/>
-            <a:endParaRPr b="0" lang="fr-CH" sz="3200" spc="-1" strike="noStrike">
+            <a:endParaRPr b="0" lang="en-US" sz="3200" spc="-1" strike="noStrike">
               <a:latin typeface="Arial"/>
             </a:endParaRPr>
           </a:p>
@@ -708,7 +708,7 @@
           </a:bodyPr>
           <a:p>
             <a:pPr algn="ctr"/>
-            <a:endParaRPr b="0" lang="fr-CH" sz="4400" spc="-1" strike="noStrike">
+            <a:endParaRPr b="0" lang="en-US" sz="4400" spc="-1" strike="noStrike">
               <a:latin typeface="Arial"/>
             </a:endParaRPr>
           </a:p>
@@ -738,7 +738,7 @@
             <a:normAutofit/>
           </a:bodyPr>
           <a:p>
-            <a:endParaRPr b="0" lang="fr-CH" sz="3200" spc="-1" strike="noStrike">
+            <a:endParaRPr b="0" lang="en-US" sz="3200" spc="-1" strike="noStrike">
               <a:latin typeface="Arial"/>
             </a:endParaRPr>
           </a:p>
@@ -791,7 +791,7 @@
           </a:bodyPr>
           <a:p>
             <a:pPr algn="ctr"/>
-            <a:endParaRPr b="0" lang="fr-CH" sz="4400" spc="-1" strike="noStrike">
+            <a:endParaRPr b="0" lang="en-US" sz="4400" spc="-1" strike="noStrike">
               <a:latin typeface="Arial"/>
             </a:endParaRPr>
           </a:p>
@@ -821,7 +821,7 @@
             <a:normAutofit/>
           </a:bodyPr>
           <a:p>
-            <a:endParaRPr b="0" lang="fr-CH" sz="3200" spc="-1" strike="noStrike">
+            <a:endParaRPr b="0" lang="en-US" sz="3200" spc="-1" strike="noStrike">
               <a:latin typeface="Arial"/>
             </a:endParaRPr>
           </a:p>
@@ -851,7 +851,7 @@
             <a:normAutofit/>
           </a:bodyPr>
           <a:p>
-            <a:endParaRPr b="0" lang="fr-CH" sz="3200" spc="-1" strike="noStrike">
+            <a:endParaRPr b="0" lang="en-US" sz="3200" spc="-1" strike="noStrike">
               <a:latin typeface="Arial"/>
             </a:endParaRPr>
           </a:p>
@@ -904,7 +904,7 @@
           </a:bodyPr>
           <a:p>
             <a:pPr algn="ctr"/>
-            <a:endParaRPr b="0" lang="fr-CH" sz="4400" spc="-1" strike="noStrike">
+            <a:endParaRPr b="0" lang="en-US" sz="4400" spc="-1" strike="noStrike">
               <a:latin typeface="Arial"/>
             </a:endParaRPr>
           </a:p>
@@ -957,7 +957,7 @@
           </a:bodyPr>
           <a:p>
             <a:pPr algn="ctr"/>
-            <a:endParaRPr b="0" lang="fr-CH" sz="3200" spc="-1" strike="noStrike">
+            <a:endParaRPr b="0" lang="en-US" sz="3200" spc="-1" strike="noStrike">
               <a:latin typeface="Arial"/>
             </a:endParaRPr>
           </a:p>
@@ -1010,7 +1010,7 @@
           </a:bodyPr>
           <a:p>
             <a:pPr algn="ctr"/>
-            <a:endParaRPr b="0" lang="fr-CH" sz="4400" spc="-1" strike="noStrike">
+            <a:endParaRPr b="0" lang="en-US" sz="4400" spc="-1" strike="noStrike">
               <a:latin typeface="Arial"/>
             </a:endParaRPr>
           </a:p>
@@ -1040,7 +1040,7 @@
             <a:normAutofit/>
           </a:bodyPr>
           <a:p>
-            <a:endParaRPr b="0" lang="fr-CH" sz="3200" spc="-1" strike="noStrike">
+            <a:endParaRPr b="0" lang="en-US" sz="3200" spc="-1" strike="noStrike">
               <a:latin typeface="Arial"/>
             </a:endParaRPr>
           </a:p>
@@ -1070,7 +1070,7 @@
             <a:normAutofit/>
           </a:bodyPr>
           <a:p>
-            <a:endParaRPr b="0" lang="fr-CH" sz="3200" spc="-1" strike="noStrike">
+            <a:endParaRPr b="0" lang="en-US" sz="3200" spc="-1" strike="noStrike">
               <a:latin typeface="Arial"/>
             </a:endParaRPr>
           </a:p>
@@ -1100,7 +1100,7 @@
             <a:normAutofit/>
           </a:bodyPr>
           <a:p>
-            <a:endParaRPr b="0" lang="fr-CH" sz="3200" spc="-1" strike="noStrike">
+            <a:endParaRPr b="0" lang="en-US" sz="3200" spc="-1" strike="noStrike">
               <a:latin typeface="Arial"/>
             </a:endParaRPr>
           </a:p>
@@ -1153,7 +1153,7 @@
           </a:bodyPr>
           <a:p>
             <a:pPr algn="ctr"/>
-            <a:endParaRPr b="0" lang="fr-CH" sz="4400" spc="-1" strike="noStrike">
+            <a:endParaRPr b="0" lang="en-US" sz="4400" spc="-1" strike="noStrike">
               <a:latin typeface="Arial"/>
             </a:endParaRPr>
           </a:p>
@@ -1184,7 +1184,7 @@
           </a:bodyPr>
           <a:p>
             <a:pPr algn="ctr"/>
-            <a:endParaRPr b="0" lang="fr-CH" sz="3200" spc="-1" strike="noStrike">
+            <a:endParaRPr b="0" lang="en-US" sz="3200" spc="-1" strike="noStrike">
               <a:latin typeface="Arial"/>
             </a:endParaRPr>
           </a:p>
@@ -1237,7 +1237,7 @@
           </a:bodyPr>
           <a:p>
             <a:pPr algn="ctr"/>
-            <a:endParaRPr b="0" lang="fr-CH" sz="4400" spc="-1" strike="noStrike">
+            <a:endParaRPr b="0" lang="en-US" sz="4400" spc="-1" strike="noStrike">
               <a:latin typeface="Arial"/>
             </a:endParaRPr>
           </a:p>
@@ -1267,7 +1267,7 @@
             <a:normAutofit/>
           </a:bodyPr>
           <a:p>
-            <a:endParaRPr b="0" lang="fr-CH" sz="3200" spc="-1" strike="noStrike">
+            <a:endParaRPr b="0" lang="en-US" sz="3200" spc="-1" strike="noStrike">
               <a:latin typeface="Arial"/>
             </a:endParaRPr>
           </a:p>
@@ -1297,7 +1297,7 @@
             <a:normAutofit/>
           </a:bodyPr>
           <a:p>
-            <a:endParaRPr b="0" lang="fr-CH" sz="3200" spc="-1" strike="noStrike">
+            <a:endParaRPr b="0" lang="en-US" sz="3200" spc="-1" strike="noStrike">
               <a:latin typeface="Arial"/>
             </a:endParaRPr>
           </a:p>
@@ -1327,7 +1327,7 @@
             <a:normAutofit/>
           </a:bodyPr>
           <a:p>
-            <a:endParaRPr b="0" lang="fr-CH" sz="3200" spc="-1" strike="noStrike">
+            <a:endParaRPr b="0" lang="en-US" sz="3200" spc="-1" strike="noStrike">
               <a:latin typeface="Arial"/>
             </a:endParaRPr>
           </a:p>
@@ -1380,7 +1380,7 @@
           </a:bodyPr>
           <a:p>
             <a:pPr algn="ctr"/>
-            <a:endParaRPr b="0" lang="fr-CH" sz="4400" spc="-1" strike="noStrike">
+            <a:endParaRPr b="0" lang="en-US" sz="4400" spc="-1" strike="noStrike">
               <a:latin typeface="Arial"/>
             </a:endParaRPr>
           </a:p>
@@ -1410,7 +1410,7 @@
             <a:normAutofit/>
           </a:bodyPr>
           <a:p>
-            <a:endParaRPr b="0" lang="fr-CH" sz="3200" spc="-1" strike="noStrike">
+            <a:endParaRPr b="0" lang="en-US" sz="3200" spc="-1" strike="noStrike">
               <a:latin typeface="Arial"/>
             </a:endParaRPr>
           </a:p>
@@ -1440,7 +1440,7 @@
             <a:normAutofit/>
           </a:bodyPr>
           <a:p>
-            <a:endParaRPr b="0" lang="fr-CH" sz="3200" spc="-1" strike="noStrike">
+            <a:endParaRPr b="0" lang="en-US" sz="3200" spc="-1" strike="noStrike">
               <a:latin typeface="Arial"/>
             </a:endParaRPr>
           </a:p>
@@ -1470,7 +1470,7 @@
             <a:normAutofit/>
           </a:bodyPr>
           <a:p>
-            <a:endParaRPr b="0" lang="fr-CH" sz="3200" spc="-1" strike="noStrike">
+            <a:endParaRPr b="0" lang="en-US" sz="3200" spc="-1" strike="noStrike">
               <a:latin typeface="Arial"/>
             </a:endParaRPr>
           </a:p>
@@ -1523,7 +1523,7 @@
           </a:bodyPr>
           <a:p>
             <a:pPr algn="ctr"/>
-            <a:endParaRPr b="0" lang="fr-CH" sz="4400" spc="-1" strike="noStrike">
+            <a:endParaRPr b="0" lang="en-US" sz="4400" spc="-1" strike="noStrike">
               <a:latin typeface="Arial"/>
             </a:endParaRPr>
           </a:p>
@@ -1553,7 +1553,7 @@
             <a:normAutofit/>
           </a:bodyPr>
           <a:p>
-            <a:endParaRPr b="0" lang="fr-CH" sz="3200" spc="-1" strike="noStrike">
+            <a:endParaRPr b="0" lang="en-US" sz="3200" spc="-1" strike="noStrike">
               <a:latin typeface="Arial"/>
             </a:endParaRPr>
           </a:p>
@@ -1583,7 +1583,7 @@
             <a:normAutofit/>
           </a:bodyPr>
           <a:p>
-            <a:endParaRPr b="0" lang="fr-CH" sz="3200" spc="-1" strike="noStrike">
+            <a:endParaRPr b="0" lang="en-US" sz="3200" spc="-1" strike="noStrike">
               <a:latin typeface="Arial"/>
             </a:endParaRPr>
           </a:p>
@@ -1636,7 +1636,7 @@
           </a:bodyPr>
           <a:p>
             <a:pPr algn="ctr"/>
-            <a:endParaRPr b="0" lang="fr-CH" sz="4400" spc="-1" strike="noStrike">
+            <a:endParaRPr b="0" lang="en-US" sz="4400" spc="-1" strike="noStrike">
               <a:latin typeface="Arial"/>
             </a:endParaRPr>
           </a:p>
@@ -1666,7 +1666,7 @@
             <a:normAutofit/>
           </a:bodyPr>
           <a:p>
-            <a:endParaRPr b="0" lang="fr-CH" sz="3200" spc="-1" strike="noStrike">
+            <a:endParaRPr b="0" lang="en-US" sz="3200" spc="-1" strike="noStrike">
               <a:latin typeface="Arial"/>
             </a:endParaRPr>
           </a:p>
@@ -1696,7 +1696,7 @@
             <a:normAutofit/>
           </a:bodyPr>
           <a:p>
-            <a:endParaRPr b="0" lang="fr-CH" sz="3200" spc="-1" strike="noStrike">
+            <a:endParaRPr b="0" lang="en-US" sz="3200" spc="-1" strike="noStrike">
               <a:latin typeface="Arial"/>
             </a:endParaRPr>
           </a:p>
@@ -1726,7 +1726,7 @@
             <a:normAutofit/>
           </a:bodyPr>
           <a:p>
-            <a:endParaRPr b="0" lang="fr-CH" sz="3200" spc="-1" strike="noStrike">
+            <a:endParaRPr b="0" lang="en-US" sz="3200" spc="-1" strike="noStrike">
               <a:latin typeface="Arial"/>
             </a:endParaRPr>
           </a:p>
@@ -1756,7 +1756,7 @@
             <a:normAutofit/>
           </a:bodyPr>
           <a:p>
-            <a:endParaRPr b="0" lang="fr-CH" sz="3200" spc="-1" strike="noStrike">
+            <a:endParaRPr b="0" lang="en-US" sz="3200" spc="-1" strike="noStrike">
               <a:latin typeface="Arial"/>
             </a:endParaRPr>
           </a:p>
@@ -1809,7 +1809,7 @@
           </a:bodyPr>
           <a:p>
             <a:pPr algn="ctr"/>
-            <a:endParaRPr b="0" lang="fr-CH" sz="4400" spc="-1" strike="noStrike">
+            <a:endParaRPr b="0" lang="en-US" sz="4400" spc="-1" strike="noStrike">
               <a:latin typeface="Arial"/>
             </a:endParaRPr>
           </a:p>
@@ -1839,7 +1839,7 @@
             <a:normAutofit/>
           </a:bodyPr>
           <a:p>
-            <a:endParaRPr b="0" lang="fr-CH" sz="3200" spc="-1" strike="noStrike">
+            <a:endParaRPr b="0" lang="en-US" sz="3200" spc="-1" strike="noStrike">
               <a:latin typeface="Arial"/>
             </a:endParaRPr>
           </a:p>
@@ -1869,7 +1869,7 @@
             <a:normAutofit/>
           </a:bodyPr>
           <a:p>
-            <a:endParaRPr b="0" lang="fr-CH" sz="3200" spc="-1" strike="noStrike">
+            <a:endParaRPr b="0" lang="en-US" sz="3200" spc="-1" strike="noStrike">
               <a:latin typeface="Arial"/>
             </a:endParaRPr>
           </a:p>
@@ -1899,7 +1899,7 @@
             <a:normAutofit/>
           </a:bodyPr>
           <a:p>
-            <a:endParaRPr b="0" lang="fr-CH" sz="3200" spc="-1" strike="noStrike">
+            <a:endParaRPr b="0" lang="en-US" sz="3200" spc="-1" strike="noStrike">
               <a:latin typeface="Arial"/>
             </a:endParaRPr>
           </a:p>
@@ -1929,7 +1929,7 @@
             <a:normAutofit/>
           </a:bodyPr>
           <a:p>
-            <a:endParaRPr b="0" lang="fr-CH" sz="3200" spc="-1" strike="noStrike">
+            <a:endParaRPr b="0" lang="en-US" sz="3200" spc="-1" strike="noStrike">
               <a:latin typeface="Arial"/>
             </a:endParaRPr>
           </a:p>
@@ -1959,7 +1959,7 @@
             <a:normAutofit/>
           </a:bodyPr>
           <a:p>
-            <a:endParaRPr b="0" lang="fr-CH" sz="3200" spc="-1" strike="noStrike">
+            <a:endParaRPr b="0" lang="en-US" sz="3200" spc="-1" strike="noStrike">
               <a:latin typeface="Arial"/>
             </a:endParaRPr>
           </a:p>
@@ -1989,7 +1989,7 @@
             <a:normAutofit/>
           </a:bodyPr>
           <a:p>
-            <a:endParaRPr b="0" lang="fr-CH" sz="3200" spc="-1" strike="noStrike">
+            <a:endParaRPr b="0" lang="en-US" sz="3200" spc="-1" strike="noStrike">
               <a:latin typeface="Arial"/>
             </a:endParaRPr>
           </a:p>
@@ -2042,7 +2042,7 @@
           </a:bodyPr>
           <a:p>
             <a:pPr algn="ctr"/>
-            <a:endParaRPr b="0" lang="fr-CH" sz="4400" spc="-1" strike="noStrike">
+            <a:endParaRPr b="0" lang="en-US" sz="4400" spc="-1" strike="noStrike">
               <a:latin typeface="Arial"/>
             </a:endParaRPr>
           </a:p>
@@ -2072,7 +2072,7 @@
             <a:normAutofit/>
           </a:bodyPr>
           <a:p>
-            <a:endParaRPr b="0" lang="fr-CH" sz="3200" spc="-1" strike="noStrike">
+            <a:endParaRPr b="0" lang="en-US" sz="3200" spc="-1" strike="noStrike">
               <a:latin typeface="Arial"/>
             </a:endParaRPr>
           </a:p>
@@ -2125,7 +2125,7 @@
           </a:bodyPr>
           <a:p>
             <a:pPr algn="ctr"/>
-            <a:endParaRPr b="0" lang="fr-CH" sz="4400" spc="-1" strike="noStrike">
+            <a:endParaRPr b="0" lang="en-US" sz="4400" spc="-1" strike="noStrike">
               <a:latin typeface="Arial"/>
             </a:endParaRPr>
           </a:p>
@@ -2155,7 +2155,7 @@
             <a:normAutofit/>
           </a:bodyPr>
           <a:p>
-            <a:endParaRPr b="0" lang="fr-CH" sz="3200" spc="-1" strike="noStrike">
+            <a:endParaRPr b="0" lang="en-US" sz="3200" spc="-1" strike="noStrike">
               <a:latin typeface="Arial"/>
             </a:endParaRPr>
           </a:p>
@@ -2185,7 +2185,7 @@
             <a:normAutofit/>
           </a:bodyPr>
           <a:p>
-            <a:endParaRPr b="0" lang="fr-CH" sz="3200" spc="-1" strike="noStrike">
+            <a:endParaRPr b="0" lang="en-US" sz="3200" spc="-1" strike="noStrike">
               <a:latin typeface="Arial"/>
             </a:endParaRPr>
           </a:p>
@@ -2238,7 +2238,7 @@
           </a:bodyPr>
           <a:p>
             <a:pPr algn="ctr"/>
-            <a:endParaRPr b="0" lang="fr-CH" sz="4400" spc="-1" strike="noStrike">
+            <a:endParaRPr b="0" lang="en-US" sz="4400" spc="-1" strike="noStrike">
               <a:latin typeface="Arial"/>
             </a:endParaRPr>
           </a:p>
@@ -2291,7 +2291,7 @@
           </a:bodyPr>
           <a:p>
             <a:pPr algn="ctr"/>
-            <a:endParaRPr b="0" lang="fr-CH" sz="3200" spc="-1" strike="noStrike">
+            <a:endParaRPr b="0" lang="en-US" sz="3200" spc="-1" strike="noStrike">
               <a:latin typeface="Arial"/>
             </a:endParaRPr>
           </a:p>
@@ -2344,7 +2344,7 @@
           </a:bodyPr>
           <a:p>
             <a:pPr algn="ctr"/>
-            <a:endParaRPr b="0" lang="fr-CH" sz="4400" spc="-1" strike="noStrike">
+            <a:endParaRPr b="0" lang="en-US" sz="4400" spc="-1" strike="noStrike">
               <a:latin typeface="Arial"/>
             </a:endParaRPr>
           </a:p>
@@ -2374,7 +2374,7 @@
             <a:normAutofit/>
           </a:bodyPr>
           <a:p>
-            <a:endParaRPr b="0" lang="fr-CH" sz="3200" spc="-1" strike="noStrike">
+            <a:endParaRPr b="0" lang="en-US" sz="3200" spc="-1" strike="noStrike">
               <a:latin typeface="Arial"/>
             </a:endParaRPr>
           </a:p>
@@ -2404,7 +2404,7 @@
             <a:normAutofit/>
           </a:bodyPr>
           <a:p>
-            <a:endParaRPr b="0" lang="fr-CH" sz="3200" spc="-1" strike="noStrike">
+            <a:endParaRPr b="0" lang="en-US" sz="3200" spc="-1" strike="noStrike">
               <a:latin typeface="Arial"/>
             </a:endParaRPr>
           </a:p>
@@ -2434,7 +2434,7 @@
             <a:normAutofit/>
           </a:bodyPr>
           <a:p>
-            <a:endParaRPr b="0" lang="fr-CH" sz="3200" spc="-1" strike="noStrike">
+            <a:endParaRPr b="0" lang="en-US" sz="3200" spc="-1" strike="noStrike">
               <a:latin typeface="Arial"/>
             </a:endParaRPr>
           </a:p>
@@ -2487,7 +2487,7 @@
           </a:bodyPr>
           <a:p>
             <a:pPr algn="ctr"/>
-            <a:endParaRPr b="0" lang="fr-CH" sz="4400" spc="-1" strike="noStrike">
+            <a:endParaRPr b="0" lang="en-US" sz="4400" spc="-1" strike="noStrike">
               <a:latin typeface="Arial"/>
             </a:endParaRPr>
           </a:p>
@@ -2517,7 +2517,7 @@
             <a:normAutofit/>
           </a:bodyPr>
           <a:p>
-            <a:endParaRPr b="0" lang="fr-CH" sz="3200" spc="-1" strike="noStrike">
+            <a:endParaRPr b="0" lang="en-US" sz="3200" spc="-1" strike="noStrike">
               <a:latin typeface="Arial"/>
             </a:endParaRPr>
           </a:p>
@@ -2547,7 +2547,7 @@
             <a:normAutofit/>
           </a:bodyPr>
           <a:p>
-            <a:endParaRPr b="0" lang="fr-CH" sz="3200" spc="-1" strike="noStrike">
+            <a:endParaRPr b="0" lang="en-US" sz="3200" spc="-1" strike="noStrike">
               <a:latin typeface="Arial"/>
             </a:endParaRPr>
           </a:p>
@@ -2577,7 +2577,7 @@
             <a:normAutofit/>
           </a:bodyPr>
           <a:p>
-            <a:endParaRPr b="0" lang="fr-CH" sz="3200" spc="-1" strike="noStrike">
+            <a:endParaRPr b="0" lang="en-US" sz="3200" spc="-1" strike="noStrike">
               <a:latin typeface="Arial"/>
             </a:endParaRPr>
           </a:p>
@@ -2630,7 +2630,7 @@
           </a:bodyPr>
           <a:p>
             <a:pPr algn="ctr"/>
-            <a:endParaRPr b="0" lang="fr-CH" sz="4400" spc="-1" strike="noStrike">
+            <a:endParaRPr b="0" lang="en-US" sz="4400" spc="-1" strike="noStrike">
               <a:latin typeface="Arial"/>
             </a:endParaRPr>
           </a:p>
@@ -2660,7 +2660,7 @@
             <a:normAutofit/>
           </a:bodyPr>
           <a:p>
-            <a:endParaRPr b="0" lang="fr-CH" sz="3200" spc="-1" strike="noStrike">
+            <a:endParaRPr b="0" lang="en-US" sz="3200" spc="-1" strike="noStrike">
               <a:latin typeface="Arial"/>
             </a:endParaRPr>
           </a:p>
@@ -2690,7 +2690,7 @@
             <a:normAutofit/>
           </a:bodyPr>
           <a:p>
-            <a:endParaRPr b="0" lang="fr-CH" sz="3200" spc="-1" strike="noStrike">
+            <a:endParaRPr b="0" lang="en-US" sz="3200" spc="-1" strike="noStrike">
               <a:latin typeface="Arial"/>
             </a:endParaRPr>
           </a:p>
@@ -2720,7 +2720,7 @@
             <a:normAutofit/>
           </a:bodyPr>
           <a:p>
-            <a:endParaRPr b="0" lang="fr-CH" sz="3200" spc="-1" strike="noStrike">
+            <a:endParaRPr b="0" lang="en-US" sz="3200" spc="-1" strike="noStrike">
               <a:latin typeface="Arial"/>
             </a:endParaRPr>
           </a:p>
@@ -2781,12 +2781,12 @@
           <a:p>
             <a:pPr algn="ctr"/>
             <a:r>
-              <a:rPr b="0" lang="fr-CH" sz="4400" spc="-1" strike="noStrike">
+              <a:rPr b="0" lang="en-US" sz="4400" spc="-1" strike="noStrike">
                 <a:latin typeface="Arial"/>
               </a:rPr>
               <a:t>Click to edit the title text format</a:t>
             </a:r>
-            <a:endParaRPr b="0" lang="fr-CH" sz="4400" spc="-1" strike="noStrike">
+            <a:endParaRPr b="0" lang="en-US" sz="4400" spc="-1" strike="noStrike">
               <a:latin typeface="Arial"/>
             </a:endParaRPr>
           </a:p>
@@ -2828,12 +2828,12 @@
               <a:buChar char=""/>
             </a:pPr>
             <a:r>
-              <a:rPr b="0" lang="fr-CH" sz="3200" spc="-1" strike="noStrike">
+              <a:rPr b="0" lang="en-US" sz="3200" spc="-1" strike="noStrike">
                 <a:latin typeface="Arial"/>
               </a:rPr>
               <a:t>Click to edit the outline text format</a:t>
             </a:r>
-            <a:endParaRPr b="0" lang="fr-CH" sz="3200" spc="-1" strike="noStrike">
+            <a:endParaRPr b="0" lang="en-US" sz="3200" spc="-1" strike="noStrike">
               <a:latin typeface="Arial"/>
             </a:endParaRPr>
           </a:p>
@@ -2850,12 +2850,12 @@
               <a:buChar char=""/>
             </a:pPr>
             <a:r>
-              <a:rPr b="0" lang="fr-CH" sz="2800" spc="-1" strike="noStrike">
+              <a:rPr b="0" lang="en-US" sz="2800" spc="-1" strike="noStrike">
                 <a:latin typeface="Arial"/>
               </a:rPr>
               <a:t>Second Outline Level</a:t>
             </a:r>
-            <a:endParaRPr b="0" lang="fr-CH" sz="2800" spc="-1" strike="noStrike">
+            <a:endParaRPr b="0" lang="en-US" sz="2800" spc="-1" strike="noStrike">
               <a:latin typeface="Arial"/>
             </a:endParaRPr>
           </a:p>
@@ -2872,12 +2872,12 @@
               <a:buChar char=""/>
             </a:pPr>
             <a:r>
-              <a:rPr b="0" lang="fr-CH" sz="2400" spc="-1" strike="noStrike">
+              <a:rPr b="0" lang="en-US" sz="2400" spc="-1" strike="noStrike">
                 <a:latin typeface="Arial"/>
               </a:rPr>
               <a:t>Third Outline Level</a:t>
             </a:r>
-            <a:endParaRPr b="0" lang="fr-CH" sz="2400" spc="-1" strike="noStrike">
+            <a:endParaRPr b="0" lang="en-US" sz="2400" spc="-1" strike="noStrike">
               <a:latin typeface="Arial"/>
             </a:endParaRPr>
           </a:p>
@@ -2894,12 +2894,12 @@
               <a:buChar char=""/>
             </a:pPr>
             <a:r>
-              <a:rPr b="0" lang="fr-CH" sz="2000" spc="-1" strike="noStrike">
+              <a:rPr b="0" lang="en-US" sz="2000" spc="-1" strike="noStrike">
                 <a:latin typeface="Arial"/>
               </a:rPr>
               <a:t>Fourth Outline Level</a:t>
             </a:r>
-            <a:endParaRPr b="0" lang="fr-CH" sz="2000" spc="-1" strike="noStrike">
+            <a:endParaRPr b="0" lang="en-US" sz="2000" spc="-1" strike="noStrike">
               <a:latin typeface="Arial"/>
             </a:endParaRPr>
           </a:p>
@@ -2916,12 +2916,12 @@
               <a:buChar char=""/>
             </a:pPr>
             <a:r>
-              <a:rPr b="0" lang="fr-CH" sz="2000" spc="-1" strike="noStrike">
+              <a:rPr b="0" lang="en-US" sz="2000" spc="-1" strike="noStrike">
                 <a:latin typeface="Arial"/>
               </a:rPr>
               <a:t>Fifth Outline Level</a:t>
             </a:r>
-            <a:endParaRPr b="0" lang="fr-CH" sz="2000" spc="-1" strike="noStrike">
+            <a:endParaRPr b="0" lang="en-US" sz="2000" spc="-1" strike="noStrike">
               <a:latin typeface="Arial"/>
             </a:endParaRPr>
           </a:p>
@@ -2938,12 +2938,12 @@
               <a:buChar char=""/>
             </a:pPr>
             <a:r>
-              <a:rPr b="0" lang="fr-CH" sz="2000" spc="-1" strike="noStrike">
+              <a:rPr b="0" lang="en-US" sz="2000" spc="-1" strike="noStrike">
                 <a:latin typeface="Arial"/>
               </a:rPr>
               <a:t>Sixth Outline Level</a:t>
             </a:r>
-            <a:endParaRPr b="0" lang="fr-CH" sz="2000" spc="-1" strike="noStrike">
+            <a:endParaRPr b="0" lang="en-US" sz="2000" spc="-1" strike="noStrike">
               <a:latin typeface="Arial"/>
             </a:endParaRPr>
           </a:p>
@@ -2960,12 +2960,12 @@
               <a:buChar char=""/>
             </a:pPr>
             <a:r>
-              <a:rPr b="0" lang="fr-CH" sz="2000" spc="-1" strike="noStrike">
+              <a:rPr b="0" lang="en-US" sz="2000" spc="-1" strike="noStrike">
                 <a:latin typeface="Arial"/>
               </a:rPr>
               <a:t>Seventh Outline Level</a:t>
             </a:r>
-            <a:endParaRPr b="0" lang="fr-CH" sz="2000" spc="-1" strike="noStrike">
+            <a:endParaRPr b="0" lang="en-US" sz="2000" spc="-1" strike="noStrike">
               <a:latin typeface="Arial"/>
             </a:endParaRPr>
           </a:p>
@@ -3041,12 +3041,12 @@
           <a:p>
             <a:pPr algn="ctr"/>
             <a:r>
-              <a:rPr b="0" lang="fr-CH" sz="4400" spc="-1" strike="noStrike">
+              <a:rPr b="0" lang="en-US" sz="4400" spc="-1" strike="noStrike">
                 <a:latin typeface="Arial"/>
               </a:rPr>
               <a:t>Click to edit the title text format</a:t>
             </a:r>
-            <a:endParaRPr b="0" lang="fr-CH" sz="4400" spc="-1" strike="noStrike">
+            <a:endParaRPr b="0" lang="en-US" sz="4400" spc="-1" strike="noStrike">
               <a:latin typeface="Arial"/>
             </a:endParaRPr>
           </a:p>
@@ -3088,12 +3088,12 @@
               <a:buChar char=""/>
             </a:pPr>
             <a:r>
-              <a:rPr b="0" lang="fr-CH" sz="3200" spc="-1" strike="noStrike">
+              <a:rPr b="0" lang="en-US" sz="3200" spc="-1" strike="noStrike">
                 <a:latin typeface="Arial"/>
               </a:rPr>
               <a:t>Click to edit the outline text format</a:t>
             </a:r>
-            <a:endParaRPr b="0" lang="fr-CH" sz="3200" spc="-1" strike="noStrike">
+            <a:endParaRPr b="0" lang="en-US" sz="3200" spc="-1" strike="noStrike">
               <a:latin typeface="Arial"/>
             </a:endParaRPr>
           </a:p>
@@ -3110,12 +3110,12 @@
               <a:buChar char=""/>
             </a:pPr>
             <a:r>
-              <a:rPr b="0" lang="fr-CH" sz="2800" spc="-1" strike="noStrike">
+              <a:rPr b="0" lang="en-US" sz="2800" spc="-1" strike="noStrike">
                 <a:latin typeface="Arial"/>
               </a:rPr>
               <a:t>Second Outline Level</a:t>
             </a:r>
-            <a:endParaRPr b="0" lang="fr-CH" sz="2800" spc="-1" strike="noStrike">
+            <a:endParaRPr b="0" lang="en-US" sz="2800" spc="-1" strike="noStrike">
               <a:latin typeface="Arial"/>
             </a:endParaRPr>
           </a:p>
@@ -3132,12 +3132,12 @@
               <a:buChar char=""/>
             </a:pPr>
             <a:r>
-              <a:rPr b="0" lang="fr-CH" sz="2400" spc="-1" strike="noStrike">
+              <a:rPr b="0" lang="en-US" sz="2400" spc="-1" strike="noStrike">
                 <a:latin typeface="Arial"/>
               </a:rPr>
               <a:t>Third Outline Level</a:t>
             </a:r>
-            <a:endParaRPr b="0" lang="fr-CH" sz="2400" spc="-1" strike="noStrike">
+            <a:endParaRPr b="0" lang="en-US" sz="2400" spc="-1" strike="noStrike">
               <a:latin typeface="Arial"/>
             </a:endParaRPr>
           </a:p>
@@ -3154,12 +3154,12 @@
               <a:buChar char=""/>
             </a:pPr>
             <a:r>
-              <a:rPr b="0" lang="fr-CH" sz="2000" spc="-1" strike="noStrike">
+              <a:rPr b="0" lang="en-US" sz="2000" spc="-1" strike="noStrike">
                 <a:latin typeface="Arial"/>
               </a:rPr>
               <a:t>Fourth Outline Level</a:t>
             </a:r>
-            <a:endParaRPr b="0" lang="fr-CH" sz="2000" spc="-1" strike="noStrike">
+            <a:endParaRPr b="0" lang="en-US" sz="2000" spc="-1" strike="noStrike">
               <a:latin typeface="Arial"/>
             </a:endParaRPr>
           </a:p>
@@ -3176,12 +3176,12 @@
               <a:buChar char=""/>
             </a:pPr>
             <a:r>
-              <a:rPr b="0" lang="fr-CH" sz="2000" spc="-1" strike="noStrike">
+              <a:rPr b="0" lang="en-US" sz="2000" spc="-1" strike="noStrike">
                 <a:latin typeface="Arial"/>
               </a:rPr>
               <a:t>Fifth Outline Level</a:t>
             </a:r>
-            <a:endParaRPr b="0" lang="fr-CH" sz="2000" spc="-1" strike="noStrike">
+            <a:endParaRPr b="0" lang="en-US" sz="2000" spc="-1" strike="noStrike">
               <a:latin typeface="Arial"/>
             </a:endParaRPr>
           </a:p>
@@ -3198,12 +3198,12 @@
               <a:buChar char=""/>
             </a:pPr>
             <a:r>
-              <a:rPr b="0" lang="fr-CH" sz="2000" spc="-1" strike="noStrike">
+              <a:rPr b="0" lang="en-US" sz="2000" spc="-1" strike="noStrike">
                 <a:latin typeface="Arial"/>
               </a:rPr>
               <a:t>Sixth Outline Level</a:t>
             </a:r>
-            <a:endParaRPr b="0" lang="fr-CH" sz="2000" spc="-1" strike="noStrike">
+            <a:endParaRPr b="0" lang="en-US" sz="2000" spc="-1" strike="noStrike">
               <a:latin typeface="Arial"/>
             </a:endParaRPr>
           </a:p>
@@ -3220,12 +3220,12 @@
               <a:buChar char=""/>
             </a:pPr>
             <a:r>
-              <a:rPr b="0" lang="fr-CH" sz="2000" spc="-1" strike="noStrike">
+              <a:rPr b="0" lang="en-US" sz="2000" spc="-1" strike="noStrike">
                 <a:latin typeface="Arial"/>
               </a:rPr>
               <a:t>Seventh Outline Level</a:t>
             </a:r>
-            <a:endParaRPr b="0" lang="fr-CH" sz="2000" spc="-1" strike="noStrike">
+            <a:endParaRPr b="0" lang="en-US" sz="2000" spc="-1" strike="noStrike">
               <a:latin typeface="Arial"/>
             </a:endParaRPr>
           </a:p>
@@ -3284,7 +3284,7 @@
         <p:spPr>
           <a:xfrm>
             <a:off x="2235240" y="1820160"/>
-            <a:ext cx="7718400" cy="1906560"/>
+            <a:ext cx="7718040" cy="1906200"/>
           </a:xfrm>
           <a:prstGeom prst="rect">
             <a:avLst/>
@@ -3325,7 +3325,7 @@
               </a:rPr>
               <a:t>Serre connectée</a:t>
             </a:r>
-            <a:endParaRPr b="0" lang="fr-CH" sz="4800" spc="-1" strike="noStrike">
+            <a:endParaRPr b="0" lang="en-US" sz="4800" spc="-1" strike="noStrike">
               <a:latin typeface="Arial"/>
             </a:endParaRPr>
           </a:p>
@@ -3340,7 +3340,7 @@
         <p:spPr>
           <a:xfrm>
             <a:off x="1523880" y="4719600"/>
-            <a:ext cx="9140760" cy="1652400"/>
+            <a:ext cx="9140400" cy="1652040"/>
           </a:xfrm>
           <a:prstGeom prst="rect">
             <a:avLst/>
@@ -3382,7 +3382,7 @@
               </a:rPr>
               <a:t>HEIG-VD, IoT</a:t>
             </a:r>
-            <a:endParaRPr b="0" lang="fr-CH" sz="2400" spc="-1" strike="noStrike">
+            <a:endParaRPr b="0" lang="en-US" sz="2400" spc="-1" strike="noStrike">
               <a:latin typeface="Arial"/>
             </a:endParaRPr>
           </a:p>
@@ -3408,7 +3408,7 @@
               </a:rPr>
               <a:t>2023</a:t>
             </a:r>
-            <a:endParaRPr b="0" lang="fr-CH" sz="2400" spc="-1" strike="noStrike">
+            <a:endParaRPr b="0" lang="en-US" sz="2400" spc="-1" strike="noStrike">
               <a:latin typeface="Arial"/>
             </a:endParaRPr>
           </a:p>
@@ -3424,7 +3424,7 @@
                 <a:tab algn="l" pos="0"/>
               </a:tabLst>
             </a:pPr>
-            <a:endParaRPr b="0" lang="fr-CH" sz="2400" spc="-1" strike="noStrike">
+            <a:endParaRPr b="0" lang="en-US" sz="2400" spc="-1" strike="noStrike">
               <a:latin typeface="Arial"/>
             </a:endParaRPr>
           </a:p>
@@ -3439,7 +3439,7 @@
         <p:spPr>
           <a:xfrm>
             <a:off x="8610480" y="6356520"/>
-            <a:ext cx="2739960" cy="361800"/>
+            <a:ext cx="2739600" cy="361440"/>
           </a:xfrm>
           <a:prstGeom prst="rect">
             <a:avLst/>
@@ -3465,7 +3465,7 @@
                 <a:spcPct val="100000"/>
               </a:lnSpc>
             </a:pPr>
-            <a:fld id="{29E46EFE-5DE0-4661-AE7B-EB952E82CBB5}" type="slidenum">
+            <a:fld id="{1D86842D-9DEA-40AC-8A25-D0A43F0706D3}" type="slidenum">
               <a:rPr b="0" lang="fr-FR" sz="1200" spc="-1" strike="noStrike">
                 <a:solidFill>
                   <a:srgbClr val="8b8b8b"/>
@@ -3475,7 +3475,7 @@
               </a:rPr>
               <a:t>1</a:t>
             </a:fld>
-            <a:endParaRPr b="0" lang="fr-CH" sz="1200" spc="-1" strike="noStrike">
+            <a:endParaRPr b="0" lang="en-US" sz="1200" spc="-1" strike="noStrike">
               <a:latin typeface="Arial"/>
             </a:endParaRPr>
           </a:p>
@@ -3490,7 +3490,7 @@
         <p:spPr>
           <a:xfrm>
             <a:off x="4038480" y="6356520"/>
-            <a:ext cx="4111560" cy="361800"/>
+            <a:ext cx="4111200" cy="361440"/>
           </a:xfrm>
           <a:prstGeom prst="rect">
             <a:avLst/>
@@ -3526,7 +3526,7 @@
               </a:rPr>
               <a:t>Présentation du projet IoT, HEIG-VD</a:t>
             </a:r>
-            <a:endParaRPr b="0" lang="fr-CH" sz="1200" spc="-1" strike="noStrike">
+            <a:endParaRPr b="0" lang="en-US" sz="1200" spc="-1" strike="noStrike">
               <a:latin typeface="Arial"/>
             </a:endParaRPr>
           </a:p>
@@ -3571,7 +3571,7 @@
         <p:spPr>
           <a:xfrm>
             <a:off x="0" y="0"/>
-            <a:ext cx="12189240" cy="892800"/>
+            <a:ext cx="12188880" cy="892440"/>
           </a:xfrm>
           <a:prstGeom prst="rect">
             <a:avLst/>
@@ -3607,7 +3607,7 @@
         <p:spPr>
           <a:xfrm>
             <a:off x="317520" y="1123920"/>
-            <a:ext cx="11517120" cy="5104440"/>
+            <a:ext cx="11516760" cy="5104080"/>
           </a:xfrm>
           <a:prstGeom prst="rect">
             <a:avLst/>
@@ -3636,7 +3636,7 @@
                 <a:spcPts val="1001"/>
               </a:spcBef>
             </a:pPr>
-            <a:endParaRPr b="0" lang="fr-CH" sz="1800" spc="-1" strike="noStrike">
+            <a:endParaRPr b="0" lang="en-US" sz="1800" spc="-1" strike="noStrike">
               <a:latin typeface="Arial"/>
             </a:endParaRPr>
           </a:p>
@@ -3649,7 +3649,7 @@
                 <a:spcPts val="1001"/>
               </a:spcBef>
             </a:pPr>
-            <a:endParaRPr b="0" lang="fr-CH" sz="1800" spc="-1" strike="noStrike">
+            <a:endParaRPr b="0" lang="en-US" sz="1800" spc="-1" strike="noStrike">
               <a:latin typeface="Arial"/>
             </a:endParaRPr>
           </a:p>
@@ -3662,12 +3662,12 @@
                 <a:spcPts val="1001"/>
               </a:spcBef>
             </a:pPr>
-            <a:endParaRPr b="0" lang="fr-CH" sz="1800" spc="-1" strike="noStrike">
-              <a:latin typeface="Arial"/>
-            </a:endParaRPr>
-          </a:p>
-          <a:p>
-            <a:pPr marL="228600" indent="-225720">
+            <a:endParaRPr b="0" lang="en-US" sz="1800" spc="-1" strike="noStrike">
+              <a:latin typeface="Arial"/>
+            </a:endParaRPr>
+          </a:p>
+          <a:p>
+            <a:pPr marL="228600" indent="-225360">
               <a:lnSpc>
                 <a:spcPct val="90000"/>
               </a:lnSpc>
@@ -3690,12 +3690,12 @@
               </a:rPr>
               <a:t>Preuve de concept d’une serre connectée</a:t>
             </a:r>
-            <a:endParaRPr b="0" lang="fr-CH" sz="2800" spc="-1" strike="noStrike">
-              <a:latin typeface="Arial"/>
-            </a:endParaRPr>
-          </a:p>
-          <a:p>
-            <a:pPr marL="228600" indent="-225720">
+            <a:endParaRPr b="0" lang="en-US" sz="2800" spc="-1" strike="noStrike">
+              <a:latin typeface="Arial"/>
+            </a:endParaRPr>
+          </a:p>
+          <a:p>
+            <a:pPr marL="228600" indent="-225360">
               <a:lnSpc>
                 <a:spcPct val="90000"/>
               </a:lnSpc>
@@ -3718,12 +3718,12 @@
               </a:rPr>
               <a:t>Optimiser ses cultures et protéger sa serre </a:t>
             </a:r>
-            <a:endParaRPr b="0" lang="fr-CH" sz="2800" spc="-1" strike="noStrike">
-              <a:latin typeface="Arial"/>
-            </a:endParaRPr>
-          </a:p>
-          <a:p>
-            <a:pPr marL="228600" indent="-225720">
+            <a:endParaRPr b="0" lang="en-US" sz="2800" spc="-1" strike="noStrike">
+              <a:latin typeface="Arial"/>
+            </a:endParaRPr>
+          </a:p>
+          <a:p>
+            <a:pPr marL="228600" indent="-225360">
               <a:lnSpc>
                 <a:spcPct val="90000"/>
               </a:lnSpc>
@@ -3746,12 +3746,12 @@
               </a:rPr>
               <a:t>Système de mesures de la santé du sol afin de diminuer l’utilisation abusive d’engrais</a:t>
             </a:r>
-            <a:endParaRPr b="0" lang="fr-CH" sz="2800" spc="-1" strike="noStrike">
-              <a:latin typeface="Arial"/>
-            </a:endParaRPr>
-          </a:p>
-          <a:p>
-            <a:pPr marL="228600" indent="-225720">
+            <a:endParaRPr b="0" lang="en-US" sz="2800" spc="-1" strike="noStrike">
+              <a:latin typeface="Arial"/>
+            </a:endParaRPr>
+          </a:p>
+          <a:p>
+            <a:pPr marL="228600" indent="-225360">
               <a:lnSpc>
                 <a:spcPct val="90000"/>
               </a:lnSpc>
@@ -3774,7 +3774,7 @@
               </a:rPr>
               <a:t>Système de sécurité pour protéger l’accès à la serre</a:t>
             </a:r>
-            <a:endParaRPr b="0" lang="fr-CH" sz="2800" spc="-1" strike="noStrike">
+            <a:endParaRPr b="0" lang="en-US" sz="2800" spc="-1" strike="noStrike">
               <a:latin typeface="Arial"/>
             </a:endParaRPr>
           </a:p>
@@ -3822,7 +3822,7 @@
         <p:spPr>
           <a:xfrm>
             <a:off x="317520" y="93960"/>
-            <a:ext cx="11535480" cy="699120"/>
+            <a:ext cx="11535120" cy="699120"/>
           </a:xfrm>
           <a:prstGeom prst="rect">
             <a:avLst/>
@@ -3858,7 +3858,7 @@
               </a:rPr>
               <a:t>Sujet initial</a:t>
             </a:r>
-            <a:endParaRPr b="0" lang="fr-CH" sz="4000" spc="-1" strike="noStrike">
+            <a:endParaRPr b="0" lang="en-US" sz="4000" spc="-1" strike="noStrike">
               <a:latin typeface="Arial"/>
             </a:endParaRPr>
           </a:p>
@@ -3873,7 +3873,7 @@
         <p:spPr>
           <a:xfrm>
             <a:off x="3145320" y="6400800"/>
-            <a:ext cx="5898240" cy="317160"/>
+            <a:ext cx="5897880" cy="316800"/>
           </a:xfrm>
           <a:prstGeom prst="rect">
             <a:avLst/>
@@ -3909,7 +3909,7 @@
               </a:rPr>
               <a:t>Présentation du projet IoT, HEIG-VD</a:t>
             </a:r>
-            <a:endParaRPr b="0" lang="fr-CH" sz="1400" spc="-1" strike="noStrike">
+            <a:endParaRPr b="0" lang="en-US" sz="1400" spc="-1" strike="noStrike">
               <a:latin typeface="Arial"/>
             </a:endParaRPr>
           </a:p>
@@ -3924,7 +3924,7 @@
         <p:spPr>
           <a:xfrm>
             <a:off x="11425680" y="6400800"/>
-            <a:ext cx="427320" cy="357840"/>
+            <a:ext cx="426960" cy="357480"/>
           </a:xfrm>
           <a:prstGeom prst="rect">
             <a:avLst/>
@@ -3952,7 +3952,7 @@
                 <a:spcPct val="100000"/>
               </a:lnSpc>
             </a:pPr>
-            <a:fld id="{F1EC91D8-CFA4-4A5B-8734-693682A4CA7D}" type="slidenum">
+            <a:fld id="{3A066992-BB09-4773-B277-B22CE908DC86}" type="slidenum">
               <a:rPr b="0" lang="en-GB" sz="1400" spc="-1" strike="noStrike">
                 <a:solidFill>
                   <a:srgbClr val="ffffff"/>
@@ -3962,7 +3962,7 @@
               </a:rPr>
               <a:t>2</a:t>
             </a:fld>
-            <a:endParaRPr b="0" lang="fr-CH" sz="1400" spc="-1" strike="noStrike">
+            <a:endParaRPr b="0" lang="en-US" sz="1400" spc="-1" strike="noStrike">
               <a:latin typeface="Arial"/>
             </a:endParaRPr>
           </a:p>
@@ -4007,7 +4007,7 @@
         <p:spPr>
           <a:xfrm>
             <a:off x="0" y="0"/>
-            <a:ext cx="12188880" cy="892440"/>
+            <a:ext cx="12188520" cy="892080"/>
           </a:xfrm>
           <a:prstGeom prst="rect">
             <a:avLst/>
@@ -4076,7 +4076,7 @@
         <p:spPr>
           <a:xfrm>
             <a:off x="317520" y="93960"/>
-            <a:ext cx="11535120" cy="699120"/>
+            <a:ext cx="11534760" cy="699120"/>
           </a:xfrm>
           <a:prstGeom prst="rect">
             <a:avLst/>
@@ -4112,7 +4112,7 @@
               </a:rPr>
               <a:t>Problèmes</a:t>
             </a:r>
-            <a:endParaRPr b="0" lang="fr-CH" sz="4000" spc="-1" strike="noStrike">
+            <a:endParaRPr b="0" lang="en-US" sz="4000" spc="-1" strike="noStrike">
               <a:latin typeface="Arial"/>
             </a:endParaRPr>
           </a:p>
@@ -4127,7 +4127,7 @@
         <p:spPr>
           <a:xfrm>
             <a:off x="3145320" y="6400800"/>
-            <a:ext cx="5897880" cy="316800"/>
+            <a:ext cx="5897520" cy="316440"/>
           </a:xfrm>
           <a:prstGeom prst="rect">
             <a:avLst/>
@@ -4163,7 +4163,7 @@
               </a:rPr>
               <a:t>Présentation du projet IoT, HEIG-VD</a:t>
             </a:r>
-            <a:endParaRPr b="0" lang="fr-CH" sz="1400" spc="-1" strike="noStrike">
+            <a:endParaRPr b="0" lang="en-US" sz="1400" spc="-1" strike="noStrike">
               <a:latin typeface="Arial"/>
             </a:endParaRPr>
           </a:p>
@@ -4178,7 +4178,7 @@
         <p:spPr>
           <a:xfrm>
             <a:off x="11425680" y="6400800"/>
-            <a:ext cx="426960" cy="357480"/>
+            <a:ext cx="426600" cy="357120"/>
           </a:xfrm>
           <a:prstGeom prst="rect">
             <a:avLst/>
@@ -4206,7 +4206,7 @@
                 <a:spcPct val="100000"/>
               </a:lnSpc>
             </a:pPr>
-            <a:fld id="{A2CA0AEE-96C5-4665-B6E5-2C6EF43676EE}" type="slidenum">
+            <a:fld id="{5FDDB74C-20A0-45E6-A79C-2EA472B7609D}" type="slidenum">
               <a:rPr b="0" lang="en-GB" sz="1400" spc="-1" strike="noStrike">
                 <a:solidFill>
                   <a:srgbClr val="ffffff"/>
@@ -4216,7 +4216,7 @@
               </a:rPr>
               <a:t>2</a:t>
             </a:fld>
-            <a:endParaRPr b="0" lang="fr-CH" sz="1400" spc="-1" strike="noStrike">
+            <a:endParaRPr b="0" lang="en-US" sz="1400" spc="-1" strike="noStrike">
               <a:latin typeface="Arial"/>
             </a:endParaRPr>
           </a:p>
@@ -4231,7 +4231,7 @@
         <p:spPr>
           <a:xfrm>
             <a:off x="317520" y="1123920"/>
-            <a:ext cx="11516760" cy="5104080"/>
+            <a:ext cx="11516400" cy="5103720"/>
           </a:xfrm>
           <a:prstGeom prst="rect">
             <a:avLst/>
@@ -4260,7 +4260,7 @@
                 <a:spcPts val="1417"/>
               </a:spcBef>
             </a:pPr>
-            <a:endParaRPr b="0" lang="fr-CH" sz="1800" spc="-1" strike="noStrike">
+            <a:endParaRPr b="0" lang="en-US" sz="1800" spc="-1" strike="noStrike">
               <a:latin typeface="Arial"/>
             </a:endParaRPr>
           </a:p>
@@ -4273,7 +4273,7 @@
                 <a:spcPts val="1417"/>
               </a:spcBef>
             </a:pPr>
-            <a:endParaRPr b="0" lang="fr-CH" sz="1800" spc="-1" strike="noStrike">
+            <a:endParaRPr b="0" lang="en-US" sz="1800" spc="-1" strike="noStrike">
               <a:latin typeface="Arial"/>
             </a:endParaRPr>
           </a:p>
@@ -4286,12 +4286,12 @@
                 <a:spcPts val="1417"/>
               </a:spcBef>
             </a:pPr>
-            <a:endParaRPr b="0" lang="fr-CH" sz="1800" spc="-1" strike="noStrike">
-              <a:latin typeface="Arial"/>
-            </a:endParaRPr>
-          </a:p>
-          <a:p>
-            <a:pPr marL="432000" indent="-321120">
+            <a:endParaRPr b="0" lang="en-US" sz="1800" spc="-1" strike="noStrike">
+              <a:latin typeface="Arial"/>
+            </a:endParaRPr>
+          </a:p>
+          <a:p>
+            <a:pPr marL="432000" indent="-320760">
               <a:lnSpc>
                 <a:spcPct val="100000"/>
               </a:lnSpc>
@@ -4313,14 +4313,14 @@
                 <a:latin typeface="Calibri"/>
                 <a:ea typeface="DejaVu Sans"/>
               </a:rPr>
-              <a:t>Difficulté à évaluer le temps</a:t>
+              <a:t>Difficulté à évaluer le temps et manque de temps</a:t>
             </a:r>
-            <a:endParaRPr b="0" lang="fr-CH" sz="2800" spc="-1" strike="noStrike">
-              <a:latin typeface="Arial"/>
-            </a:endParaRPr>
-          </a:p>
-          <a:p>
-            <a:pPr marL="432000" indent="-321120">
+            <a:endParaRPr b="0" lang="en-US" sz="2800" spc="-1" strike="noStrike">
+              <a:latin typeface="Arial"/>
+            </a:endParaRPr>
+          </a:p>
+          <a:p>
+            <a:pPr marL="432000" indent="-320760">
               <a:lnSpc>
                 <a:spcPct val="100000"/>
               </a:lnSpc>
@@ -4344,12 +4344,12 @@
               </a:rPr>
               <a:t>Composants indisponibles ou pas primordiaux</a:t>
             </a:r>
-            <a:endParaRPr b="0" lang="fr-CH" sz="2800" spc="-1" strike="noStrike">
-              <a:latin typeface="Arial"/>
-            </a:endParaRPr>
-          </a:p>
-          <a:p>
-            <a:pPr marL="432000" indent="-321120">
+            <a:endParaRPr b="0" lang="en-US" sz="2800" spc="-1" strike="noStrike">
+              <a:latin typeface="Arial"/>
+            </a:endParaRPr>
+          </a:p>
+          <a:p>
+            <a:pPr marL="432000" indent="-320760">
               <a:lnSpc>
                 <a:spcPct val="100000"/>
               </a:lnSpc>
@@ -4371,9 +4371,9 @@
                 <a:latin typeface="Calibri"/>
                 <a:ea typeface="DejaVu Sans"/>
               </a:rPr>
-              <a:t>Solution envisagée pas adaptée IOT</a:t>
+              <a:t>Solution initiale envisagée pas adaptée IOT</a:t>
             </a:r>
-            <a:endParaRPr b="0" lang="fr-CH" sz="2800" spc="-1" strike="noStrike">
+            <a:endParaRPr b="0" lang="en-US" sz="2800" spc="-1" strike="noStrike">
               <a:latin typeface="Arial"/>
             </a:endParaRPr>
           </a:p>
@@ -4386,7 +4386,7 @@
                 <a:spcPts val="1417"/>
               </a:spcBef>
             </a:pPr>
-            <a:endParaRPr b="0" lang="fr-CH" sz="2800" spc="-1" strike="noStrike">
+            <a:endParaRPr b="0" lang="en-US" sz="2800" spc="-1" strike="noStrike">
               <a:latin typeface="Arial"/>
             </a:endParaRPr>
           </a:p>
@@ -4399,7 +4399,7 @@
                 <a:spcPts val="1417"/>
               </a:spcBef>
             </a:pPr>
-            <a:endParaRPr b="0" lang="fr-CH" sz="2800" spc="-1" strike="noStrike">
+            <a:endParaRPr b="0" lang="en-US" sz="2800" spc="-1" strike="noStrike">
               <a:latin typeface="Arial"/>
             </a:endParaRPr>
           </a:p>
@@ -4444,7 +4444,7 @@
         <p:spPr>
           <a:xfrm>
             <a:off x="0" y="0"/>
-            <a:ext cx="12188880" cy="892440"/>
+            <a:ext cx="12188520" cy="892080"/>
           </a:xfrm>
           <a:prstGeom prst="rect">
             <a:avLst/>
@@ -4513,7 +4513,7 @@
         <p:spPr>
           <a:xfrm>
             <a:off x="317520" y="93960"/>
-            <a:ext cx="11535120" cy="699120"/>
+            <a:ext cx="11534760" cy="699120"/>
           </a:xfrm>
           <a:prstGeom prst="rect">
             <a:avLst/>
@@ -4549,7 +4549,7 @@
               </a:rPr>
               <a:t>Composants matériel</a:t>
             </a:r>
-            <a:endParaRPr b="0" lang="fr-CH" sz="4000" spc="-1" strike="noStrike">
+            <a:endParaRPr b="0" lang="en-US" sz="4000" spc="-1" strike="noStrike">
               <a:latin typeface="Arial"/>
             </a:endParaRPr>
           </a:p>
@@ -4564,7 +4564,7 @@
         <p:spPr>
           <a:xfrm>
             <a:off x="3145320" y="6400800"/>
-            <a:ext cx="5897880" cy="316800"/>
+            <a:ext cx="5897520" cy="316440"/>
           </a:xfrm>
           <a:prstGeom prst="rect">
             <a:avLst/>
@@ -4600,7 +4600,7 @@
               </a:rPr>
               <a:t>Présentation du projet IoT, HEIG-VD</a:t>
             </a:r>
-            <a:endParaRPr b="0" lang="fr-CH" sz="1400" spc="-1" strike="noStrike">
+            <a:endParaRPr b="0" lang="en-US" sz="1400" spc="-1" strike="noStrike">
               <a:latin typeface="Arial"/>
             </a:endParaRPr>
           </a:p>
@@ -4615,7 +4615,7 @@
         <p:spPr>
           <a:xfrm>
             <a:off x="11425680" y="6400800"/>
-            <a:ext cx="426960" cy="357480"/>
+            <a:ext cx="426600" cy="357120"/>
           </a:xfrm>
           <a:prstGeom prst="rect">
             <a:avLst/>
@@ -4643,7 +4643,7 @@
                 <a:spcPct val="100000"/>
               </a:lnSpc>
             </a:pPr>
-            <a:fld id="{7716B2CB-3140-4331-8C84-E816A3C132B4}" type="slidenum">
+            <a:fld id="{D798D6B9-31C1-4EC1-B71D-6D50FC4DC04A}" type="slidenum">
               <a:rPr b="0" lang="en-GB" sz="1400" spc="-1" strike="noStrike">
                 <a:solidFill>
                   <a:srgbClr val="ffffff"/>
@@ -4653,7 +4653,7 @@
               </a:rPr>
               <a:t>3</a:t>
             </a:fld>
-            <a:endParaRPr b="0" lang="fr-CH" sz="1400" spc="-1" strike="noStrike">
+            <a:endParaRPr b="0" lang="en-US" sz="1400" spc="-1" strike="noStrike">
               <a:latin typeface="Arial"/>
             </a:endParaRPr>
           </a:p>
@@ -4668,7 +4668,7 @@
         <p:spPr>
           <a:xfrm>
             <a:off x="228600" y="228600"/>
-            <a:ext cx="11516760" cy="5257440"/>
+            <a:ext cx="11516400" cy="5257080"/>
           </a:xfrm>
           <a:prstGeom prst="rect">
             <a:avLst/>
@@ -4686,7 +4686,7 @@
         </p:style>
         <p:txBody>
           <a:bodyPr lIns="90000" rIns="90000" tIns="45000" bIns="45000">
-            <a:normAutofit fontScale="77000"/>
+            <a:normAutofit fontScale="85000"/>
           </a:bodyPr>
           <a:p>
             <a:pPr>
@@ -4697,7 +4697,7 @@
                 <a:spcPts val="1417"/>
               </a:spcBef>
             </a:pPr>
-            <a:endParaRPr b="0" lang="fr-CH" sz="1800" spc="-1" strike="noStrike">
+            <a:endParaRPr b="0" lang="en-US" sz="1800" spc="-1" strike="noStrike">
               <a:latin typeface="Arial"/>
             </a:endParaRPr>
           </a:p>
@@ -4710,7 +4710,7 @@
                 <a:spcPts val="1417"/>
               </a:spcBef>
             </a:pPr>
-            <a:endParaRPr b="0" lang="fr-CH" sz="1800" spc="-1" strike="noStrike">
+            <a:endParaRPr b="0" lang="en-US" sz="1800" spc="-1" strike="noStrike">
               <a:latin typeface="Arial"/>
             </a:endParaRPr>
           </a:p>
@@ -4723,12 +4723,12 @@
                 <a:spcPts val="1417"/>
               </a:spcBef>
             </a:pPr>
-            <a:endParaRPr b="0" lang="fr-CH" sz="1800" spc="-1" strike="noStrike">
-              <a:latin typeface="Arial"/>
-            </a:endParaRPr>
-          </a:p>
-          <a:p>
-            <a:pPr marL="432000" indent="-321120">
+            <a:endParaRPr b="0" lang="en-US" sz="1800" spc="-1" strike="noStrike">
+              <a:latin typeface="Arial"/>
+            </a:endParaRPr>
+          </a:p>
+          <a:p>
+            <a:pPr marL="432000" indent="-320760">
               <a:lnSpc>
                 <a:spcPct val="100000"/>
               </a:lnSpc>
@@ -4752,12 +4752,12 @@
               </a:rPr>
               <a:t>Arduino MKR Wifi 1010 : Code et connectique réseau</a:t>
             </a:r>
-            <a:endParaRPr b="0" lang="fr-CH" sz="2600" spc="-1" strike="noStrike">
-              <a:latin typeface="Arial"/>
-            </a:endParaRPr>
-          </a:p>
-          <a:p>
-            <a:pPr marL="432000" indent="-321120">
+            <a:endParaRPr b="0" lang="en-US" sz="2600" spc="-1" strike="noStrike">
+              <a:latin typeface="Arial"/>
+            </a:endParaRPr>
+          </a:p>
+          <a:p>
+            <a:pPr marL="432000" indent="-320760">
               <a:lnSpc>
                 <a:spcPct val="100000"/>
               </a:lnSpc>
@@ -4781,12 +4781,12 @@
               </a:rPr>
               <a:t>Arduino MKR IOT Carrier : Senseurs et actuateurs</a:t>
             </a:r>
-            <a:endParaRPr b="0" lang="fr-CH" sz="2600" spc="-1" strike="noStrike">
-              <a:latin typeface="Arial"/>
-            </a:endParaRPr>
-          </a:p>
-          <a:p>
-            <a:pPr lvl="2" marL="648000" indent="-215640">
+            <a:endParaRPr b="0" lang="en-US" sz="2600" spc="-1" strike="noStrike">
+              <a:latin typeface="Arial"/>
+            </a:endParaRPr>
+          </a:p>
+          <a:p>
+            <a:pPr lvl="2" marL="648000" indent="-215280">
               <a:lnSpc>
                 <a:spcPct val="100000"/>
               </a:lnSpc>
@@ -4810,12 +4810,12 @@
               </a:rPr>
               <a:t>Humidité</a:t>
             </a:r>
-            <a:endParaRPr b="0" lang="fr-CH" sz="2600" spc="-1" strike="noStrike">
-              <a:latin typeface="Arial"/>
-            </a:endParaRPr>
-          </a:p>
-          <a:p>
-            <a:pPr lvl="2" marL="648000" indent="-215640">
+            <a:endParaRPr b="0" lang="en-US" sz="2600" spc="-1" strike="noStrike">
+              <a:latin typeface="Arial"/>
+            </a:endParaRPr>
+          </a:p>
+          <a:p>
+            <a:pPr lvl="2" marL="648000" indent="-215280">
               <a:lnSpc>
                 <a:spcPct val="100000"/>
               </a:lnSpc>
@@ -4839,12 +4839,12 @@
               </a:rPr>
               <a:t>Lumière</a:t>
             </a:r>
-            <a:endParaRPr b="0" lang="fr-CH" sz="2600" spc="-1" strike="noStrike">
-              <a:latin typeface="Arial"/>
-            </a:endParaRPr>
-          </a:p>
-          <a:p>
-            <a:pPr lvl="2" marL="648000" indent="-215640">
+            <a:endParaRPr b="0" lang="en-US" sz="2600" spc="-1" strike="noStrike">
+              <a:latin typeface="Arial"/>
+            </a:endParaRPr>
+          </a:p>
+          <a:p>
+            <a:pPr lvl="2" marL="648000" indent="-215280">
               <a:lnSpc>
                 <a:spcPct val="100000"/>
               </a:lnSpc>
@@ -4868,12 +4868,12 @@
               </a:rPr>
               <a:t>Température</a:t>
             </a:r>
-            <a:endParaRPr b="0" lang="fr-CH" sz="2600" spc="-1" strike="noStrike">
-              <a:latin typeface="Arial"/>
-            </a:endParaRPr>
-          </a:p>
-          <a:p>
-            <a:pPr lvl="2" marL="648000" indent="-215640">
+            <a:endParaRPr b="0" lang="en-US" sz="2600" spc="-1" strike="noStrike">
+              <a:latin typeface="Arial"/>
+            </a:endParaRPr>
+          </a:p>
+          <a:p>
+            <a:pPr lvl="2" marL="648000" indent="-215280">
               <a:lnSpc>
                 <a:spcPct val="100000"/>
               </a:lnSpc>
@@ -4897,12 +4897,12 @@
               </a:rPr>
               <a:t>Humidité du sol</a:t>
             </a:r>
-            <a:endParaRPr b="0" lang="fr-CH" sz="2600" spc="-1" strike="noStrike">
-              <a:latin typeface="Arial"/>
-            </a:endParaRPr>
-          </a:p>
-          <a:p>
-            <a:pPr lvl="2" marL="648000" indent="-215640">
+            <a:endParaRPr b="0" lang="en-US" sz="2600" spc="-1" strike="noStrike">
+              <a:latin typeface="Arial"/>
+            </a:endParaRPr>
+          </a:p>
+          <a:p>
+            <a:pPr lvl="2" marL="648000" indent="-215280">
               <a:lnSpc>
                 <a:spcPct val="100000"/>
               </a:lnSpc>
@@ -4926,12 +4926,12 @@
               </a:rPr>
               <a:t>Ventilateur</a:t>
             </a:r>
-            <a:endParaRPr b="0" lang="fr-CH" sz="2600" spc="-1" strike="noStrike">
-              <a:latin typeface="Arial"/>
-            </a:endParaRPr>
-          </a:p>
-          <a:p>
-            <a:pPr lvl="2" marL="648000" indent="-215640">
+            <a:endParaRPr b="0" lang="en-US" sz="2600" spc="-1" strike="noStrike">
+              <a:latin typeface="Arial"/>
+            </a:endParaRPr>
+          </a:p>
+          <a:p>
+            <a:pPr lvl="2" marL="648000" indent="-215280">
               <a:lnSpc>
                 <a:spcPct val="100000"/>
               </a:lnSpc>
@@ -4955,12 +4955,12 @@
               </a:rPr>
               <a:t>Écran</a:t>
             </a:r>
-            <a:endParaRPr b="0" lang="fr-CH" sz="2600" spc="-1" strike="noStrike">
-              <a:latin typeface="Arial"/>
-            </a:endParaRPr>
-          </a:p>
-          <a:p>
-            <a:pPr lvl="1" marL="432000" indent="-215640">
+            <a:endParaRPr b="0" lang="en-US" sz="2600" spc="-1" strike="noStrike">
+              <a:latin typeface="Arial"/>
+            </a:endParaRPr>
+          </a:p>
+          <a:p>
+            <a:pPr lvl="1" marL="432000" indent="-215280">
               <a:lnSpc>
                 <a:spcPct val="100000"/>
               </a:lnSpc>
@@ -4984,7 +4984,7 @@
               </a:rPr>
               <a:t>Raspberry Pi 4b : MQTT, InfluxDB, Telegraf, Interface Web</a:t>
             </a:r>
-            <a:endParaRPr b="0" lang="fr-CH" sz="2600" spc="-1" strike="noStrike">
+            <a:endParaRPr b="0" lang="en-US" sz="2600" spc="-1" strike="noStrike">
               <a:latin typeface="Arial"/>
             </a:endParaRPr>
           </a:p>
@@ -4997,7 +4997,7 @@
                 <a:spcPts val="1417"/>
               </a:spcBef>
             </a:pPr>
-            <a:endParaRPr b="0" lang="fr-CH" sz="2600" spc="-1" strike="noStrike">
+            <a:endParaRPr b="0" lang="en-US" sz="2600" spc="-1" strike="noStrike">
               <a:latin typeface="Arial"/>
             </a:endParaRPr>
           </a:p>
@@ -5010,7 +5010,7 @@
                 <a:spcPts val="1417"/>
               </a:spcBef>
             </a:pPr>
-            <a:endParaRPr b="0" lang="fr-CH" sz="2600" spc="-1" strike="noStrike">
+            <a:endParaRPr b="0" lang="en-US" sz="2600" spc="-1" strike="noStrike">
               <a:latin typeface="Arial"/>
             </a:endParaRPr>
           </a:p>
@@ -5055,7 +5055,7 @@
         <p:spPr>
           <a:xfrm>
             <a:off x="0" y="0"/>
-            <a:ext cx="12188880" cy="892440"/>
+            <a:ext cx="12188520" cy="892080"/>
           </a:xfrm>
           <a:prstGeom prst="rect">
             <a:avLst/>
@@ -5124,7 +5124,7 @@
         <p:spPr>
           <a:xfrm>
             <a:off x="317520" y="93960"/>
-            <a:ext cx="11535120" cy="699120"/>
+            <a:ext cx="11534760" cy="699120"/>
           </a:xfrm>
           <a:prstGeom prst="rect">
             <a:avLst/>
@@ -5160,7 +5160,7 @@
               </a:rPr>
               <a:t>Schéma des communications</a:t>
             </a:r>
-            <a:endParaRPr b="0" lang="fr-CH" sz="4000" spc="-1" strike="noStrike">
+            <a:endParaRPr b="0" lang="en-US" sz="4000" spc="-1" strike="noStrike">
               <a:latin typeface="Arial"/>
             </a:endParaRPr>
           </a:p>
@@ -5175,7 +5175,7 @@
         <p:spPr>
           <a:xfrm>
             <a:off x="3145320" y="6400800"/>
-            <a:ext cx="5897880" cy="316800"/>
+            <a:ext cx="5897520" cy="316440"/>
           </a:xfrm>
           <a:prstGeom prst="rect">
             <a:avLst/>
@@ -5211,7 +5211,7 @@
               </a:rPr>
               <a:t>Présentation du projet IoT, HEIG-VD</a:t>
             </a:r>
-            <a:endParaRPr b="0" lang="fr-CH" sz="1400" spc="-1" strike="noStrike">
+            <a:endParaRPr b="0" lang="en-US" sz="1400" spc="-1" strike="noStrike">
               <a:latin typeface="Arial"/>
             </a:endParaRPr>
           </a:p>
@@ -5226,7 +5226,7 @@
         <p:spPr>
           <a:xfrm>
             <a:off x="11425680" y="6400800"/>
-            <a:ext cx="426960" cy="357480"/>
+            <a:ext cx="426600" cy="357120"/>
           </a:xfrm>
           <a:prstGeom prst="rect">
             <a:avLst/>
@@ -5254,7 +5254,7 @@
                 <a:spcPct val="100000"/>
               </a:lnSpc>
             </a:pPr>
-            <a:fld id="{D01037BE-F1A0-41C9-AD07-BB0C7580675D}" type="slidenum">
+            <a:fld id="{5BCEFB39-9333-4AC5-9218-411A9FF874BC}" type="slidenum">
               <a:rPr b="0" lang="en-GB" sz="1400" spc="-1" strike="noStrike">
                 <a:solidFill>
                   <a:srgbClr val="ffffff"/>
@@ -5264,7 +5264,7 @@
               </a:rPr>
               <a:t>4</a:t>
             </a:fld>
-            <a:endParaRPr b="0" lang="fr-CH" sz="1400" spc="-1" strike="noStrike">
+            <a:endParaRPr b="0" lang="en-US" sz="1400" spc="-1" strike="noStrike">
               <a:latin typeface="Arial"/>
             </a:endParaRPr>
           </a:p>
@@ -5279,7 +5279,7 @@
         <p:spPr>
           <a:xfrm>
             <a:off x="228600" y="228600"/>
-            <a:ext cx="11651400" cy="5257440"/>
+            <a:ext cx="11651040" cy="5257080"/>
           </a:xfrm>
           <a:prstGeom prst="rect">
             <a:avLst/>
@@ -5297,7 +5297,7 @@
         </p:style>
         <p:txBody>
           <a:bodyPr lIns="90000" rIns="90000" tIns="45000" bIns="45000">
-            <a:normAutofit fontScale="66000"/>
+            <a:normAutofit fontScale="70000"/>
           </a:bodyPr>
           <a:p>
             <a:pPr>
@@ -5308,7 +5308,7 @@
                 <a:spcPts val="1417"/>
               </a:spcBef>
             </a:pPr>
-            <a:endParaRPr b="0" lang="fr-CH" sz="1800" spc="-1" strike="noStrike">
+            <a:endParaRPr b="0" lang="en-US" sz="1800" spc="-1" strike="noStrike">
               <a:latin typeface="Arial"/>
             </a:endParaRPr>
           </a:p>
@@ -5321,7 +5321,7 @@
                 <a:spcPts val="1417"/>
               </a:spcBef>
             </a:pPr>
-            <a:endParaRPr b="0" lang="fr-CH" sz="1800" spc="-1" strike="noStrike">
+            <a:endParaRPr b="0" lang="en-US" sz="1800" spc="-1" strike="noStrike">
               <a:latin typeface="Arial"/>
             </a:endParaRPr>
           </a:p>
@@ -5334,12 +5334,12 @@
                 <a:spcPts val="1417"/>
               </a:spcBef>
             </a:pPr>
-            <a:endParaRPr b="0" lang="fr-CH" sz="1800" spc="-1" strike="noStrike">
-              <a:latin typeface="Arial"/>
-            </a:endParaRPr>
-          </a:p>
-          <a:p>
-            <a:pPr marL="432000" indent="-321120">
+            <a:endParaRPr b="0" lang="en-US" sz="1800" spc="-1" strike="noStrike">
+              <a:latin typeface="Arial"/>
+            </a:endParaRPr>
+          </a:p>
+          <a:p>
+            <a:pPr marL="432000" indent="-320760">
               <a:lnSpc>
                 <a:spcPct val="100000"/>
               </a:lnSpc>
@@ -5363,12 +5363,12 @@
               </a:rPr>
               <a:t>Publication de la config du device (device) :</a:t>
             </a:r>
-            <a:endParaRPr b="0" lang="fr-CH" sz="2600" spc="-1" strike="noStrike">
-              <a:latin typeface="Arial"/>
-            </a:endParaRPr>
-          </a:p>
-          <a:p>
-            <a:pPr lvl="2" marL="648000" indent="-216000">
+            <a:endParaRPr b="0" lang="en-US" sz="2600" spc="-1" strike="noStrike">
+              <a:latin typeface="Arial"/>
+            </a:endParaRPr>
+          </a:p>
+          <a:p>
+            <a:pPr lvl="2" marL="648000" indent="-215640">
               <a:lnSpc>
                 <a:spcPct val="100000"/>
               </a:lnSpc>
@@ -5392,12 +5392,12 @@
               </a:rPr>
               <a:t>commander/devices/&lt;device id&gt;/</a:t>
             </a:r>
-            <a:endParaRPr b="0" lang="fr-CH" sz="2600" spc="-1" strike="noStrike">
-              <a:latin typeface="Arial"/>
-            </a:endParaRPr>
-          </a:p>
-          <a:p>
-            <a:pPr lvl="2" marL="648000" indent="-216000">
+            <a:endParaRPr b="0" lang="en-US" sz="2600" spc="-1" strike="noStrike">
+              <a:latin typeface="Arial"/>
+            </a:endParaRPr>
+          </a:p>
+          <a:p>
+            <a:pPr lvl="2" marL="648000" indent="-215640">
               <a:lnSpc>
                 <a:spcPct val="100000"/>
               </a:lnSpc>
@@ -5421,12 +5421,12 @@
               </a:rPr>
               <a:t>{"deviceUID":"32203593719188","deviceLocation":"serre_1","measurement interval":3000,"sensors":["humidity","temperature","light"],"actions":""}</a:t>
             </a:r>
-            <a:endParaRPr b="0" lang="fr-CH" sz="2200" spc="-1" strike="noStrike">
-              <a:latin typeface="Arial"/>
-            </a:endParaRPr>
-          </a:p>
-          <a:p>
-            <a:pPr marL="432000" indent="-321120">
+            <a:endParaRPr b="0" lang="en-US" sz="2200" spc="-1" strike="noStrike">
+              <a:latin typeface="Arial"/>
+            </a:endParaRPr>
+          </a:p>
+          <a:p>
+            <a:pPr marL="432000" indent="-320760">
               <a:lnSpc>
                 <a:spcPct val="100000"/>
               </a:lnSpc>
@@ -5450,12 +5450,12 @@
               </a:rPr>
               <a:t>Publication des modifications de configuration (server) :</a:t>
             </a:r>
-            <a:endParaRPr b="0" lang="fr-CH" sz="2600" spc="-1" strike="noStrike">
-              <a:latin typeface="Arial"/>
-            </a:endParaRPr>
-          </a:p>
-          <a:p>
-            <a:pPr lvl="2" marL="648000" indent="-216000">
+            <a:endParaRPr b="0" lang="en-US" sz="2600" spc="-1" strike="noStrike">
+              <a:latin typeface="Arial"/>
+            </a:endParaRPr>
+          </a:p>
+          <a:p>
+            <a:pPr lvl="2" marL="648000" indent="-215640">
               <a:lnSpc>
                 <a:spcPct val="100000"/>
               </a:lnSpc>
@@ -5479,12 +5479,12 @@
               </a:rPr>
               <a:t>commander/devices/&lt;device id&gt;/update</a:t>
             </a:r>
-            <a:endParaRPr b="0" lang="fr-CH" sz="2600" spc="-1" strike="noStrike">
-              <a:latin typeface="Arial"/>
-            </a:endParaRPr>
-          </a:p>
-          <a:p>
-            <a:pPr marL="432000" indent="-321120">
+            <a:endParaRPr b="0" lang="en-US" sz="2600" spc="-1" strike="noStrike">
+              <a:latin typeface="Arial"/>
+            </a:endParaRPr>
+          </a:p>
+          <a:p>
+            <a:pPr marL="432000" indent="-320760">
               <a:lnSpc>
                 <a:spcPct val="100000"/>
               </a:lnSpc>
@@ -5508,12 +5508,12 @@
               </a:rPr>
               <a:t>Réception des configs (server) :</a:t>
             </a:r>
-            <a:endParaRPr b="0" lang="fr-CH" sz="2600" spc="-1" strike="noStrike">
-              <a:latin typeface="Arial"/>
-            </a:endParaRPr>
-          </a:p>
-          <a:p>
-            <a:pPr lvl="2" marL="648000" indent="-216000">
+            <a:endParaRPr b="0" lang="en-US" sz="2600" spc="-1" strike="noStrike">
+              <a:latin typeface="Arial"/>
+            </a:endParaRPr>
+          </a:p>
+          <a:p>
+            <a:pPr lvl="2" marL="648000" indent="-215640">
               <a:lnSpc>
                 <a:spcPct val="100000"/>
               </a:lnSpc>
@@ -5537,12 +5537,12 @@
               </a:rPr>
               <a:t>commander/devices/+</a:t>
             </a:r>
-            <a:endParaRPr b="0" lang="fr-CH" sz="2600" spc="-1" strike="noStrike">
-              <a:latin typeface="Arial"/>
-            </a:endParaRPr>
-          </a:p>
-          <a:p>
-            <a:pPr marL="432000" indent="-321120">
+            <a:endParaRPr b="0" lang="en-US" sz="2600" spc="-1" strike="noStrike">
+              <a:latin typeface="Arial"/>
+            </a:endParaRPr>
+          </a:p>
+          <a:p>
+            <a:pPr marL="432000" indent="-320760">
               <a:lnSpc>
                 <a:spcPct val="100000"/>
               </a:lnSpc>
@@ -5566,12 +5566,12 @@
               </a:rPr>
               <a:t>Réception et envoi des données (server et device) :</a:t>
             </a:r>
-            <a:endParaRPr b="0" lang="fr-CH" sz="2600" spc="-1" strike="noStrike">
-              <a:latin typeface="Arial"/>
-            </a:endParaRPr>
-          </a:p>
-          <a:p>
-            <a:pPr lvl="2" marL="648000" indent="-216000">
+            <a:endParaRPr b="0" lang="en-US" sz="2600" spc="-1" strike="noStrike">
+              <a:latin typeface="Arial"/>
+            </a:endParaRPr>
+          </a:p>
+          <a:p>
+            <a:pPr lvl="2" marL="648000" indent="-215640">
               <a:lnSpc>
                 <a:spcPct val="100000"/>
               </a:lnSpc>
@@ -5595,12 +5595,12 @@
               </a:rPr>
               <a:t>arduino/</a:t>
             </a:r>
-            <a:endParaRPr b="0" lang="fr-CH" sz="2600" spc="-1" strike="noStrike">
-              <a:latin typeface="Arial"/>
-            </a:endParaRPr>
-          </a:p>
-          <a:p>
-            <a:pPr lvl="2" marL="648000" indent="-216000">
+            <a:endParaRPr b="0" lang="en-US" sz="2600" spc="-1" strike="noStrike">
+              <a:latin typeface="Arial"/>
+            </a:endParaRPr>
+          </a:p>
+          <a:p>
+            <a:pPr lvl="2" marL="648000" indent="-215640">
               <a:lnSpc>
                 <a:spcPct val="100000"/>
               </a:lnSpc>
@@ -5624,7 +5624,7 @@
               </a:rPr>
               <a:t>humidity,device="32203593719188",location="serre_1" value="48.57"</a:t>
             </a:r>
-            <a:endParaRPr b="0" lang="fr-CH" sz="2200" spc="-1" strike="noStrike">
+            <a:endParaRPr b="0" lang="en-US" sz="2200" spc="-1" strike="noStrike">
               <a:latin typeface="Arial"/>
             </a:endParaRPr>
           </a:p>
@@ -5637,7 +5637,7 @@
                 <a:spcPts val="1417"/>
               </a:spcBef>
             </a:pPr>
-            <a:endParaRPr b="0" lang="fr-CH" sz="2200" spc="-1" strike="noStrike">
+            <a:endParaRPr b="0" lang="en-US" sz="2200" spc="-1" strike="noStrike">
               <a:latin typeface="Arial"/>
             </a:endParaRPr>
           </a:p>
@@ -5650,7 +5650,7 @@
                 <a:spcPts val="1417"/>
               </a:spcBef>
             </a:pPr>
-            <a:endParaRPr b="0" lang="fr-CH" sz="2200" spc="-1" strike="noStrike">
+            <a:endParaRPr b="0" lang="en-US" sz="2200" spc="-1" strike="noStrike">
               <a:latin typeface="Arial"/>
             </a:endParaRPr>
           </a:p>
@@ -5695,7 +5695,7 @@
         <p:spPr>
           <a:xfrm>
             <a:off x="0" y="0"/>
-            <a:ext cx="12188880" cy="892440"/>
+            <a:ext cx="12188520" cy="892080"/>
           </a:xfrm>
           <a:prstGeom prst="rect">
             <a:avLst/>
@@ -5764,7 +5764,7 @@
         <p:spPr>
           <a:xfrm>
             <a:off x="317520" y="93960"/>
-            <a:ext cx="11535120" cy="699120"/>
+            <a:ext cx="11534760" cy="699120"/>
           </a:xfrm>
           <a:prstGeom prst="rect">
             <a:avLst/>
@@ -5800,7 +5800,7 @@
               </a:rPr>
               <a:t>Architecture</a:t>
             </a:r>
-            <a:endParaRPr b="0" lang="fr-CH" sz="4000" spc="-1" strike="noStrike">
+            <a:endParaRPr b="0" lang="en-US" sz="4000" spc="-1" strike="noStrike">
               <a:latin typeface="Arial"/>
             </a:endParaRPr>
           </a:p>
@@ -5815,7 +5815,7 @@
         <p:spPr>
           <a:xfrm>
             <a:off x="3145320" y="6400800"/>
-            <a:ext cx="5897880" cy="316800"/>
+            <a:ext cx="5897520" cy="316440"/>
           </a:xfrm>
           <a:prstGeom prst="rect">
             <a:avLst/>
@@ -5851,7 +5851,7 @@
               </a:rPr>
               <a:t>Présentation du projet IoT, HEIG-VD</a:t>
             </a:r>
-            <a:endParaRPr b="0" lang="fr-CH" sz="1400" spc="-1" strike="noStrike">
+            <a:endParaRPr b="0" lang="en-US" sz="1400" spc="-1" strike="noStrike">
               <a:latin typeface="Arial"/>
             </a:endParaRPr>
           </a:p>
@@ -5866,7 +5866,7 @@
         <p:spPr>
           <a:xfrm>
             <a:off x="11425680" y="6400800"/>
-            <a:ext cx="426960" cy="357480"/>
+            <a:ext cx="426600" cy="357120"/>
           </a:xfrm>
           <a:prstGeom prst="rect">
             <a:avLst/>
@@ -5894,7 +5894,7 @@
                 <a:spcPct val="100000"/>
               </a:lnSpc>
             </a:pPr>
-            <a:fld id="{3285E9F7-66BF-4361-8D9C-C4D12B4EAF4D}" type="slidenum">
+            <a:fld id="{A2658D1C-A6FB-4CE4-B24C-A1995933DFA6}" type="slidenum">
               <a:rPr b="0" lang="en-GB" sz="1400" spc="-1" strike="noStrike">
                 <a:solidFill>
                   <a:srgbClr val="ffffff"/>
@@ -5904,7 +5904,7 @@
               </a:rPr>
               <a:t>5</a:t>
             </a:fld>
-            <a:endParaRPr b="0" lang="fr-CH" sz="1400" spc="-1" strike="noStrike">
+            <a:endParaRPr b="0" lang="en-US" sz="1400" spc="-1" strike="noStrike">
               <a:latin typeface="Arial"/>
             </a:endParaRPr>
           </a:p>
@@ -5919,7 +5919,7 @@
         <p:spPr>
           <a:xfrm>
             <a:off x="317520" y="1123920"/>
-            <a:ext cx="11516760" cy="5104080"/>
+            <a:ext cx="11516400" cy="5103720"/>
           </a:xfrm>
           <a:prstGeom prst="rect">
             <a:avLst/>
@@ -5944,13 +5944,12 @@
         </p:nvPicPr>
         <p:blipFill>
           <a:blip r:embed="rId1"/>
-          <a:srcRect l="166" t="0" r="0" b="0"/>
           <a:stretch/>
         </p:blipFill>
         <p:spPr>
           <a:xfrm>
-            <a:off x="1740240" y="1123920"/>
-            <a:ext cx="8654040" cy="4888080"/>
+            <a:off x="1724760" y="1123920"/>
+            <a:ext cx="8790840" cy="4944240"/>
           </a:xfrm>
           <a:prstGeom prst="rect">
             <a:avLst/>
@@ -5999,7 +5998,7 @@
         <p:spPr>
           <a:xfrm>
             <a:off x="0" y="0"/>
-            <a:ext cx="12188880" cy="892440"/>
+            <a:ext cx="12188520" cy="892080"/>
           </a:xfrm>
           <a:prstGeom prst="rect">
             <a:avLst/>
@@ -6068,7 +6067,7 @@
         <p:spPr>
           <a:xfrm>
             <a:off x="317520" y="93960"/>
-            <a:ext cx="11535120" cy="699120"/>
+            <a:ext cx="11534760" cy="699120"/>
           </a:xfrm>
           <a:prstGeom prst="rect">
             <a:avLst/>
@@ -6102,9 +6101,9 @@
                 <a:latin typeface="Arial"/>
                 <a:ea typeface="DejaVu Sans"/>
               </a:rPr>
-              <a:t>Si le temps le permet</a:t>
+              <a:t>Features</a:t>
             </a:r>
-            <a:endParaRPr b="0" lang="fr-CH" sz="4000" spc="-1" strike="noStrike">
+            <a:endParaRPr b="0" lang="en-US" sz="4000" spc="-1" strike="noStrike">
               <a:latin typeface="Arial"/>
             </a:endParaRPr>
           </a:p>
@@ -6119,7 +6118,7 @@
         <p:spPr>
           <a:xfrm>
             <a:off x="3145320" y="6400800"/>
-            <a:ext cx="5897880" cy="316800"/>
+            <a:ext cx="5897520" cy="316440"/>
           </a:xfrm>
           <a:prstGeom prst="rect">
             <a:avLst/>
@@ -6155,7 +6154,7 @@
               </a:rPr>
               <a:t>Présentation du projet IoT, HEIG-VD</a:t>
             </a:r>
-            <a:endParaRPr b="0" lang="fr-CH" sz="1400" spc="-1" strike="noStrike">
+            <a:endParaRPr b="0" lang="en-US" sz="1400" spc="-1" strike="noStrike">
               <a:latin typeface="Arial"/>
             </a:endParaRPr>
           </a:p>
@@ -6170,7 +6169,7 @@
         <p:spPr>
           <a:xfrm>
             <a:off x="11425680" y="6400800"/>
-            <a:ext cx="426960" cy="357480"/>
+            <a:ext cx="426600" cy="357120"/>
           </a:xfrm>
           <a:prstGeom prst="rect">
             <a:avLst/>
@@ -6198,7 +6197,7 @@
                 <a:spcPct val="100000"/>
               </a:lnSpc>
             </a:pPr>
-            <a:fld id="{D4E070C4-ECE9-483F-BA8C-ADD44889D20E}" type="slidenum">
+            <a:fld id="{A10DFF83-7D21-42F1-8EAA-F4B1F00CEEEB}" type="slidenum">
               <a:rPr b="0" lang="en-GB" sz="1400" spc="-1" strike="noStrike">
                 <a:solidFill>
                   <a:srgbClr val="ffffff"/>
@@ -6206,9 +6205,9 @@
                 <a:latin typeface="Arial"/>
                 <a:ea typeface="DejaVu Sans"/>
               </a:rPr>
-              <a:t>&lt;number&gt;</a:t>
+              <a:t>5</a:t>
             </a:fld>
-            <a:endParaRPr b="0" lang="fr-CH" sz="1400" spc="-1" strike="noStrike">
+            <a:endParaRPr b="0" lang="en-US" sz="1400" spc="-1" strike="noStrike">
               <a:latin typeface="Arial"/>
             </a:endParaRPr>
           </a:p>
@@ -6223,7 +6222,7 @@
         <p:spPr>
           <a:xfrm>
             <a:off x="317520" y="1123920"/>
-            <a:ext cx="11516760" cy="5104080"/>
+            <a:ext cx="11516400" cy="5103720"/>
           </a:xfrm>
           <a:prstGeom prst="rect">
             <a:avLst/>
@@ -6240,6 +6239,820 @@
           <a:fontRef idx="minor"/>
         </p:style>
       </p:sp>
+      <p:graphicFrame>
+        <p:nvGraphicFramePr>
+          <p:cNvPr id="117" name="Table 7"/>
+          <p:cNvGraphicFramePr/>
+          <p:nvPr/>
+        </p:nvGraphicFramePr>
+        <p:xfrm>
+          <a:off x="3223080" y="1860480"/>
+          <a:ext cx="5075280" cy="3362760"/>
+        </p:xfrm>
+        <a:graphic>
+          <a:graphicData uri="http://schemas.openxmlformats.org/drawingml/2006/table">
+            <a:tbl>
+              <a:tblPr/>
+              <a:tblGrid>
+                <a:gridCol w="2914560"/>
+                <a:gridCol w="2161080"/>
+              </a:tblGrid>
+              <a:tr h="367920">
+                <a:tc>
+                  <a:txBody>
+                    <a:bodyPr lIns="90000" rIns="90000" tIns="46800" bIns="46800">
+                      <a:noAutofit/>
+                    </a:bodyPr>
+                    <a:p>
+                      <a:r>
+                        <a:rPr b="0" lang="en-US" sz="1800" spc="-1" strike="noStrike">
+                          <a:latin typeface="Arial"/>
+                        </a:rPr>
+                        <a:t>Feature</a:t>
+                      </a:r>
+                      <a:endParaRPr b="0" lang="en-US" sz="1800" spc="-1" strike="noStrike">
+                        <a:latin typeface="Arial"/>
+                      </a:endParaRPr>
+                    </a:p>
+                  </a:txBody>
+                  <a:tcPr marL="90000" marR="90000">
+                    <a:lnL w="720">
+                      <a:solidFill>
+                        <a:srgbClr val="ffffff"/>
+                      </a:solidFill>
+                    </a:lnL>
+                    <a:lnR w="720">
+                      <a:solidFill>
+                        <a:srgbClr val="ffffff"/>
+                      </a:solidFill>
+                    </a:lnR>
+                    <a:lnT w="720">
+                      <a:solidFill>
+                        <a:srgbClr val="ffffff"/>
+                      </a:solidFill>
+                    </a:lnT>
+                    <a:lnB w="720">
+                      <a:solidFill>
+                        <a:srgbClr val="ffffff"/>
+                      </a:solidFill>
+                    </a:lnB>
+                    <a:solidFill>
+                      <a:srgbClr val="b3b3b3"/>
+                    </a:solidFill>
+                  </a:tcPr>
+                </a:tc>
+                <a:tc>
+                  <a:txBody>
+                    <a:bodyPr lIns="90000" rIns="90000" tIns="46800" bIns="46800">
+                      <a:noAutofit/>
+                    </a:bodyPr>
+                    <a:p>
+                      <a:r>
+                        <a:rPr b="0" lang="en-US" sz="1800" spc="-1" strike="noStrike">
+                          <a:latin typeface="Arial"/>
+                        </a:rPr>
+                        <a:t>Implémenté</a:t>
+                      </a:r>
+                      <a:endParaRPr b="0" lang="en-US" sz="1800" spc="-1" strike="noStrike">
+                        <a:latin typeface="Arial"/>
+                      </a:endParaRPr>
+                    </a:p>
+                  </a:txBody>
+                  <a:tcPr marL="90000" marR="90000">
+                    <a:lnL w="720">
+                      <a:solidFill>
+                        <a:srgbClr val="ffffff"/>
+                      </a:solidFill>
+                    </a:lnL>
+                    <a:lnR w="720">
+                      <a:solidFill>
+                        <a:srgbClr val="ffffff"/>
+                      </a:solidFill>
+                    </a:lnR>
+                    <a:lnT w="720">
+                      <a:solidFill>
+                        <a:srgbClr val="ffffff"/>
+                      </a:solidFill>
+                    </a:lnT>
+                    <a:lnB w="720">
+                      <a:solidFill>
+                        <a:srgbClr val="ffffff"/>
+                      </a:solidFill>
+                    </a:lnB>
+                    <a:solidFill>
+                      <a:srgbClr val="b3b3b3"/>
+                    </a:solidFill>
+                  </a:tcPr>
+                </a:tc>
+              </a:tr>
+              <a:tr h="374400">
+                <a:tc>
+                  <a:txBody>
+                    <a:bodyPr lIns="90000" rIns="90000" tIns="46800" bIns="46800">
+                      <a:noAutofit/>
+                    </a:bodyPr>
+                    <a:p>
+                      <a:r>
+                        <a:rPr b="0" lang="en-US" sz="1800" spc="-1" strike="noStrike">
+                          <a:latin typeface="Arial"/>
+                        </a:rPr>
+                        <a:t>Architecture</a:t>
+                      </a:r>
+                      <a:endParaRPr b="0" lang="en-US" sz="1800" spc="-1" strike="noStrike">
+                        <a:latin typeface="Arial"/>
+                      </a:endParaRPr>
+                    </a:p>
+                  </a:txBody>
+                  <a:tcPr marL="90000" marR="90000">
+                    <a:lnL w="720">
+                      <a:solidFill>
+                        <a:srgbClr val="ffffff"/>
+                      </a:solidFill>
+                    </a:lnL>
+                    <a:lnR w="720">
+                      <a:solidFill>
+                        <a:srgbClr val="ffffff"/>
+                      </a:solidFill>
+                    </a:lnR>
+                    <a:lnT w="720">
+                      <a:solidFill>
+                        <a:srgbClr val="ffffff"/>
+                      </a:solidFill>
+                    </a:lnT>
+                    <a:lnB w="720">
+                      <a:solidFill>
+                        <a:srgbClr val="ffffff"/>
+                      </a:solidFill>
+                    </a:lnB>
+                    <a:solidFill>
+                      <a:srgbClr val="cccccc"/>
+                    </a:solidFill>
+                  </a:tcPr>
+                </a:tc>
+                <a:tc>
+                  <a:txBody>
+                    <a:bodyPr lIns="90000" rIns="90000" tIns="46800" bIns="46800">
+                      <a:noAutofit/>
+                    </a:bodyPr>
+                    <a:p>
+                      <a:r>
+                        <a:rPr b="0" lang="en-US" sz="1800" spc="-1" strike="noStrike">
+                          <a:latin typeface="Arial"/>
+                        </a:rPr>
+                        <a:t>oui</a:t>
+                      </a:r>
+                      <a:endParaRPr b="0" lang="en-US" sz="1800" spc="-1" strike="noStrike">
+                        <a:latin typeface="Arial"/>
+                      </a:endParaRPr>
+                    </a:p>
+                  </a:txBody>
+                  <a:tcPr marL="90000" marR="90000">
+                    <a:lnL w="720">
+                      <a:solidFill>
+                        <a:srgbClr val="ffffff"/>
+                      </a:solidFill>
+                    </a:lnL>
+                    <a:lnR w="720">
+                      <a:solidFill>
+                        <a:srgbClr val="ffffff"/>
+                      </a:solidFill>
+                    </a:lnR>
+                    <a:lnT w="720">
+                      <a:solidFill>
+                        <a:srgbClr val="ffffff"/>
+                      </a:solidFill>
+                    </a:lnT>
+                    <a:lnB w="720">
+                      <a:solidFill>
+                        <a:srgbClr val="ffffff"/>
+                      </a:solidFill>
+                    </a:lnB>
+                    <a:solidFill>
+                      <a:srgbClr val="cccccc"/>
+                    </a:solidFill>
+                  </a:tcPr>
+                </a:tc>
+              </a:tr>
+              <a:tr h="374400">
+                <a:tc>
+                  <a:txBody>
+                    <a:bodyPr lIns="90000" rIns="90000" tIns="46800" bIns="46800">
+                      <a:noAutofit/>
+                    </a:bodyPr>
+                    <a:p>
+                      <a:r>
+                        <a:rPr b="0" lang="en-US" sz="1800" spc="-1" strike="noStrike">
+                          <a:latin typeface="Arial"/>
+                        </a:rPr>
+                        <a:t>Envoi mesures</a:t>
+                      </a:r>
+                      <a:endParaRPr b="0" lang="en-US" sz="1800" spc="-1" strike="noStrike">
+                        <a:latin typeface="Arial"/>
+                      </a:endParaRPr>
+                    </a:p>
+                  </a:txBody>
+                  <a:tcPr marL="90000" marR="90000">
+                    <a:lnL w="720">
+                      <a:solidFill>
+                        <a:srgbClr val="ffffff"/>
+                      </a:solidFill>
+                    </a:lnL>
+                    <a:lnR w="720">
+                      <a:solidFill>
+                        <a:srgbClr val="ffffff"/>
+                      </a:solidFill>
+                    </a:lnR>
+                    <a:lnT w="720">
+                      <a:solidFill>
+                        <a:srgbClr val="ffffff"/>
+                      </a:solidFill>
+                    </a:lnT>
+                    <a:lnB w="720">
+                      <a:solidFill>
+                        <a:srgbClr val="ffffff"/>
+                      </a:solidFill>
+                    </a:lnB>
+                    <a:solidFill>
+                      <a:srgbClr val="e6e6e6"/>
+                    </a:solidFill>
+                  </a:tcPr>
+                </a:tc>
+                <a:tc>
+                  <a:txBody>
+                    <a:bodyPr lIns="90000" rIns="90000" tIns="46800" bIns="46800">
+                      <a:noAutofit/>
+                    </a:bodyPr>
+                    <a:p>
+                      <a:r>
+                        <a:rPr b="0" lang="en-US" sz="1800" spc="-1" strike="noStrike">
+                          <a:latin typeface="Arial"/>
+                        </a:rPr>
+                        <a:t>oui</a:t>
+                      </a:r>
+                      <a:endParaRPr b="0" lang="en-US" sz="1800" spc="-1" strike="noStrike">
+                        <a:latin typeface="Arial"/>
+                      </a:endParaRPr>
+                    </a:p>
+                  </a:txBody>
+                  <a:tcPr marL="90000" marR="90000">
+                    <a:lnL w="720">
+                      <a:solidFill>
+                        <a:srgbClr val="ffffff"/>
+                      </a:solidFill>
+                    </a:lnL>
+                    <a:lnR w="720">
+                      <a:solidFill>
+                        <a:srgbClr val="ffffff"/>
+                      </a:solidFill>
+                    </a:lnR>
+                    <a:lnT w="720">
+                      <a:solidFill>
+                        <a:srgbClr val="ffffff"/>
+                      </a:solidFill>
+                    </a:lnT>
+                    <a:lnB w="720">
+                      <a:solidFill>
+                        <a:srgbClr val="ffffff"/>
+                      </a:solidFill>
+                    </a:lnB>
+                    <a:solidFill>
+                      <a:srgbClr val="e6e6e6"/>
+                    </a:solidFill>
+                  </a:tcPr>
+                </a:tc>
+              </a:tr>
+              <a:tr h="374400">
+                <a:tc>
+                  <a:txBody>
+                    <a:bodyPr lIns="90000" rIns="90000" tIns="46800" bIns="46800">
+                      <a:noAutofit/>
+                    </a:bodyPr>
+                    <a:p>
+                      <a:r>
+                        <a:rPr b="0" lang="en-US" sz="1800" spc="-1" strike="noStrike">
+                          <a:latin typeface="Arial"/>
+                        </a:rPr>
+                        <a:t>Envoi config</a:t>
+                      </a:r>
+                      <a:endParaRPr b="0" lang="en-US" sz="1800" spc="-1" strike="noStrike">
+                        <a:latin typeface="Arial"/>
+                      </a:endParaRPr>
+                    </a:p>
+                  </a:txBody>
+                  <a:tcPr marL="90000" marR="90000">
+                    <a:lnL w="720">
+                      <a:solidFill>
+                        <a:srgbClr val="ffffff"/>
+                      </a:solidFill>
+                    </a:lnL>
+                    <a:lnR w="720">
+                      <a:solidFill>
+                        <a:srgbClr val="ffffff"/>
+                      </a:solidFill>
+                    </a:lnR>
+                    <a:lnT w="720">
+                      <a:solidFill>
+                        <a:srgbClr val="ffffff"/>
+                      </a:solidFill>
+                    </a:lnT>
+                    <a:lnB w="720">
+                      <a:solidFill>
+                        <a:srgbClr val="ffffff"/>
+                      </a:solidFill>
+                    </a:lnB>
+                    <a:solidFill>
+                      <a:srgbClr val="cccccc"/>
+                    </a:solidFill>
+                  </a:tcPr>
+                </a:tc>
+                <a:tc>
+                  <a:txBody>
+                    <a:bodyPr lIns="90000" rIns="90000" tIns="46800" bIns="46800">
+                      <a:noAutofit/>
+                    </a:bodyPr>
+                    <a:p>
+                      <a:r>
+                        <a:rPr b="0" lang="en-US" sz="1800" spc="-1" strike="noStrike">
+                          <a:latin typeface="Arial"/>
+                        </a:rPr>
+                        <a:t>oui</a:t>
+                      </a:r>
+                      <a:endParaRPr b="0" lang="en-US" sz="1800" spc="-1" strike="noStrike">
+                        <a:latin typeface="Arial"/>
+                      </a:endParaRPr>
+                    </a:p>
+                  </a:txBody>
+                  <a:tcPr marL="90000" marR="90000">
+                    <a:lnL w="720">
+                      <a:solidFill>
+                        <a:srgbClr val="ffffff"/>
+                      </a:solidFill>
+                    </a:lnL>
+                    <a:lnR w="720">
+                      <a:solidFill>
+                        <a:srgbClr val="ffffff"/>
+                      </a:solidFill>
+                    </a:lnR>
+                    <a:lnT w="720">
+                      <a:solidFill>
+                        <a:srgbClr val="ffffff"/>
+                      </a:solidFill>
+                    </a:lnT>
+                    <a:lnB w="720">
+                      <a:solidFill>
+                        <a:srgbClr val="ffffff"/>
+                      </a:solidFill>
+                    </a:lnB>
+                    <a:solidFill>
+                      <a:srgbClr val="cccccc"/>
+                    </a:solidFill>
+                  </a:tcPr>
+                </a:tc>
+              </a:tr>
+              <a:tr h="374400">
+                <a:tc>
+                  <a:txBody>
+                    <a:bodyPr lIns="90000" rIns="90000" tIns="46800" bIns="46800">
+                      <a:noAutofit/>
+                    </a:bodyPr>
+                    <a:p>
+                      <a:r>
+                        <a:rPr b="0" lang="en-US" sz="1800" spc="-1" strike="noStrike">
+                          <a:latin typeface="Arial"/>
+                        </a:rPr>
+                        <a:t>Ingestion données</a:t>
+                      </a:r>
+                      <a:endParaRPr b="0" lang="en-US" sz="1800" spc="-1" strike="noStrike">
+                        <a:latin typeface="Arial"/>
+                      </a:endParaRPr>
+                    </a:p>
+                  </a:txBody>
+                  <a:tcPr marL="90000" marR="90000">
+                    <a:lnL w="720">
+                      <a:solidFill>
+                        <a:srgbClr val="ffffff"/>
+                      </a:solidFill>
+                    </a:lnL>
+                    <a:lnR w="720">
+                      <a:solidFill>
+                        <a:srgbClr val="ffffff"/>
+                      </a:solidFill>
+                    </a:lnR>
+                    <a:lnT w="720">
+                      <a:solidFill>
+                        <a:srgbClr val="ffffff"/>
+                      </a:solidFill>
+                    </a:lnT>
+                    <a:lnB w="720">
+                      <a:solidFill>
+                        <a:srgbClr val="ffffff"/>
+                      </a:solidFill>
+                    </a:lnB>
+                    <a:solidFill>
+                      <a:srgbClr val="e6e6e6"/>
+                    </a:solidFill>
+                  </a:tcPr>
+                </a:tc>
+                <a:tc>
+                  <a:txBody>
+                    <a:bodyPr lIns="90000" rIns="90000" tIns="46800" bIns="46800">
+                      <a:noAutofit/>
+                    </a:bodyPr>
+                    <a:p>
+                      <a:r>
+                        <a:rPr b="0" lang="en-US" sz="1800" spc="-1" strike="noStrike">
+                          <a:latin typeface="Arial"/>
+                        </a:rPr>
+                        <a:t>oui</a:t>
+                      </a:r>
+                      <a:endParaRPr b="0" lang="en-US" sz="1800" spc="-1" strike="noStrike">
+                        <a:latin typeface="Arial"/>
+                      </a:endParaRPr>
+                    </a:p>
+                  </a:txBody>
+                  <a:tcPr marL="90000" marR="90000">
+                    <a:lnL w="720">
+                      <a:solidFill>
+                        <a:srgbClr val="ffffff"/>
+                      </a:solidFill>
+                    </a:lnL>
+                    <a:lnR w="720">
+                      <a:solidFill>
+                        <a:srgbClr val="ffffff"/>
+                      </a:solidFill>
+                    </a:lnR>
+                    <a:lnT w="720">
+                      <a:solidFill>
+                        <a:srgbClr val="ffffff"/>
+                      </a:solidFill>
+                    </a:lnT>
+                    <a:lnB w="720">
+                      <a:solidFill>
+                        <a:srgbClr val="ffffff"/>
+                      </a:solidFill>
+                    </a:lnB>
+                    <a:solidFill>
+                      <a:srgbClr val="e6e6e6"/>
+                    </a:solidFill>
+                  </a:tcPr>
+                </a:tc>
+              </a:tr>
+              <a:tr h="374400">
+                <a:tc>
+                  <a:txBody>
+                    <a:bodyPr lIns="90000" rIns="90000" tIns="46800" bIns="46800">
+                      <a:noAutofit/>
+                    </a:bodyPr>
+                    <a:p>
+                      <a:r>
+                        <a:rPr b="0" lang="en-US" sz="1800" spc="-1" strike="noStrike">
+                          <a:latin typeface="Arial"/>
+                        </a:rPr>
+                        <a:t>Sécurité de la serre</a:t>
+                      </a:r>
+                      <a:endParaRPr b="0" lang="en-US" sz="1800" spc="-1" strike="noStrike">
+                        <a:latin typeface="Arial"/>
+                      </a:endParaRPr>
+                    </a:p>
+                  </a:txBody>
+                  <a:tcPr marL="90000" marR="90000">
+                    <a:lnL w="720">
+                      <a:solidFill>
+                        <a:srgbClr val="ffffff"/>
+                      </a:solidFill>
+                    </a:lnL>
+                    <a:lnR w="720">
+                      <a:solidFill>
+                        <a:srgbClr val="ffffff"/>
+                      </a:solidFill>
+                    </a:lnR>
+                    <a:lnT w="720">
+                      <a:solidFill>
+                        <a:srgbClr val="ffffff"/>
+                      </a:solidFill>
+                    </a:lnT>
+                    <a:lnB w="720">
+                      <a:solidFill>
+                        <a:srgbClr val="ffffff"/>
+                      </a:solidFill>
+                    </a:lnB>
+                    <a:solidFill>
+                      <a:srgbClr val="cccccc"/>
+                    </a:solidFill>
+                  </a:tcPr>
+                </a:tc>
+                <a:tc>
+                  <a:txBody>
+                    <a:bodyPr lIns="90000" rIns="90000" tIns="46800" bIns="46800">
+                      <a:noAutofit/>
+                    </a:bodyPr>
+                    <a:p>
+                      <a:r>
+                        <a:rPr b="0" lang="en-US" sz="1800" spc="-1" strike="noStrike">
+                          <a:latin typeface="Arial"/>
+                        </a:rPr>
+                        <a:t>non</a:t>
+                      </a:r>
+                      <a:endParaRPr b="0" lang="en-US" sz="1800" spc="-1" strike="noStrike">
+                        <a:latin typeface="Arial"/>
+                      </a:endParaRPr>
+                    </a:p>
+                  </a:txBody>
+                  <a:tcPr marL="90000" marR="90000">
+                    <a:lnL w="720">
+                      <a:solidFill>
+                        <a:srgbClr val="ffffff"/>
+                      </a:solidFill>
+                    </a:lnL>
+                    <a:lnR w="720">
+                      <a:solidFill>
+                        <a:srgbClr val="ffffff"/>
+                      </a:solidFill>
+                    </a:lnR>
+                    <a:lnT w="720">
+                      <a:solidFill>
+                        <a:srgbClr val="ffffff"/>
+                      </a:solidFill>
+                    </a:lnT>
+                    <a:lnB w="720">
+                      <a:solidFill>
+                        <a:srgbClr val="ffffff"/>
+                      </a:solidFill>
+                    </a:lnB>
+                    <a:solidFill>
+                      <a:srgbClr val="cccccc"/>
+                    </a:solidFill>
+                  </a:tcPr>
+                </a:tc>
+              </a:tr>
+              <a:tr h="374400">
+                <a:tc>
+                  <a:txBody>
+                    <a:bodyPr lIns="90000" rIns="90000" tIns="46800" bIns="46800">
+                      <a:noAutofit/>
+                    </a:bodyPr>
+                    <a:p>
+                      <a:r>
+                        <a:rPr b="0" lang="en-US" sz="1800" spc="-1" strike="noStrike">
+                          <a:latin typeface="Arial"/>
+                        </a:rPr>
+                        <a:t>Update des configs</a:t>
+                      </a:r>
+                      <a:endParaRPr b="0" lang="en-US" sz="1800" spc="-1" strike="noStrike">
+                        <a:latin typeface="Arial"/>
+                      </a:endParaRPr>
+                    </a:p>
+                  </a:txBody>
+                  <a:tcPr marL="90000" marR="90000">
+                    <a:lnL w="720">
+                      <a:solidFill>
+                        <a:srgbClr val="ffffff"/>
+                      </a:solidFill>
+                    </a:lnL>
+                    <a:lnR w="720">
+                      <a:solidFill>
+                        <a:srgbClr val="ffffff"/>
+                      </a:solidFill>
+                    </a:lnR>
+                    <a:lnT w="720">
+                      <a:solidFill>
+                        <a:srgbClr val="ffffff"/>
+                      </a:solidFill>
+                    </a:lnT>
+                    <a:lnB w="720">
+                      <a:solidFill>
+                        <a:srgbClr val="ffffff"/>
+                      </a:solidFill>
+                    </a:lnB>
+                    <a:solidFill>
+                      <a:srgbClr val="e6e6e6"/>
+                    </a:solidFill>
+                  </a:tcPr>
+                </a:tc>
+                <a:tc>
+                  <a:txBody>
+                    <a:bodyPr lIns="90000" rIns="90000" tIns="46800" bIns="46800">
+                      <a:noAutofit/>
+                    </a:bodyPr>
+                    <a:p>
+                      <a:r>
+                        <a:rPr b="0" lang="en-US" sz="1800" spc="-1" strike="noStrike">
+                          <a:latin typeface="Arial"/>
+                        </a:rPr>
+                        <a:t>oui</a:t>
+                      </a:r>
+                      <a:endParaRPr b="0" lang="en-US" sz="1800" spc="-1" strike="noStrike">
+                        <a:latin typeface="Arial"/>
+                      </a:endParaRPr>
+                    </a:p>
+                  </a:txBody>
+                  <a:tcPr marL="90000" marR="90000">
+                    <a:lnL w="720">
+                      <a:solidFill>
+                        <a:srgbClr val="ffffff"/>
+                      </a:solidFill>
+                    </a:lnL>
+                    <a:lnR w="720">
+                      <a:solidFill>
+                        <a:srgbClr val="ffffff"/>
+                      </a:solidFill>
+                    </a:lnR>
+                    <a:lnT w="720">
+                      <a:solidFill>
+                        <a:srgbClr val="ffffff"/>
+                      </a:solidFill>
+                    </a:lnT>
+                    <a:lnB w="720">
+                      <a:solidFill>
+                        <a:srgbClr val="ffffff"/>
+                      </a:solidFill>
+                    </a:lnB>
+                    <a:solidFill>
+                      <a:srgbClr val="e6e6e6"/>
+                    </a:solidFill>
+                  </a:tcPr>
+                </a:tc>
+              </a:tr>
+              <a:tr h="374400">
+                <a:tc>
+                  <a:txBody>
+                    <a:bodyPr lIns="90000" rIns="90000" tIns="46800" bIns="46800">
+                      <a:noAutofit/>
+                    </a:bodyPr>
+                    <a:p>
+                      <a:r>
+                        <a:rPr b="0" lang="en-US" sz="1800" spc="-1" strike="noStrike">
+                          <a:latin typeface="Arial"/>
+                        </a:rPr>
+                        <a:t>Visualisation des données</a:t>
+                      </a:r>
+                      <a:endParaRPr b="0" lang="en-US" sz="1800" spc="-1" strike="noStrike">
+                        <a:latin typeface="Arial"/>
+                      </a:endParaRPr>
+                    </a:p>
+                  </a:txBody>
+                  <a:tcPr marL="90000" marR="90000">
+                    <a:lnL w="720">
+                      <a:solidFill>
+                        <a:srgbClr val="ffffff"/>
+                      </a:solidFill>
+                    </a:lnL>
+                    <a:lnR w="720">
+                      <a:solidFill>
+                        <a:srgbClr val="ffffff"/>
+                      </a:solidFill>
+                    </a:lnR>
+                    <a:lnT w="720">
+                      <a:solidFill>
+                        <a:srgbClr val="ffffff"/>
+                      </a:solidFill>
+                    </a:lnT>
+                    <a:lnB w="720">
+                      <a:solidFill>
+                        <a:srgbClr val="ffffff"/>
+                      </a:solidFill>
+                    </a:lnB>
+                    <a:solidFill>
+                      <a:srgbClr val="cccccc"/>
+                    </a:solidFill>
+                  </a:tcPr>
+                </a:tc>
+                <a:tc>
+                  <a:txBody>
+                    <a:bodyPr lIns="90000" rIns="90000" tIns="46800" bIns="46800">
+                      <a:noAutofit/>
+                    </a:bodyPr>
+                    <a:p>
+                      <a:r>
+                        <a:rPr b="0" lang="en-US" sz="1800" spc="-1" strike="noStrike">
+                          <a:latin typeface="Arial"/>
+                        </a:rPr>
+                        <a:t>oui</a:t>
+                      </a:r>
+                      <a:endParaRPr b="0" lang="en-US" sz="1800" spc="-1" strike="noStrike">
+                        <a:latin typeface="Arial"/>
+                      </a:endParaRPr>
+                    </a:p>
+                  </a:txBody>
+                  <a:tcPr marL="90000" marR="90000">
+                    <a:lnL w="720">
+                      <a:solidFill>
+                        <a:srgbClr val="ffffff"/>
+                      </a:solidFill>
+                    </a:lnL>
+                    <a:lnR w="720">
+                      <a:solidFill>
+                        <a:srgbClr val="ffffff"/>
+                      </a:solidFill>
+                    </a:lnR>
+                    <a:lnT w="720">
+                      <a:solidFill>
+                        <a:srgbClr val="ffffff"/>
+                      </a:solidFill>
+                    </a:lnT>
+                    <a:lnB w="720">
+                      <a:solidFill>
+                        <a:srgbClr val="ffffff"/>
+                      </a:solidFill>
+                    </a:lnB>
+                    <a:solidFill>
+                      <a:srgbClr val="cccccc"/>
+                    </a:solidFill>
+                  </a:tcPr>
+                </a:tc>
+              </a:tr>
+              <a:tr h="374400">
+                <a:tc>
+                  <a:txBody>
+                    <a:bodyPr lIns="90000" rIns="90000" tIns="46800" bIns="46800">
+                      <a:noAutofit/>
+                    </a:bodyPr>
+                    <a:p>
+                      <a:r>
+                        <a:rPr b="0" lang="en-US" sz="1800" spc="-1" strike="noStrike">
+                          <a:latin typeface="Arial"/>
+                        </a:rPr>
+                        <a:t>Automatisation actuateurs</a:t>
+                      </a:r>
+                      <a:endParaRPr b="0" lang="en-US" sz="1800" spc="-1" strike="noStrike">
+                        <a:latin typeface="Arial"/>
+                      </a:endParaRPr>
+                    </a:p>
+                  </a:txBody>
+                  <a:tcPr marL="90000" marR="90000">
+                    <a:lnL w="720">
+                      <a:solidFill>
+                        <a:srgbClr val="ffffff"/>
+                      </a:solidFill>
+                    </a:lnL>
+                    <a:lnR w="720">
+                      <a:solidFill>
+                        <a:srgbClr val="ffffff"/>
+                      </a:solidFill>
+                    </a:lnR>
+                    <a:lnT w="720">
+                      <a:solidFill>
+                        <a:srgbClr val="ffffff"/>
+                      </a:solidFill>
+                    </a:lnT>
+                    <a:lnB w="720">
+                      <a:solidFill>
+                        <a:srgbClr val="ffffff"/>
+                      </a:solidFill>
+                    </a:lnB>
+                    <a:solidFill>
+                      <a:srgbClr val="e6e6e6"/>
+                    </a:solidFill>
+                  </a:tcPr>
+                </a:tc>
+                <a:tc>
+                  <a:txBody>
+                    <a:bodyPr lIns="90000" rIns="90000" tIns="46800" bIns="46800">
+                      <a:noAutofit/>
+                    </a:bodyPr>
+                    <a:p>
+                      <a:r>
+                        <a:rPr b="0" lang="en-US" sz="1800" spc="-1" strike="noStrike">
+                          <a:latin typeface="Arial"/>
+                        </a:rPr>
+                        <a:t>oui</a:t>
+                      </a:r>
+                      <a:endParaRPr b="0" lang="en-US" sz="1800" spc="-1" strike="noStrike">
+                        <a:latin typeface="Arial"/>
+                      </a:endParaRPr>
+                    </a:p>
+                  </a:txBody>
+                  <a:tcPr marL="90000" marR="90000">
+                    <a:lnL w="720">
+                      <a:solidFill>
+                        <a:srgbClr val="ffffff"/>
+                      </a:solidFill>
+                    </a:lnL>
+                    <a:lnR w="720">
+                      <a:solidFill>
+                        <a:srgbClr val="ffffff"/>
+                      </a:solidFill>
+                    </a:lnR>
+                    <a:lnT w="720">
+                      <a:solidFill>
+                        <a:srgbClr val="ffffff"/>
+                      </a:solidFill>
+                    </a:lnT>
+                    <a:lnB w="720">
+                      <a:solidFill>
+                        <a:srgbClr val="ffffff"/>
+                      </a:solidFill>
+                    </a:lnB>
+                    <a:solidFill>
+                      <a:srgbClr val="e6e6e6"/>
+                    </a:solidFill>
+                  </a:tcPr>
+                </a:tc>
+              </a:tr>
+            </a:tbl>
+          </a:graphicData>
+        </a:graphic>
+      </p:graphicFrame>
     </p:spTree>
   </p:cSld>
   <mc:AlternateContent>

</xml_diff>

<commit_message>
Add repartition slide to pres
</commit_message>
<xml_diff>
--- a/IOT_projet_final_CokeMbayoSalhi.pptx
+++ b/IOT_projet_final_CokeMbayoSalhi.pptx
@@ -13,6 +13,7 @@
     <p:sldId id="260" r:id="rId8"/>
     <p:sldId id="261" r:id="rId9"/>
     <p:sldId id="262" r:id="rId10"/>
+    <p:sldId id="263" r:id="rId11"/>
   </p:sldIdLst>
   <p:sldSz cx="12192000" cy="6858000"/>
   <p:notesSz cx="7559675" cy="10691812"/>
@@ -3284,7 +3285,7 @@
         <p:spPr>
           <a:xfrm>
             <a:off x="2235240" y="1820160"/>
-            <a:ext cx="7718040" cy="1906200"/>
+            <a:ext cx="7717680" cy="1905840"/>
           </a:xfrm>
           <a:prstGeom prst="rect">
             <a:avLst/>
@@ -3340,7 +3341,7 @@
         <p:spPr>
           <a:xfrm>
             <a:off x="1523880" y="4719600"/>
-            <a:ext cx="9140400" cy="1652040"/>
+            <a:ext cx="9140040" cy="1651680"/>
           </a:xfrm>
           <a:prstGeom prst="rect">
             <a:avLst/>
@@ -3439,7 +3440,7 @@
         <p:spPr>
           <a:xfrm>
             <a:off x="8610480" y="6356520"/>
-            <a:ext cx="2739600" cy="361440"/>
+            <a:ext cx="2739240" cy="361080"/>
           </a:xfrm>
           <a:prstGeom prst="rect">
             <a:avLst/>
@@ -3465,7 +3466,7 @@
                 <a:spcPct val="100000"/>
               </a:lnSpc>
             </a:pPr>
-            <a:fld id="{1D86842D-9DEA-40AC-8A25-D0A43F0706D3}" type="slidenum">
+            <a:fld id="{5C9B2E0E-331F-4AE7-868A-7C35B5F12EA0}" type="slidenum">
               <a:rPr b="0" lang="fr-FR" sz="1200" spc="-1" strike="noStrike">
                 <a:solidFill>
                   <a:srgbClr val="8b8b8b"/>
@@ -3490,7 +3491,7 @@
         <p:spPr>
           <a:xfrm>
             <a:off x="4038480" y="6356520"/>
-            <a:ext cx="4111200" cy="361440"/>
+            <a:ext cx="4110840" cy="361080"/>
           </a:xfrm>
           <a:prstGeom prst="rect">
             <a:avLst/>
@@ -3571,7 +3572,7 @@
         <p:spPr>
           <a:xfrm>
             <a:off x="0" y="0"/>
-            <a:ext cx="12188880" cy="892440"/>
+            <a:ext cx="12188520" cy="892080"/>
           </a:xfrm>
           <a:prstGeom prst="rect">
             <a:avLst/>
@@ -3607,7 +3608,7 @@
         <p:spPr>
           <a:xfrm>
             <a:off x="317520" y="1123920"/>
-            <a:ext cx="11516760" cy="5104080"/>
+            <a:ext cx="11516400" cy="5103720"/>
           </a:xfrm>
           <a:prstGeom prst="rect">
             <a:avLst/>
@@ -3667,7 +3668,7 @@
             </a:endParaRPr>
           </a:p>
           <a:p>
-            <a:pPr marL="228600" indent="-225360">
+            <a:pPr marL="228600" indent="-225000">
               <a:lnSpc>
                 <a:spcPct val="90000"/>
               </a:lnSpc>
@@ -3695,7 +3696,7 @@
             </a:endParaRPr>
           </a:p>
           <a:p>
-            <a:pPr marL="228600" indent="-225360">
+            <a:pPr marL="228600" indent="-225000">
               <a:lnSpc>
                 <a:spcPct val="90000"/>
               </a:lnSpc>
@@ -3723,7 +3724,7 @@
             </a:endParaRPr>
           </a:p>
           <a:p>
-            <a:pPr marL="228600" indent="-225360">
+            <a:pPr marL="228600" indent="-225000">
               <a:lnSpc>
                 <a:spcPct val="90000"/>
               </a:lnSpc>
@@ -3751,7 +3752,7 @@
             </a:endParaRPr>
           </a:p>
           <a:p>
-            <a:pPr marL="228600" indent="-225360">
+            <a:pPr marL="228600" indent="-225000">
               <a:lnSpc>
                 <a:spcPct val="90000"/>
               </a:lnSpc>
@@ -3822,7 +3823,7 @@
         <p:spPr>
           <a:xfrm>
             <a:off x="317520" y="93960"/>
-            <a:ext cx="11535120" cy="699120"/>
+            <a:ext cx="11534760" cy="699120"/>
           </a:xfrm>
           <a:prstGeom prst="rect">
             <a:avLst/>
@@ -3873,7 +3874,7 @@
         <p:spPr>
           <a:xfrm>
             <a:off x="3145320" y="6400800"/>
-            <a:ext cx="5897880" cy="316800"/>
+            <a:ext cx="5897520" cy="316440"/>
           </a:xfrm>
           <a:prstGeom prst="rect">
             <a:avLst/>
@@ -3924,7 +3925,7 @@
         <p:spPr>
           <a:xfrm>
             <a:off x="11425680" y="6400800"/>
-            <a:ext cx="426960" cy="357480"/>
+            <a:ext cx="426600" cy="357120"/>
           </a:xfrm>
           <a:prstGeom prst="rect">
             <a:avLst/>
@@ -3952,7 +3953,7 @@
                 <a:spcPct val="100000"/>
               </a:lnSpc>
             </a:pPr>
-            <a:fld id="{3A066992-BB09-4773-B277-B22CE908DC86}" type="slidenum">
+            <a:fld id="{8DFD9872-E9B1-42A5-A248-80D1C765FEFF}" type="slidenum">
               <a:rPr b="0" lang="en-GB" sz="1400" spc="-1" strike="noStrike">
                 <a:solidFill>
                   <a:srgbClr val="ffffff"/>
@@ -4007,7 +4008,7 @@
         <p:spPr>
           <a:xfrm>
             <a:off x="0" y="0"/>
-            <a:ext cx="12188520" cy="892080"/>
+            <a:ext cx="12188160" cy="891720"/>
           </a:xfrm>
           <a:prstGeom prst="rect">
             <a:avLst/>
@@ -4076,7 +4077,7 @@
         <p:spPr>
           <a:xfrm>
             <a:off x="317520" y="93960"/>
-            <a:ext cx="11534760" cy="699120"/>
+            <a:ext cx="11534400" cy="699120"/>
           </a:xfrm>
           <a:prstGeom prst="rect">
             <a:avLst/>
@@ -4127,7 +4128,7 @@
         <p:spPr>
           <a:xfrm>
             <a:off x="3145320" y="6400800"/>
-            <a:ext cx="5897520" cy="316440"/>
+            <a:ext cx="5897160" cy="316080"/>
           </a:xfrm>
           <a:prstGeom prst="rect">
             <a:avLst/>
@@ -4178,7 +4179,7 @@
         <p:spPr>
           <a:xfrm>
             <a:off x="11425680" y="6400800"/>
-            <a:ext cx="426600" cy="357120"/>
+            <a:ext cx="426240" cy="356760"/>
           </a:xfrm>
           <a:prstGeom prst="rect">
             <a:avLst/>
@@ -4206,7 +4207,7 @@
                 <a:spcPct val="100000"/>
               </a:lnSpc>
             </a:pPr>
-            <a:fld id="{5FDDB74C-20A0-45E6-A79C-2EA472B7609D}" type="slidenum">
+            <a:fld id="{E4A06D83-40E8-43E7-95E6-ACE9BDF763F2}" type="slidenum">
               <a:rPr b="0" lang="en-GB" sz="1400" spc="-1" strike="noStrike">
                 <a:solidFill>
                   <a:srgbClr val="ffffff"/>
@@ -4231,7 +4232,7 @@
         <p:spPr>
           <a:xfrm>
             <a:off x="317520" y="1123920"/>
-            <a:ext cx="11516400" cy="5103720"/>
+            <a:ext cx="11516040" cy="5103360"/>
           </a:xfrm>
           <a:prstGeom prst="rect">
             <a:avLst/>
@@ -4291,7 +4292,7 @@
             </a:endParaRPr>
           </a:p>
           <a:p>
-            <a:pPr marL="432000" indent="-320760">
+            <a:pPr marL="432000" indent="-320400">
               <a:lnSpc>
                 <a:spcPct val="100000"/>
               </a:lnSpc>
@@ -4320,7 +4321,7 @@
             </a:endParaRPr>
           </a:p>
           <a:p>
-            <a:pPr marL="432000" indent="-320760">
+            <a:pPr marL="432000" indent="-320400">
               <a:lnSpc>
                 <a:spcPct val="100000"/>
               </a:lnSpc>
@@ -4349,7 +4350,7 @@
             </a:endParaRPr>
           </a:p>
           <a:p>
-            <a:pPr marL="432000" indent="-320760">
+            <a:pPr marL="432000" indent="-320400">
               <a:lnSpc>
                 <a:spcPct val="100000"/>
               </a:lnSpc>
@@ -4444,7 +4445,7 @@
         <p:spPr>
           <a:xfrm>
             <a:off x="0" y="0"/>
-            <a:ext cx="12188520" cy="892080"/>
+            <a:ext cx="12188160" cy="891720"/>
           </a:xfrm>
           <a:prstGeom prst="rect">
             <a:avLst/>
@@ -4513,7 +4514,7 @@
         <p:spPr>
           <a:xfrm>
             <a:off x="317520" y="93960"/>
-            <a:ext cx="11534760" cy="699120"/>
+            <a:ext cx="11534400" cy="699120"/>
           </a:xfrm>
           <a:prstGeom prst="rect">
             <a:avLst/>
@@ -4564,7 +4565,7 @@
         <p:spPr>
           <a:xfrm>
             <a:off x="3145320" y="6400800"/>
-            <a:ext cx="5897520" cy="316440"/>
+            <a:ext cx="5897160" cy="316080"/>
           </a:xfrm>
           <a:prstGeom prst="rect">
             <a:avLst/>
@@ -4615,7 +4616,7 @@
         <p:spPr>
           <a:xfrm>
             <a:off x="11425680" y="6400800"/>
-            <a:ext cx="426600" cy="357120"/>
+            <a:ext cx="426240" cy="356760"/>
           </a:xfrm>
           <a:prstGeom prst="rect">
             <a:avLst/>
@@ -4643,7 +4644,7 @@
                 <a:spcPct val="100000"/>
               </a:lnSpc>
             </a:pPr>
-            <a:fld id="{D798D6B9-31C1-4EC1-B71D-6D50FC4DC04A}" type="slidenum">
+            <a:fld id="{939018F5-6A02-42CE-8706-82209D13209A}" type="slidenum">
               <a:rPr b="0" lang="en-GB" sz="1400" spc="-1" strike="noStrike">
                 <a:solidFill>
                   <a:srgbClr val="ffffff"/>
@@ -4668,7 +4669,7 @@
         <p:spPr>
           <a:xfrm>
             <a:off x="228600" y="228600"/>
-            <a:ext cx="11516400" cy="5257080"/>
+            <a:ext cx="11516040" cy="5256720"/>
           </a:xfrm>
           <a:prstGeom prst="rect">
             <a:avLst/>
@@ -4686,7 +4687,7 @@
         </p:style>
         <p:txBody>
           <a:bodyPr lIns="90000" rIns="90000" tIns="45000" bIns="45000">
-            <a:normAutofit fontScale="85000"/>
+            <a:normAutofit fontScale="84000"/>
           </a:bodyPr>
           <a:p>
             <a:pPr>
@@ -4728,7 +4729,7 @@
             </a:endParaRPr>
           </a:p>
           <a:p>
-            <a:pPr marL="432000" indent="-320760">
+            <a:pPr marL="432000" indent="-320400">
               <a:lnSpc>
                 <a:spcPct val="100000"/>
               </a:lnSpc>
@@ -4757,7 +4758,7 @@
             </a:endParaRPr>
           </a:p>
           <a:p>
-            <a:pPr marL="432000" indent="-320760">
+            <a:pPr marL="432000" indent="-320400">
               <a:lnSpc>
                 <a:spcPct val="100000"/>
               </a:lnSpc>
@@ -4786,7 +4787,7 @@
             </a:endParaRPr>
           </a:p>
           <a:p>
-            <a:pPr lvl="2" marL="648000" indent="-215280">
+            <a:pPr lvl="2" marL="648000" indent="-214920">
               <a:lnSpc>
                 <a:spcPct val="100000"/>
               </a:lnSpc>
@@ -4815,7 +4816,7 @@
             </a:endParaRPr>
           </a:p>
           <a:p>
-            <a:pPr lvl="2" marL="648000" indent="-215280">
+            <a:pPr lvl="2" marL="648000" indent="-214920">
               <a:lnSpc>
                 <a:spcPct val="100000"/>
               </a:lnSpc>
@@ -4844,7 +4845,7 @@
             </a:endParaRPr>
           </a:p>
           <a:p>
-            <a:pPr lvl="2" marL="648000" indent="-215280">
+            <a:pPr lvl="2" marL="648000" indent="-214920">
               <a:lnSpc>
                 <a:spcPct val="100000"/>
               </a:lnSpc>
@@ -4873,7 +4874,7 @@
             </a:endParaRPr>
           </a:p>
           <a:p>
-            <a:pPr lvl="2" marL="648000" indent="-215280">
+            <a:pPr lvl="2" marL="648000" indent="-214920">
               <a:lnSpc>
                 <a:spcPct val="100000"/>
               </a:lnSpc>
@@ -4902,7 +4903,7 @@
             </a:endParaRPr>
           </a:p>
           <a:p>
-            <a:pPr lvl="2" marL="648000" indent="-215280">
+            <a:pPr lvl="2" marL="648000" indent="-214920">
               <a:lnSpc>
                 <a:spcPct val="100000"/>
               </a:lnSpc>
@@ -4931,7 +4932,7 @@
             </a:endParaRPr>
           </a:p>
           <a:p>
-            <a:pPr lvl="2" marL="648000" indent="-215280">
+            <a:pPr lvl="2" marL="648000" indent="-214920">
               <a:lnSpc>
                 <a:spcPct val="100000"/>
               </a:lnSpc>
@@ -4960,7 +4961,7 @@
             </a:endParaRPr>
           </a:p>
           <a:p>
-            <a:pPr lvl="1" marL="432000" indent="-215280">
+            <a:pPr lvl="1" marL="432000" indent="-214920">
               <a:lnSpc>
                 <a:spcPct val="100000"/>
               </a:lnSpc>
@@ -5055,7 +5056,7 @@
         <p:spPr>
           <a:xfrm>
             <a:off x="0" y="0"/>
-            <a:ext cx="12188520" cy="892080"/>
+            <a:ext cx="12188160" cy="891720"/>
           </a:xfrm>
           <a:prstGeom prst="rect">
             <a:avLst/>
@@ -5124,7 +5125,7 @@
         <p:spPr>
           <a:xfrm>
             <a:off x="317520" y="93960"/>
-            <a:ext cx="11534760" cy="699120"/>
+            <a:ext cx="11534400" cy="699120"/>
           </a:xfrm>
           <a:prstGeom prst="rect">
             <a:avLst/>
@@ -5175,7 +5176,7 @@
         <p:spPr>
           <a:xfrm>
             <a:off x="3145320" y="6400800"/>
-            <a:ext cx="5897520" cy="316440"/>
+            <a:ext cx="5897160" cy="316080"/>
           </a:xfrm>
           <a:prstGeom prst="rect">
             <a:avLst/>
@@ -5226,7 +5227,7 @@
         <p:spPr>
           <a:xfrm>
             <a:off x="11425680" y="6400800"/>
-            <a:ext cx="426600" cy="357120"/>
+            <a:ext cx="426240" cy="356760"/>
           </a:xfrm>
           <a:prstGeom prst="rect">
             <a:avLst/>
@@ -5254,7 +5255,7 @@
                 <a:spcPct val="100000"/>
               </a:lnSpc>
             </a:pPr>
-            <a:fld id="{5BCEFB39-9333-4AC5-9218-411A9FF874BC}" type="slidenum">
+            <a:fld id="{1685E015-84EC-4B95-A47E-DB3C473617CD}" type="slidenum">
               <a:rPr b="0" lang="en-GB" sz="1400" spc="-1" strike="noStrike">
                 <a:solidFill>
                   <a:srgbClr val="ffffff"/>
@@ -5279,7 +5280,7 @@
         <p:spPr>
           <a:xfrm>
             <a:off x="228600" y="228600"/>
-            <a:ext cx="11651040" cy="5257080"/>
+            <a:ext cx="11650680" cy="5256720"/>
           </a:xfrm>
           <a:prstGeom prst="rect">
             <a:avLst/>
@@ -5339,7 +5340,7 @@
             </a:endParaRPr>
           </a:p>
           <a:p>
-            <a:pPr marL="432000" indent="-320760">
+            <a:pPr marL="432000" indent="-320400">
               <a:lnSpc>
                 <a:spcPct val="100000"/>
               </a:lnSpc>
@@ -5368,7 +5369,7 @@
             </a:endParaRPr>
           </a:p>
           <a:p>
-            <a:pPr lvl="2" marL="648000" indent="-215640">
+            <a:pPr lvl="2" marL="648000" indent="-215280">
               <a:lnSpc>
                 <a:spcPct val="100000"/>
               </a:lnSpc>
@@ -5397,7 +5398,7 @@
             </a:endParaRPr>
           </a:p>
           <a:p>
-            <a:pPr lvl="2" marL="648000" indent="-215640">
+            <a:pPr lvl="2" marL="648000" indent="-215280">
               <a:lnSpc>
                 <a:spcPct val="100000"/>
               </a:lnSpc>
@@ -5426,7 +5427,7 @@
             </a:endParaRPr>
           </a:p>
           <a:p>
-            <a:pPr marL="432000" indent="-320760">
+            <a:pPr marL="432000" indent="-320400">
               <a:lnSpc>
                 <a:spcPct val="100000"/>
               </a:lnSpc>
@@ -5455,7 +5456,7 @@
             </a:endParaRPr>
           </a:p>
           <a:p>
-            <a:pPr lvl="2" marL="648000" indent="-215640">
+            <a:pPr lvl="2" marL="648000" indent="-215280">
               <a:lnSpc>
                 <a:spcPct val="100000"/>
               </a:lnSpc>
@@ -5484,7 +5485,7 @@
             </a:endParaRPr>
           </a:p>
           <a:p>
-            <a:pPr marL="432000" indent="-320760">
+            <a:pPr marL="432000" indent="-320400">
               <a:lnSpc>
                 <a:spcPct val="100000"/>
               </a:lnSpc>
@@ -5513,7 +5514,7 @@
             </a:endParaRPr>
           </a:p>
           <a:p>
-            <a:pPr lvl="2" marL="648000" indent="-215640">
+            <a:pPr lvl="2" marL="648000" indent="-215280">
               <a:lnSpc>
                 <a:spcPct val="100000"/>
               </a:lnSpc>
@@ -5542,7 +5543,7 @@
             </a:endParaRPr>
           </a:p>
           <a:p>
-            <a:pPr marL="432000" indent="-320760">
+            <a:pPr marL="432000" indent="-320400">
               <a:lnSpc>
                 <a:spcPct val="100000"/>
               </a:lnSpc>
@@ -5571,7 +5572,7 @@
             </a:endParaRPr>
           </a:p>
           <a:p>
-            <a:pPr lvl="2" marL="648000" indent="-215640">
+            <a:pPr lvl="2" marL="648000" indent="-215280">
               <a:lnSpc>
                 <a:spcPct val="100000"/>
               </a:lnSpc>
@@ -5600,7 +5601,7 @@
             </a:endParaRPr>
           </a:p>
           <a:p>
-            <a:pPr lvl="2" marL="648000" indent="-215640">
+            <a:pPr lvl="2" marL="648000" indent="-215280">
               <a:lnSpc>
                 <a:spcPct val="100000"/>
               </a:lnSpc>
@@ -5695,7 +5696,7 @@
         <p:spPr>
           <a:xfrm>
             <a:off x="0" y="0"/>
-            <a:ext cx="12188520" cy="892080"/>
+            <a:ext cx="12188160" cy="891720"/>
           </a:xfrm>
           <a:prstGeom prst="rect">
             <a:avLst/>
@@ -5764,7 +5765,7 @@
         <p:spPr>
           <a:xfrm>
             <a:off x="317520" y="93960"/>
-            <a:ext cx="11534760" cy="699120"/>
+            <a:ext cx="11534400" cy="699120"/>
           </a:xfrm>
           <a:prstGeom prst="rect">
             <a:avLst/>
@@ -5815,7 +5816,7 @@
         <p:spPr>
           <a:xfrm>
             <a:off x="3145320" y="6400800"/>
-            <a:ext cx="5897520" cy="316440"/>
+            <a:ext cx="5897160" cy="316080"/>
           </a:xfrm>
           <a:prstGeom prst="rect">
             <a:avLst/>
@@ -5866,7 +5867,7 @@
         <p:spPr>
           <a:xfrm>
             <a:off x="11425680" y="6400800"/>
-            <a:ext cx="426600" cy="357120"/>
+            <a:ext cx="426240" cy="356760"/>
           </a:xfrm>
           <a:prstGeom prst="rect">
             <a:avLst/>
@@ -5894,7 +5895,7 @@
                 <a:spcPct val="100000"/>
               </a:lnSpc>
             </a:pPr>
-            <a:fld id="{A2658D1C-A6FB-4CE4-B24C-A1995933DFA6}" type="slidenum">
+            <a:fld id="{E97996E4-3E0A-466B-B1B1-EEA49AB49EB5}" type="slidenum">
               <a:rPr b="0" lang="en-GB" sz="1400" spc="-1" strike="noStrike">
                 <a:solidFill>
                   <a:srgbClr val="ffffff"/>
@@ -5919,7 +5920,7 @@
         <p:spPr>
           <a:xfrm>
             <a:off x="317520" y="1123920"/>
-            <a:ext cx="11516400" cy="5103720"/>
+            <a:ext cx="11516040" cy="5103360"/>
           </a:xfrm>
           <a:prstGeom prst="rect">
             <a:avLst/>
@@ -5949,7 +5950,7 @@
         <p:spPr>
           <a:xfrm>
             <a:off x="1724760" y="1123920"/>
-            <a:ext cx="8790840" cy="4944240"/>
+            <a:ext cx="8790480" cy="4943880"/>
           </a:xfrm>
           <a:prstGeom prst="rect">
             <a:avLst/>
@@ -5998,7 +5999,7 @@
         <p:spPr>
           <a:xfrm>
             <a:off x="0" y="0"/>
-            <a:ext cx="12188520" cy="892080"/>
+            <a:ext cx="12188160" cy="891720"/>
           </a:xfrm>
           <a:prstGeom prst="rect">
             <a:avLst/>
@@ -6067,7 +6068,7 @@
         <p:spPr>
           <a:xfrm>
             <a:off x="317520" y="93960"/>
-            <a:ext cx="11534760" cy="699120"/>
+            <a:ext cx="11534400" cy="699120"/>
           </a:xfrm>
           <a:prstGeom prst="rect">
             <a:avLst/>
@@ -6118,7 +6119,7 @@
         <p:spPr>
           <a:xfrm>
             <a:off x="3145320" y="6400800"/>
-            <a:ext cx="5897520" cy="316440"/>
+            <a:ext cx="5897160" cy="316080"/>
           </a:xfrm>
           <a:prstGeom prst="rect">
             <a:avLst/>
@@ -6169,7 +6170,7 @@
         <p:spPr>
           <a:xfrm>
             <a:off x="11425680" y="6400800"/>
-            <a:ext cx="426600" cy="357120"/>
+            <a:ext cx="426240" cy="356760"/>
           </a:xfrm>
           <a:prstGeom prst="rect">
             <a:avLst/>
@@ -6197,7 +6198,7 @@
                 <a:spcPct val="100000"/>
               </a:lnSpc>
             </a:pPr>
-            <a:fld id="{A10DFF83-7D21-42F1-8EAA-F4B1F00CEEEB}" type="slidenum">
+            <a:fld id="{F02786D5-3CA0-4938-B071-53F5355B745C}" type="slidenum">
               <a:rPr b="0" lang="en-GB" sz="1400" spc="-1" strike="noStrike">
                 <a:solidFill>
                   <a:srgbClr val="ffffff"/>
@@ -6205,7 +6206,7 @@
                 <a:latin typeface="Arial"/>
                 <a:ea typeface="DejaVu Sans"/>
               </a:rPr>
-              <a:t>5</a:t>
+              <a:t>&lt;number&gt;</a:t>
             </a:fld>
             <a:endParaRPr b="0" lang="en-US" sz="1400" spc="-1" strike="noStrike">
               <a:latin typeface="Arial"/>
@@ -6222,7 +6223,7 @@
         <p:spPr>
           <a:xfrm>
             <a:off x="317520" y="1123920"/>
-            <a:ext cx="11516400" cy="5103720"/>
+            <a:ext cx="11516040" cy="5103360"/>
           </a:xfrm>
           <a:prstGeom prst="rect">
             <a:avLst/>
@@ -6260,10 +6261,15 @@
               <a:tr h="367920">
                 <a:tc>
                   <a:txBody>
-                    <a:bodyPr lIns="90000" rIns="90000" tIns="46800" bIns="46800">
+                    <a:bodyPr lIns="90000" rIns="90000">
                       <a:noAutofit/>
                     </a:bodyPr>
                     <a:p>
+                      <a:pPr>
+                        <a:lnSpc>
+                          <a:spcPct val="100000"/>
+                        </a:lnSpc>
+                      </a:pPr>
                       <a:r>
                         <a:rPr b="0" lang="en-US" sz="1800" spc="-1" strike="noStrike">
                           <a:latin typeface="Arial"/>
@@ -6303,10 +6309,15 @@
                 </a:tc>
                 <a:tc>
                   <a:txBody>
-                    <a:bodyPr lIns="90000" rIns="90000" tIns="46800" bIns="46800">
+                    <a:bodyPr lIns="90000" rIns="90000">
                       <a:noAutofit/>
                     </a:bodyPr>
                     <a:p>
+                      <a:pPr>
+                        <a:lnSpc>
+                          <a:spcPct val="100000"/>
+                        </a:lnSpc>
+                      </a:pPr>
                       <a:r>
                         <a:rPr b="0" lang="en-US" sz="1800" spc="-1" strike="noStrike">
                           <a:latin typeface="Arial"/>
@@ -6348,10 +6359,15 @@
               <a:tr h="374400">
                 <a:tc>
                   <a:txBody>
-                    <a:bodyPr lIns="90000" rIns="90000" tIns="46800" bIns="46800">
+                    <a:bodyPr lIns="90000" rIns="90000">
                       <a:noAutofit/>
                     </a:bodyPr>
                     <a:p>
+                      <a:pPr>
+                        <a:lnSpc>
+                          <a:spcPct val="100000"/>
+                        </a:lnSpc>
+                      </a:pPr>
                       <a:r>
                         <a:rPr b="0" lang="en-US" sz="1800" spc="-1" strike="noStrike">
                           <a:latin typeface="Arial"/>
@@ -6391,10 +6407,15 @@
                 </a:tc>
                 <a:tc>
                   <a:txBody>
-                    <a:bodyPr lIns="90000" rIns="90000" tIns="46800" bIns="46800">
+                    <a:bodyPr lIns="90000" rIns="90000">
                       <a:noAutofit/>
                     </a:bodyPr>
                     <a:p>
+                      <a:pPr>
+                        <a:lnSpc>
+                          <a:spcPct val="100000"/>
+                        </a:lnSpc>
+                      </a:pPr>
                       <a:r>
                         <a:rPr b="0" lang="en-US" sz="1800" spc="-1" strike="noStrike">
                           <a:latin typeface="Arial"/>
@@ -6436,10 +6457,15 @@
               <a:tr h="374400">
                 <a:tc>
                   <a:txBody>
-                    <a:bodyPr lIns="90000" rIns="90000" tIns="46800" bIns="46800">
+                    <a:bodyPr lIns="90000" rIns="90000">
                       <a:noAutofit/>
                     </a:bodyPr>
                     <a:p>
+                      <a:pPr>
+                        <a:lnSpc>
+                          <a:spcPct val="100000"/>
+                        </a:lnSpc>
+                      </a:pPr>
                       <a:r>
                         <a:rPr b="0" lang="en-US" sz="1800" spc="-1" strike="noStrike">
                           <a:latin typeface="Arial"/>
@@ -6479,10 +6505,15 @@
                 </a:tc>
                 <a:tc>
                   <a:txBody>
-                    <a:bodyPr lIns="90000" rIns="90000" tIns="46800" bIns="46800">
+                    <a:bodyPr lIns="90000" rIns="90000">
                       <a:noAutofit/>
                     </a:bodyPr>
                     <a:p>
+                      <a:pPr>
+                        <a:lnSpc>
+                          <a:spcPct val="100000"/>
+                        </a:lnSpc>
+                      </a:pPr>
                       <a:r>
                         <a:rPr b="0" lang="en-US" sz="1800" spc="-1" strike="noStrike">
                           <a:latin typeface="Arial"/>
@@ -6524,10 +6555,15 @@
               <a:tr h="374400">
                 <a:tc>
                   <a:txBody>
-                    <a:bodyPr lIns="90000" rIns="90000" tIns="46800" bIns="46800">
+                    <a:bodyPr lIns="90000" rIns="90000">
                       <a:noAutofit/>
                     </a:bodyPr>
                     <a:p>
+                      <a:pPr>
+                        <a:lnSpc>
+                          <a:spcPct val="100000"/>
+                        </a:lnSpc>
+                      </a:pPr>
                       <a:r>
                         <a:rPr b="0" lang="en-US" sz="1800" spc="-1" strike="noStrike">
                           <a:latin typeface="Arial"/>
@@ -6567,10 +6603,15 @@
                 </a:tc>
                 <a:tc>
                   <a:txBody>
-                    <a:bodyPr lIns="90000" rIns="90000" tIns="46800" bIns="46800">
+                    <a:bodyPr lIns="90000" rIns="90000">
                       <a:noAutofit/>
                     </a:bodyPr>
                     <a:p>
+                      <a:pPr>
+                        <a:lnSpc>
+                          <a:spcPct val="100000"/>
+                        </a:lnSpc>
+                      </a:pPr>
                       <a:r>
                         <a:rPr b="0" lang="en-US" sz="1800" spc="-1" strike="noStrike">
                           <a:latin typeface="Arial"/>
@@ -6612,10 +6653,15 @@
               <a:tr h="374400">
                 <a:tc>
                   <a:txBody>
-                    <a:bodyPr lIns="90000" rIns="90000" tIns="46800" bIns="46800">
+                    <a:bodyPr lIns="90000" rIns="90000">
                       <a:noAutofit/>
                     </a:bodyPr>
                     <a:p>
+                      <a:pPr>
+                        <a:lnSpc>
+                          <a:spcPct val="100000"/>
+                        </a:lnSpc>
+                      </a:pPr>
                       <a:r>
                         <a:rPr b="0" lang="en-US" sz="1800" spc="-1" strike="noStrike">
                           <a:latin typeface="Arial"/>
@@ -6655,10 +6701,15 @@
                 </a:tc>
                 <a:tc>
                   <a:txBody>
-                    <a:bodyPr lIns="90000" rIns="90000" tIns="46800" bIns="46800">
+                    <a:bodyPr lIns="90000" rIns="90000">
                       <a:noAutofit/>
                     </a:bodyPr>
                     <a:p>
+                      <a:pPr>
+                        <a:lnSpc>
+                          <a:spcPct val="100000"/>
+                        </a:lnSpc>
+                      </a:pPr>
                       <a:r>
                         <a:rPr b="0" lang="en-US" sz="1800" spc="-1" strike="noStrike">
                           <a:latin typeface="Arial"/>
@@ -6700,10 +6751,15 @@
               <a:tr h="374400">
                 <a:tc>
                   <a:txBody>
-                    <a:bodyPr lIns="90000" rIns="90000" tIns="46800" bIns="46800">
+                    <a:bodyPr lIns="90000" rIns="90000">
                       <a:noAutofit/>
                     </a:bodyPr>
                     <a:p>
+                      <a:pPr>
+                        <a:lnSpc>
+                          <a:spcPct val="100000"/>
+                        </a:lnSpc>
+                      </a:pPr>
                       <a:r>
                         <a:rPr b="0" lang="en-US" sz="1800" spc="-1" strike="noStrike">
                           <a:latin typeface="Arial"/>
@@ -6743,10 +6799,15 @@
                 </a:tc>
                 <a:tc>
                   <a:txBody>
-                    <a:bodyPr lIns="90000" rIns="90000" tIns="46800" bIns="46800">
+                    <a:bodyPr lIns="90000" rIns="90000">
                       <a:noAutofit/>
                     </a:bodyPr>
                     <a:p>
+                      <a:pPr>
+                        <a:lnSpc>
+                          <a:spcPct val="100000"/>
+                        </a:lnSpc>
+                      </a:pPr>
                       <a:r>
                         <a:rPr b="0" lang="en-US" sz="1800" spc="-1" strike="noStrike">
                           <a:latin typeface="Arial"/>
@@ -6788,10 +6849,15 @@
               <a:tr h="374400">
                 <a:tc>
                   <a:txBody>
-                    <a:bodyPr lIns="90000" rIns="90000" tIns="46800" bIns="46800">
+                    <a:bodyPr lIns="90000" rIns="90000">
                       <a:noAutofit/>
                     </a:bodyPr>
                     <a:p>
+                      <a:pPr>
+                        <a:lnSpc>
+                          <a:spcPct val="100000"/>
+                        </a:lnSpc>
+                      </a:pPr>
                       <a:r>
                         <a:rPr b="0" lang="en-US" sz="1800" spc="-1" strike="noStrike">
                           <a:latin typeface="Arial"/>
@@ -6831,10 +6897,15 @@
                 </a:tc>
                 <a:tc>
                   <a:txBody>
-                    <a:bodyPr lIns="90000" rIns="90000" tIns="46800" bIns="46800">
+                    <a:bodyPr lIns="90000" rIns="90000">
                       <a:noAutofit/>
                     </a:bodyPr>
                     <a:p>
+                      <a:pPr>
+                        <a:lnSpc>
+                          <a:spcPct val="100000"/>
+                        </a:lnSpc>
+                      </a:pPr>
                       <a:r>
                         <a:rPr b="0" lang="en-US" sz="1800" spc="-1" strike="noStrike">
                           <a:latin typeface="Arial"/>
@@ -6876,10 +6947,15 @@
               <a:tr h="374400">
                 <a:tc>
                   <a:txBody>
-                    <a:bodyPr lIns="90000" rIns="90000" tIns="46800" bIns="46800">
+                    <a:bodyPr lIns="90000" rIns="90000">
                       <a:noAutofit/>
                     </a:bodyPr>
                     <a:p>
+                      <a:pPr>
+                        <a:lnSpc>
+                          <a:spcPct val="100000"/>
+                        </a:lnSpc>
+                      </a:pPr>
                       <a:r>
                         <a:rPr b="0" lang="en-US" sz="1800" spc="-1" strike="noStrike">
                           <a:latin typeface="Arial"/>
@@ -6919,10 +6995,15 @@
                 </a:tc>
                 <a:tc>
                   <a:txBody>
-                    <a:bodyPr lIns="90000" rIns="90000" tIns="46800" bIns="46800">
+                    <a:bodyPr lIns="90000" rIns="90000">
                       <a:noAutofit/>
                     </a:bodyPr>
                     <a:p>
+                      <a:pPr>
+                        <a:lnSpc>
+                          <a:spcPct val="100000"/>
+                        </a:lnSpc>
+                      </a:pPr>
                       <a:r>
                         <a:rPr b="0" lang="en-US" sz="1800" spc="-1" strike="noStrike">
                           <a:latin typeface="Arial"/>
@@ -6964,10 +7045,15 @@
               <a:tr h="374400">
                 <a:tc>
                   <a:txBody>
-                    <a:bodyPr lIns="90000" rIns="90000" tIns="46800" bIns="46800">
+                    <a:bodyPr lIns="90000" rIns="90000">
                       <a:noAutofit/>
                     </a:bodyPr>
                     <a:p>
+                      <a:pPr>
+                        <a:lnSpc>
+                          <a:spcPct val="100000"/>
+                        </a:lnSpc>
+                      </a:pPr>
                       <a:r>
                         <a:rPr b="0" lang="en-US" sz="1800" spc="-1" strike="noStrike">
                           <a:latin typeface="Arial"/>
@@ -7007,10 +7093,15 @@
                 </a:tc>
                 <a:tc>
                   <a:txBody>
-                    <a:bodyPr lIns="90000" rIns="90000" tIns="46800" bIns="46800">
+                    <a:bodyPr lIns="90000" rIns="90000">
                       <a:noAutofit/>
                     </a:bodyPr>
                     <a:p>
+                      <a:pPr>
+                        <a:lnSpc>
+                          <a:spcPct val="100000"/>
+                        </a:lnSpc>
+                      </a:pPr>
                       <a:r>
                         <a:rPr b="0" lang="en-US" sz="1800" spc="-1" strike="noStrike">
                           <a:latin typeface="Arial"/>
@@ -7053,6 +7144,959 @@
           </a:graphicData>
         </a:graphic>
       </p:graphicFrame>
+    </p:spTree>
+  </p:cSld>
+  <mc:AlternateContent>
+    <mc:Choice Requires="p14">
+      <p:transition spd="slow" p14:dur="2000"/>
+    </mc:Choice>
+    <mc:Fallback>
+      <p:transition spd="slow"/>
+    </mc:Fallback>
+  </mc:AlternateContent>
+</p:sld>
+</file>
+
+<file path=ppt/slides/slide8.xml><?xml version="1.0" encoding="utf-8"?>
+<p:sld xmlns:a="http://schemas.openxmlformats.org/drawingml/2006/main" xmlns:p="http://schemas.openxmlformats.org/presentationml/2006/main" xmlns:r="http://schemas.openxmlformats.org/officeDocument/2006/relationships" xmlns:p14="http://schemas.microsoft.com/office/powerpoint/2010/main" xmlns:p15="http://schemas.microsoft.com/office/powerpoint/2012/main" xmlns:mc="http://schemas.openxmlformats.org/markup-compatibility/2006">
+  <p:cSld>
+    <p:spTree>
+      <p:nvGrpSpPr>
+        <p:cNvPr id="1" name=""/>
+        <p:cNvGrpSpPr/>
+        <p:nvPr/>
+      </p:nvGrpSpPr>
+      <p:grpSpPr>
+        <a:xfrm>
+          <a:off x="0" y="0"/>
+          <a:ext cx="0" cy="0"/>
+          <a:chOff x="0" y="0"/>
+          <a:chExt cx="0" cy="0"/>
+        </a:xfrm>
+      </p:grpSpPr>
+      <p:sp>
+        <p:nvSpPr>
+          <p:cNvPr id="118" name="CustomShape 1"/>
+          <p:cNvSpPr/>
+          <p:nvPr/>
+        </p:nvSpPr>
+        <p:spPr>
+          <a:xfrm>
+            <a:off x="0" y="0"/>
+            <a:ext cx="12188160" cy="891720"/>
+          </a:xfrm>
+          <a:prstGeom prst="rect">
+            <a:avLst/>
+          </a:prstGeom>
+          <a:solidFill>
+            <a:srgbClr val="009fd8"/>
+          </a:solidFill>
+          <a:ln>
+            <a:noFill/>
+          </a:ln>
+        </p:spPr>
+        <p:style>
+          <a:lnRef idx="2">
+            <a:schemeClr val="accent1">
+              <a:shade val="50000"/>
+            </a:schemeClr>
+          </a:lnRef>
+          <a:fillRef idx="1">
+            <a:schemeClr val="accent1"/>
+          </a:fillRef>
+          <a:effectRef idx="0">
+            <a:schemeClr val="accent1"/>
+          </a:effectRef>
+          <a:fontRef idx="minor"/>
+        </p:style>
+      </p:sp>
+      <p:sp>
+        <p:nvSpPr>
+          <p:cNvPr id="119" name="Line 2"/>
+          <p:cNvSpPr/>
+          <p:nvPr/>
+        </p:nvSpPr>
+        <p:spPr>
+          <a:xfrm>
+            <a:off x="335880" y="6315840"/>
+            <a:ext cx="11520000" cy="0"/>
+          </a:xfrm>
+          <a:prstGeom prst="line">
+            <a:avLst/>
+          </a:prstGeom>
+          <a:ln w="28575">
+            <a:solidFill>
+              <a:srgbClr val="0097ce"/>
+            </a:solidFill>
+          </a:ln>
+        </p:spPr>
+        <p:style>
+          <a:lnRef idx="1">
+            <a:schemeClr val="accent1"/>
+          </a:lnRef>
+          <a:fillRef idx="0">
+            <a:schemeClr val="accent1"/>
+          </a:fillRef>
+          <a:effectRef idx="0">
+            <a:schemeClr val="accent1"/>
+          </a:effectRef>
+          <a:fontRef idx="minor"/>
+        </p:style>
+      </p:sp>
+      <p:sp>
+        <p:nvSpPr>
+          <p:cNvPr id="120" name="CustomShape 3"/>
+          <p:cNvSpPr/>
+          <p:nvPr/>
+        </p:nvSpPr>
+        <p:spPr>
+          <a:xfrm>
+            <a:off x="317520" y="93960"/>
+            <a:ext cx="11534400" cy="699120"/>
+          </a:xfrm>
+          <a:prstGeom prst="rect">
+            <a:avLst/>
+          </a:prstGeom>
+          <a:noFill/>
+          <a:ln w="0">
+            <a:noFill/>
+          </a:ln>
+        </p:spPr>
+        <p:style>
+          <a:lnRef idx="0"/>
+          <a:fillRef idx="0"/>
+          <a:effectRef idx="0"/>
+          <a:fontRef idx="minor"/>
+        </p:style>
+        <p:txBody>
+          <a:bodyPr lIns="90000" rIns="90000" tIns="45000" bIns="45000">
+            <a:spAutoFit/>
+          </a:bodyPr>
+          <a:p>
+            <a:pPr>
+              <a:lnSpc>
+                <a:spcPct val="100000"/>
+              </a:lnSpc>
+            </a:pPr>
+            <a:r>
+              <a:rPr b="0" lang="en-GB" sz="4000" spc="180" strike="noStrike">
+                <a:solidFill>
+                  <a:srgbClr val="ffffff"/>
+                </a:solidFill>
+                <a:latin typeface="Arial"/>
+                <a:ea typeface="DejaVu Sans"/>
+              </a:rPr>
+              <a:t>Répartition</a:t>
+            </a:r>
+            <a:endParaRPr b="0" lang="en-US" sz="4000" spc="-1" strike="noStrike">
+              <a:latin typeface="Arial"/>
+            </a:endParaRPr>
+          </a:p>
+        </p:txBody>
+      </p:sp>
+      <p:sp>
+        <p:nvSpPr>
+          <p:cNvPr id="121" name="CustomShape 4"/>
+          <p:cNvSpPr/>
+          <p:nvPr/>
+        </p:nvSpPr>
+        <p:spPr>
+          <a:xfrm>
+            <a:off x="3145320" y="6400800"/>
+            <a:ext cx="5897160" cy="316080"/>
+          </a:xfrm>
+          <a:prstGeom prst="rect">
+            <a:avLst/>
+          </a:prstGeom>
+          <a:noFill/>
+          <a:ln w="0">
+            <a:noFill/>
+          </a:ln>
+        </p:spPr>
+        <p:style>
+          <a:lnRef idx="0"/>
+          <a:fillRef idx="0"/>
+          <a:effectRef idx="0"/>
+          <a:fontRef idx="minor"/>
+        </p:style>
+        <p:txBody>
+          <a:bodyPr lIns="90000" rIns="90000" tIns="45000" bIns="45000" anchor="ctr">
+            <a:noAutofit/>
+          </a:bodyPr>
+          <a:p>
+            <a:pPr algn="ctr">
+              <a:lnSpc>
+                <a:spcPct val="100000"/>
+              </a:lnSpc>
+            </a:pPr>
+            <a:r>
+              <a:rPr b="0" lang="fr-CH" sz="1400" spc="-1" strike="noStrike">
+                <a:solidFill>
+                  <a:srgbClr val="8b8b8b"/>
+                </a:solidFill>
+                <a:latin typeface="Arial"/>
+                <a:ea typeface="DejaVu Sans"/>
+              </a:rPr>
+              <a:t>Présentation du projet IoT, HEIG-VD</a:t>
+            </a:r>
+            <a:endParaRPr b="0" lang="en-US" sz="1400" spc="-1" strike="noStrike">
+              <a:latin typeface="Arial"/>
+            </a:endParaRPr>
+          </a:p>
+        </p:txBody>
+      </p:sp>
+      <p:sp>
+        <p:nvSpPr>
+          <p:cNvPr id="122" name="CustomShape 5"/>
+          <p:cNvSpPr/>
+          <p:nvPr/>
+        </p:nvSpPr>
+        <p:spPr>
+          <a:xfrm>
+            <a:off x="11425680" y="6400800"/>
+            <a:ext cx="426240" cy="356760"/>
+          </a:xfrm>
+          <a:prstGeom prst="rect">
+            <a:avLst/>
+          </a:prstGeom>
+          <a:solidFill>
+            <a:srgbClr val="229fd8"/>
+          </a:solidFill>
+          <a:ln w="0">
+            <a:noFill/>
+          </a:ln>
+        </p:spPr>
+        <p:style>
+          <a:lnRef idx="0"/>
+          <a:fillRef idx="0"/>
+          <a:effectRef idx="0"/>
+          <a:fontRef idx="minor"/>
+        </p:style>
+        <p:txBody>
+          <a:bodyPr lIns="90000" rIns="90000" tIns="45000" bIns="45000" anchor="ctr">
+            <a:noAutofit/>
+          </a:bodyPr>
+          <a:p>
+            <a:pPr algn="ctr">
+              <a:lnSpc>
+                <a:spcPct val="100000"/>
+              </a:lnSpc>
+            </a:pPr>
+            <a:fld id="{E69B713E-CF70-47CB-B8D9-4792E11A568B}" type="slidenum">
+              <a:rPr b="0" lang="en-GB" sz="1400" spc="-1" strike="noStrike">
+                <a:solidFill>
+                  <a:srgbClr val="ffffff"/>
+                </a:solidFill>
+                <a:latin typeface="Arial"/>
+                <a:ea typeface="DejaVu Sans"/>
+              </a:rPr>
+              <a:t>&lt;number&gt;</a:t>
+            </a:fld>
+            <a:endParaRPr b="0" lang="en-US" sz="1400" spc="-1" strike="noStrike">
+              <a:latin typeface="Arial"/>
+            </a:endParaRPr>
+          </a:p>
+        </p:txBody>
+      </p:sp>
+      <p:sp>
+        <p:nvSpPr>
+          <p:cNvPr id="123" name="CustomShape 6"/>
+          <p:cNvSpPr/>
+          <p:nvPr/>
+        </p:nvSpPr>
+        <p:spPr>
+          <a:xfrm>
+            <a:off x="317520" y="1123920"/>
+            <a:ext cx="11516040" cy="5103360"/>
+          </a:xfrm>
+          <a:prstGeom prst="rect">
+            <a:avLst/>
+          </a:prstGeom>
+          <a:noFill/>
+          <a:ln w="0">
+            <a:noFill/>
+          </a:ln>
+        </p:spPr>
+        <p:style>
+          <a:lnRef idx="0"/>
+          <a:fillRef idx="0"/>
+          <a:effectRef idx="0"/>
+          <a:fontRef idx="minor"/>
+        </p:style>
+      </p:sp>
+      <p:sp>
+        <p:nvSpPr>
+          <p:cNvPr id="124" name="CustomShape 7"/>
+          <p:cNvSpPr/>
+          <p:nvPr/>
+        </p:nvSpPr>
+        <p:spPr>
+          <a:xfrm>
+            <a:off x="317520" y="1123920"/>
+            <a:ext cx="3340080" cy="5103360"/>
+          </a:xfrm>
+          <a:prstGeom prst="rect">
+            <a:avLst/>
+          </a:prstGeom>
+          <a:noFill/>
+          <a:ln w="0">
+            <a:noFill/>
+          </a:ln>
+        </p:spPr>
+        <p:style>
+          <a:lnRef idx="0"/>
+          <a:fillRef idx="0"/>
+          <a:effectRef idx="0"/>
+          <a:fontRef idx="minor"/>
+        </p:style>
+        <p:txBody>
+          <a:bodyPr lIns="90000" rIns="90000" tIns="45000" bIns="45000">
+            <a:normAutofit/>
+          </a:bodyPr>
+          <a:p>
+            <a:pPr>
+              <a:lnSpc>
+                <a:spcPct val="100000"/>
+              </a:lnSpc>
+              <a:spcBef>
+                <a:spcPts val="1417"/>
+              </a:spcBef>
+            </a:pPr>
+            <a:endParaRPr b="0" lang="en-US" sz="1800" spc="-1" strike="noStrike">
+              <a:latin typeface="Arial"/>
+            </a:endParaRPr>
+          </a:p>
+          <a:p>
+            <a:pPr>
+              <a:lnSpc>
+                <a:spcPct val="100000"/>
+              </a:lnSpc>
+              <a:spcBef>
+                <a:spcPts val="1417"/>
+              </a:spcBef>
+            </a:pPr>
+            <a:endParaRPr b="0" lang="en-US" sz="1800" spc="-1" strike="noStrike">
+              <a:latin typeface="Arial"/>
+            </a:endParaRPr>
+          </a:p>
+          <a:p>
+            <a:pPr>
+              <a:lnSpc>
+                <a:spcPct val="100000"/>
+              </a:lnSpc>
+              <a:spcBef>
+                <a:spcPts val="1417"/>
+              </a:spcBef>
+            </a:pPr>
+            <a:endParaRPr b="0" lang="en-US" sz="1800" spc="-1" strike="noStrike">
+              <a:latin typeface="Arial"/>
+            </a:endParaRPr>
+          </a:p>
+          <a:p>
+            <a:pPr marL="432000" indent="-320400">
+              <a:lnSpc>
+                <a:spcPct val="100000"/>
+              </a:lnSpc>
+              <a:spcBef>
+                <a:spcPts val="1417"/>
+              </a:spcBef>
+              <a:buClr>
+                <a:srgbClr val="000000"/>
+              </a:buClr>
+              <a:buSzPct val="45000"/>
+              <a:buFont typeface="Wingdings" charset="2"/>
+              <a:buChar char=""/>
+            </a:pPr>
+            <a:r>
+              <a:rPr b="0" lang="fr-FR" sz="2800" spc="-1" strike="noStrike">
+                <a:solidFill>
+                  <a:srgbClr val="000000"/>
+                </a:solidFill>
+                <a:latin typeface="Calibri"/>
+                <a:ea typeface="DejaVu Sans"/>
+              </a:rPr>
+              <a:t>Anthony</a:t>
+            </a:r>
+            <a:endParaRPr b="0" lang="en-US" sz="2800" spc="-1" strike="noStrike">
+              <a:latin typeface="Arial"/>
+            </a:endParaRPr>
+          </a:p>
+          <a:p>
+            <a:pPr lvl="2" marL="648000" indent="-216000">
+              <a:lnSpc>
+                <a:spcPct val="100000"/>
+              </a:lnSpc>
+              <a:spcBef>
+                <a:spcPts val="1417"/>
+              </a:spcBef>
+              <a:buClr>
+                <a:srgbClr val="000000"/>
+              </a:buClr>
+              <a:buSzPct val="45000"/>
+              <a:buFont typeface="Wingdings" charset="2"/>
+              <a:buChar char=""/>
+            </a:pPr>
+            <a:r>
+              <a:rPr b="0" lang="fr-FR" sz="2800" spc="-1" strike="noStrike">
+                <a:solidFill>
+                  <a:srgbClr val="000000"/>
+                </a:solidFill>
+                <a:latin typeface="Calibri"/>
+                <a:ea typeface="DejaVu Sans"/>
+              </a:rPr>
+              <a:t>Influx, Telegraf</a:t>
+            </a:r>
+            <a:endParaRPr b="0" lang="en-US" sz="2800" spc="-1" strike="noStrike">
+              <a:latin typeface="Arial"/>
+            </a:endParaRPr>
+          </a:p>
+          <a:p>
+            <a:pPr lvl="2" marL="648000" indent="-216000">
+              <a:lnSpc>
+                <a:spcPct val="100000"/>
+              </a:lnSpc>
+              <a:spcBef>
+                <a:spcPts val="1417"/>
+              </a:spcBef>
+              <a:buClr>
+                <a:srgbClr val="000000"/>
+              </a:buClr>
+              <a:buSzPct val="45000"/>
+              <a:buFont typeface="Wingdings" charset="2"/>
+              <a:buChar char=""/>
+            </a:pPr>
+            <a:r>
+              <a:rPr b="0" lang="fr-FR" sz="2800" spc="-1" strike="noStrike">
+                <a:solidFill>
+                  <a:srgbClr val="000000"/>
+                </a:solidFill>
+                <a:latin typeface="Calibri"/>
+                <a:ea typeface="DejaVu Sans"/>
+              </a:rPr>
+              <a:t>serveur web</a:t>
+            </a:r>
+            <a:endParaRPr b="0" lang="en-US" sz="2800" spc="-1" strike="noStrike">
+              <a:latin typeface="Arial"/>
+            </a:endParaRPr>
+          </a:p>
+          <a:p>
+            <a:pPr lvl="2" marL="648000" indent="-216000">
+              <a:lnSpc>
+                <a:spcPct val="100000"/>
+              </a:lnSpc>
+              <a:spcBef>
+                <a:spcPts val="1417"/>
+              </a:spcBef>
+              <a:buClr>
+                <a:srgbClr val="000000"/>
+              </a:buClr>
+              <a:buSzPct val="45000"/>
+              <a:buFont typeface="Wingdings" charset="2"/>
+              <a:buChar char=""/>
+            </a:pPr>
+            <a:r>
+              <a:rPr b="0" lang="fr-FR" sz="2800" spc="-1" strike="noStrike">
+                <a:solidFill>
+                  <a:srgbClr val="000000"/>
+                </a:solidFill>
+                <a:latin typeface="Calibri"/>
+                <a:ea typeface="DejaVu Sans"/>
+              </a:rPr>
+              <a:t>broker MQTT</a:t>
+            </a:r>
+            <a:endParaRPr b="0" lang="en-US" sz="2800" spc="-1" strike="noStrike">
+              <a:latin typeface="Arial"/>
+            </a:endParaRPr>
+          </a:p>
+          <a:p>
+            <a:pPr>
+              <a:lnSpc>
+                <a:spcPct val="100000"/>
+              </a:lnSpc>
+              <a:spcBef>
+                <a:spcPts val="1417"/>
+              </a:spcBef>
+            </a:pPr>
+            <a:endParaRPr b="0" lang="en-US" sz="2800" spc="-1" strike="noStrike">
+              <a:latin typeface="Arial"/>
+            </a:endParaRPr>
+          </a:p>
+          <a:p>
+            <a:pPr>
+              <a:lnSpc>
+                <a:spcPct val="100000"/>
+              </a:lnSpc>
+              <a:spcBef>
+                <a:spcPts val="1417"/>
+              </a:spcBef>
+            </a:pPr>
+            <a:endParaRPr b="0" lang="en-US" sz="2800" spc="-1" strike="noStrike">
+              <a:latin typeface="Arial"/>
+            </a:endParaRPr>
+          </a:p>
+        </p:txBody>
+      </p:sp>
+      <p:sp>
+        <p:nvSpPr>
+          <p:cNvPr id="125" name="CustomShape 8"/>
+          <p:cNvSpPr/>
+          <p:nvPr/>
+        </p:nvSpPr>
+        <p:spPr>
+          <a:xfrm>
+            <a:off x="4114800" y="1068840"/>
+            <a:ext cx="3340080" cy="5103360"/>
+          </a:xfrm>
+          <a:prstGeom prst="rect">
+            <a:avLst/>
+          </a:prstGeom>
+          <a:noFill/>
+          <a:ln w="0">
+            <a:noFill/>
+          </a:ln>
+        </p:spPr>
+        <p:style>
+          <a:lnRef idx="0"/>
+          <a:fillRef idx="0"/>
+          <a:effectRef idx="0"/>
+          <a:fontRef idx="minor"/>
+        </p:style>
+        <p:txBody>
+          <a:bodyPr lIns="90000" rIns="90000" tIns="45000" bIns="45000">
+            <a:normAutofit/>
+          </a:bodyPr>
+          <a:p>
+            <a:pPr>
+              <a:lnSpc>
+                <a:spcPct val="100000"/>
+              </a:lnSpc>
+              <a:spcBef>
+                <a:spcPts val="1417"/>
+              </a:spcBef>
+            </a:pPr>
+            <a:endParaRPr b="0" lang="en-US" sz="1800" spc="-1" strike="noStrike">
+              <a:latin typeface="Arial"/>
+            </a:endParaRPr>
+          </a:p>
+          <a:p>
+            <a:pPr>
+              <a:lnSpc>
+                <a:spcPct val="100000"/>
+              </a:lnSpc>
+              <a:spcBef>
+                <a:spcPts val="1417"/>
+              </a:spcBef>
+            </a:pPr>
+            <a:endParaRPr b="0" lang="en-US" sz="1800" spc="-1" strike="noStrike">
+              <a:latin typeface="Arial"/>
+            </a:endParaRPr>
+          </a:p>
+          <a:p>
+            <a:pPr>
+              <a:lnSpc>
+                <a:spcPct val="100000"/>
+              </a:lnSpc>
+              <a:spcBef>
+                <a:spcPts val="1417"/>
+              </a:spcBef>
+            </a:pPr>
+            <a:endParaRPr b="0" lang="en-US" sz="1800" spc="-1" strike="noStrike">
+              <a:latin typeface="Arial"/>
+            </a:endParaRPr>
+          </a:p>
+          <a:p>
+            <a:pPr marL="432000" indent="-320400">
+              <a:lnSpc>
+                <a:spcPct val="100000"/>
+              </a:lnSpc>
+              <a:spcBef>
+                <a:spcPts val="1417"/>
+              </a:spcBef>
+              <a:buClr>
+                <a:srgbClr val="000000"/>
+              </a:buClr>
+              <a:buSzPct val="45000"/>
+              <a:buFont typeface="Wingdings" charset="2"/>
+              <a:buChar char=""/>
+            </a:pPr>
+            <a:r>
+              <a:rPr b="0" lang="fr-FR" sz="2800" spc="-1" strike="noStrike">
+                <a:solidFill>
+                  <a:srgbClr val="000000"/>
+                </a:solidFill>
+                <a:latin typeface="Calibri"/>
+                <a:ea typeface="DejaVu Sans"/>
+              </a:rPr>
+              <a:t>Guilain</a:t>
+            </a:r>
+            <a:endParaRPr b="0" lang="en-US" sz="2800" spc="-1" strike="noStrike">
+              <a:latin typeface="Arial"/>
+            </a:endParaRPr>
+          </a:p>
+          <a:p>
+            <a:pPr lvl="2" marL="648000" indent="-216000">
+              <a:lnSpc>
+                <a:spcPct val="100000"/>
+              </a:lnSpc>
+              <a:spcBef>
+                <a:spcPts val="1417"/>
+              </a:spcBef>
+              <a:buClr>
+                <a:srgbClr val="000000"/>
+              </a:buClr>
+              <a:buSzPct val="45000"/>
+              <a:buFont typeface="Wingdings" charset="2"/>
+              <a:buChar char=""/>
+            </a:pPr>
+            <a:r>
+              <a:rPr b="0" lang="fr-FR" sz="2800" spc="-1" strike="noStrike">
+                <a:solidFill>
+                  <a:srgbClr val="000000"/>
+                </a:solidFill>
+                <a:latin typeface="Calibri"/>
+                <a:ea typeface="DejaVu Sans"/>
+              </a:rPr>
+              <a:t>Envoi données </a:t>
+            </a:r>
+            <a:r>
+              <a:rPr b="0" lang="fr-FR" sz="2800" spc="-1" strike="noStrike">
+                <a:solidFill>
+                  <a:srgbClr val="000000"/>
+                </a:solidFill>
+                <a:latin typeface="Calibri"/>
+                <a:ea typeface="DejaVu Sans"/>
+              </a:rPr>
+              <a:t>depuis </a:t>
+            </a:r>
+            <a:r>
+              <a:rPr b="0" lang="fr-FR" sz="2800" spc="-1" strike="noStrike">
+                <a:solidFill>
+                  <a:srgbClr val="000000"/>
+                </a:solidFill>
+                <a:latin typeface="Calibri"/>
+                <a:ea typeface="DejaVu Sans"/>
+              </a:rPr>
+              <a:t>Arduino</a:t>
+            </a:r>
+            <a:endParaRPr b="0" lang="en-US" sz="2800" spc="-1" strike="noStrike">
+              <a:latin typeface="Arial"/>
+            </a:endParaRPr>
+          </a:p>
+          <a:p>
+            <a:pPr lvl="2" marL="648000" indent="-216000">
+              <a:lnSpc>
+                <a:spcPct val="100000"/>
+              </a:lnSpc>
+              <a:spcBef>
+                <a:spcPts val="1417"/>
+              </a:spcBef>
+              <a:buClr>
+                <a:srgbClr val="000000"/>
+              </a:buClr>
+              <a:buSzPct val="45000"/>
+              <a:buFont typeface="Wingdings" charset="2"/>
+              <a:buChar char=""/>
+            </a:pPr>
+            <a:r>
+              <a:rPr b="0" lang="fr-FR" sz="2800" spc="-1" strike="noStrike">
+                <a:solidFill>
+                  <a:srgbClr val="000000"/>
+                </a:solidFill>
+                <a:latin typeface="Calibri"/>
+                <a:ea typeface="DejaVu Sans"/>
+              </a:rPr>
+              <a:t>MQTT Arduino</a:t>
+            </a:r>
+            <a:endParaRPr b="0" lang="en-US" sz="2800" spc="-1" strike="noStrike">
+              <a:latin typeface="Arial"/>
+            </a:endParaRPr>
+          </a:p>
+          <a:p>
+            <a:pPr lvl="2" marL="648000" indent="-216000">
+              <a:lnSpc>
+                <a:spcPct val="100000"/>
+              </a:lnSpc>
+              <a:spcBef>
+                <a:spcPts val="1417"/>
+              </a:spcBef>
+              <a:buClr>
+                <a:srgbClr val="000000"/>
+              </a:buClr>
+              <a:buSzPct val="45000"/>
+              <a:buFont typeface="Wingdings" charset="2"/>
+              <a:buChar char=""/>
+            </a:pPr>
+            <a:r>
+              <a:rPr b="0" lang="fr-FR" sz="2800" spc="-1" strike="noStrike">
+                <a:solidFill>
+                  <a:srgbClr val="000000"/>
+                </a:solidFill>
+                <a:latin typeface="Calibri"/>
+                <a:ea typeface="DejaVu Sans"/>
+              </a:rPr>
+              <a:t>Structure code </a:t>
+            </a:r>
+            <a:r>
+              <a:rPr b="0" lang="fr-FR" sz="2800" spc="-1" strike="noStrike">
+                <a:solidFill>
+                  <a:srgbClr val="000000"/>
+                </a:solidFill>
+                <a:latin typeface="Calibri"/>
+                <a:ea typeface="DejaVu Sans"/>
+              </a:rPr>
+              <a:t>Arduino</a:t>
+            </a:r>
+            <a:endParaRPr b="0" lang="en-US" sz="2800" spc="-1" strike="noStrike">
+              <a:latin typeface="Arial"/>
+            </a:endParaRPr>
+          </a:p>
+          <a:p>
+            <a:pPr>
+              <a:lnSpc>
+                <a:spcPct val="100000"/>
+              </a:lnSpc>
+              <a:spcBef>
+                <a:spcPts val="1417"/>
+              </a:spcBef>
+            </a:pPr>
+            <a:endParaRPr b="0" lang="en-US" sz="2800" spc="-1" strike="noStrike">
+              <a:latin typeface="Arial"/>
+            </a:endParaRPr>
+          </a:p>
+        </p:txBody>
+      </p:sp>
+      <p:sp>
+        <p:nvSpPr>
+          <p:cNvPr id="126" name="CustomShape 9"/>
+          <p:cNvSpPr/>
+          <p:nvPr/>
+        </p:nvSpPr>
+        <p:spPr>
+          <a:xfrm>
+            <a:off x="8157600" y="1087920"/>
+            <a:ext cx="3340080" cy="5103360"/>
+          </a:xfrm>
+          <a:prstGeom prst="rect">
+            <a:avLst/>
+          </a:prstGeom>
+          <a:noFill/>
+          <a:ln w="0">
+            <a:noFill/>
+          </a:ln>
+        </p:spPr>
+        <p:style>
+          <a:lnRef idx="0"/>
+          <a:fillRef idx="0"/>
+          <a:effectRef idx="0"/>
+          <a:fontRef idx="minor"/>
+        </p:style>
+        <p:txBody>
+          <a:bodyPr lIns="90000" rIns="90000" tIns="45000" bIns="45000">
+            <a:normAutofit/>
+          </a:bodyPr>
+          <a:p>
+            <a:pPr>
+              <a:lnSpc>
+                <a:spcPct val="100000"/>
+              </a:lnSpc>
+              <a:spcBef>
+                <a:spcPts val="1417"/>
+              </a:spcBef>
+            </a:pPr>
+            <a:endParaRPr b="0" lang="en-US" sz="1800" spc="-1" strike="noStrike">
+              <a:latin typeface="Arial"/>
+            </a:endParaRPr>
+          </a:p>
+          <a:p>
+            <a:pPr>
+              <a:lnSpc>
+                <a:spcPct val="100000"/>
+              </a:lnSpc>
+              <a:spcBef>
+                <a:spcPts val="1417"/>
+              </a:spcBef>
+            </a:pPr>
+            <a:endParaRPr b="0" lang="en-US" sz="1800" spc="-1" strike="noStrike">
+              <a:latin typeface="Arial"/>
+            </a:endParaRPr>
+          </a:p>
+          <a:p>
+            <a:pPr>
+              <a:lnSpc>
+                <a:spcPct val="100000"/>
+              </a:lnSpc>
+              <a:spcBef>
+                <a:spcPts val="1417"/>
+              </a:spcBef>
+            </a:pPr>
+            <a:endParaRPr b="0" lang="en-US" sz="1800" spc="-1" strike="noStrike">
+              <a:latin typeface="Arial"/>
+            </a:endParaRPr>
+          </a:p>
+          <a:p>
+            <a:pPr marL="432000" indent="-320400">
+              <a:lnSpc>
+                <a:spcPct val="100000"/>
+              </a:lnSpc>
+              <a:spcBef>
+                <a:spcPts val="1417"/>
+              </a:spcBef>
+              <a:buClr>
+                <a:srgbClr val="000000"/>
+              </a:buClr>
+              <a:buSzPct val="45000"/>
+              <a:buFont typeface="Wingdings" charset="2"/>
+              <a:buChar char=""/>
+            </a:pPr>
+            <a:r>
+              <a:rPr b="0" lang="fr-FR" sz="2800" spc="-1" strike="noStrike">
+                <a:solidFill>
+                  <a:srgbClr val="000000"/>
+                </a:solidFill>
+                <a:latin typeface="Calibri"/>
+                <a:ea typeface="DejaVu Sans"/>
+              </a:rPr>
+              <a:t>Mehdi</a:t>
+            </a:r>
+            <a:endParaRPr b="0" lang="en-US" sz="2800" spc="-1" strike="noStrike">
+              <a:latin typeface="Arial"/>
+            </a:endParaRPr>
+          </a:p>
+          <a:p>
+            <a:pPr lvl="2" marL="648000" indent="-216000">
+              <a:lnSpc>
+                <a:spcPct val="100000"/>
+              </a:lnSpc>
+              <a:spcBef>
+                <a:spcPts val="1417"/>
+              </a:spcBef>
+              <a:buClr>
+                <a:srgbClr val="000000"/>
+              </a:buClr>
+              <a:buSzPct val="45000"/>
+              <a:buFont typeface="Wingdings" charset="2"/>
+              <a:buChar char=""/>
+            </a:pPr>
+            <a:r>
+              <a:rPr b="0" lang="fr-FR" sz="2800" spc="-1" strike="noStrike">
+                <a:solidFill>
+                  <a:srgbClr val="000000"/>
+                </a:solidFill>
+                <a:latin typeface="Calibri"/>
+                <a:ea typeface="DejaVu Sans"/>
+              </a:rPr>
+              <a:t>Code senseurs </a:t>
+            </a:r>
+            <a:r>
+              <a:rPr b="0" lang="fr-FR" sz="2800" spc="-1" strike="noStrike">
+                <a:solidFill>
+                  <a:srgbClr val="000000"/>
+                </a:solidFill>
+                <a:latin typeface="Calibri"/>
+                <a:ea typeface="DejaVu Sans"/>
+              </a:rPr>
+              <a:t>et actuateurs</a:t>
+            </a:r>
+            <a:endParaRPr b="0" lang="en-US" sz="2800" spc="-1" strike="noStrike">
+              <a:latin typeface="Arial"/>
+            </a:endParaRPr>
+          </a:p>
+          <a:p>
+            <a:pPr lvl="2" marL="648000" indent="-216000">
+              <a:lnSpc>
+                <a:spcPct val="100000"/>
+              </a:lnSpc>
+              <a:spcBef>
+                <a:spcPts val="1417"/>
+              </a:spcBef>
+              <a:buClr>
+                <a:srgbClr val="000000"/>
+              </a:buClr>
+              <a:buSzPct val="45000"/>
+              <a:buFont typeface="Wingdings" charset="2"/>
+              <a:buChar char=""/>
+            </a:pPr>
+            <a:r>
+              <a:rPr b="0" lang="fr-FR" sz="2800" spc="-1" strike="noStrike">
+                <a:solidFill>
+                  <a:srgbClr val="000000"/>
+                </a:solidFill>
+                <a:latin typeface="Calibri"/>
+                <a:ea typeface="DejaVu Sans"/>
+              </a:rPr>
+              <a:t>Diagramme </a:t>
+            </a:r>
+            <a:r>
+              <a:rPr b="0" lang="fr-FR" sz="2800" spc="-1" strike="noStrike">
+                <a:solidFill>
+                  <a:srgbClr val="000000"/>
+                </a:solidFill>
+                <a:latin typeface="Calibri"/>
+                <a:ea typeface="DejaVu Sans"/>
+              </a:rPr>
+              <a:t>architecture</a:t>
+            </a:r>
+            <a:endParaRPr b="0" lang="en-US" sz="2800" spc="-1" strike="noStrike">
+              <a:latin typeface="Arial"/>
+            </a:endParaRPr>
+          </a:p>
+          <a:p>
+            <a:pPr lvl="2" marL="648000" indent="-216000">
+              <a:lnSpc>
+                <a:spcPct val="100000"/>
+              </a:lnSpc>
+              <a:spcBef>
+                <a:spcPts val="1417"/>
+              </a:spcBef>
+              <a:buClr>
+                <a:srgbClr val="000000"/>
+              </a:buClr>
+              <a:buSzPct val="45000"/>
+              <a:buFont typeface="Wingdings" charset="2"/>
+              <a:buChar char=""/>
+            </a:pPr>
+            <a:r>
+              <a:rPr b="0" lang="fr-FR" sz="2800" spc="-1" strike="noStrike">
+                <a:solidFill>
+                  <a:srgbClr val="000000"/>
+                </a:solidFill>
+                <a:latin typeface="Calibri"/>
+                <a:ea typeface="DejaVu Sans"/>
+              </a:rPr>
+              <a:t>Présentation</a:t>
+            </a:r>
+            <a:endParaRPr b="0" lang="en-US" sz="2800" spc="-1" strike="noStrike">
+              <a:latin typeface="Arial"/>
+            </a:endParaRPr>
+          </a:p>
+          <a:p>
+            <a:pPr>
+              <a:lnSpc>
+                <a:spcPct val="100000"/>
+              </a:lnSpc>
+              <a:spcBef>
+                <a:spcPts val="1417"/>
+              </a:spcBef>
+            </a:pPr>
+            <a:endParaRPr b="0" lang="en-US" sz="2800" spc="-1" strike="noStrike">
+              <a:latin typeface="Arial"/>
+            </a:endParaRPr>
+          </a:p>
+          <a:p>
+            <a:pPr>
+              <a:lnSpc>
+                <a:spcPct val="100000"/>
+              </a:lnSpc>
+              <a:spcBef>
+                <a:spcPts val="1417"/>
+              </a:spcBef>
+            </a:pPr>
+            <a:endParaRPr b="0" lang="en-US" sz="2800" spc="-1" strike="noStrike">
+              <a:latin typeface="Arial"/>
+            </a:endParaRPr>
+          </a:p>
+        </p:txBody>
+      </p:sp>
     </p:spTree>
   </p:cSld>
   <mc:AlternateContent>

</xml_diff>